<commit_message>
Update the slides for the Markov lecture
</commit_message>
<xml_diff>
--- a/Markov models/Slides/Markov Model Variants.pptx
+++ b/Markov models/Slides/Markov Model Variants.pptx
@@ -8,7 +8,7 @@
     <p:notesMasterId r:id="rId16"/>
   </p:notesMasterIdLst>
   <p:sldIdLst>
-    <p:sldId id="256" r:id="rId2"/>
+    <p:sldId id="347" r:id="rId2"/>
     <p:sldId id="320" r:id="rId3"/>
     <p:sldId id="286" r:id="rId4"/>
     <p:sldId id="319" r:id="rId5"/>
@@ -210,7 +210,7 @@
           <a:p>
             <a:fld id="{80022054-F6B9-B04E-9F80-BE6C2BED9348}" type="datetimeFigureOut">
               <a:rPr lang="en-US" smtClean="0"/>
-              <a:t>10/15/19</a:t>
+              <a:t>1/28/20</a:t>
             </a:fld>
             <a:endParaRPr lang="en-US"/>
           </a:p>
@@ -547,7 +547,7 @@
     </p:spTree>
     <p:extLst>
       <p:ext uri="{BB962C8B-B14F-4D97-AF65-F5344CB8AC3E}">
-        <p14:creationId xmlns:p14="http://schemas.microsoft.com/office/powerpoint/2010/main" val="949248597"/>
+        <p14:creationId xmlns:p14="http://schemas.microsoft.com/office/powerpoint/2010/main" val="3418646083"/>
       </p:ext>
     </p:extLst>
   </p:cSld>
@@ -1584,7 +1584,7 @@
           <a:p>
             <a:fld id="{DD3575FE-2CC2-2845-A91B-203C440E7198}" type="datetimeFigureOut">
               <a:rPr lang="en-US" smtClean="0"/>
-              <a:t>10/15/19</a:t>
+              <a:t>1/28/20</a:t>
             </a:fld>
             <a:endParaRPr lang="en-US"/>
           </a:p>
@@ -1917,7 +1917,7 @@
           <a:p>
             <a:fld id="{DD3575FE-2CC2-2845-A91B-203C440E7198}" type="datetimeFigureOut">
               <a:rPr lang="en-US" smtClean="0"/>
-              <a:t>10/15/19</a:t>
+              <a:t>1/28/20</a:t>
             </a:fld>
             <a:endParaRPr lang="en-US"/>
           </a:p>
@@ -2101,7 +2101,7 @@
           <a:p>
             <a:fld id="{DD3575FE-2CC2-2845-A91B-203C440E7198}" type="datetimeFigureOut">
               <a:rPr lang="en-US" smtClean="0"/>
-              <a:t>10/15/19</a:t>
+              <a:t>1/28/20</a:t>
             </a:fld>
             <a:endParaRPr lang="en-US"/>
           </a:p>
@@ -2291,7 +2291,7 @@
           <a:p>
             <a:fld id="{DD3575FE-2CC2-2845-A91B-203C440E7198}" type="datetimeFigureOut">
               <a:rPr lang="en-US" smtClean="0"/>
-              <a:t>10/15/19</a:t>
+              <a:t>1/28/20</a:t>
             </a:fld>
             <a:endParaRPr lang="en-US"/>
           </a:p>
@@ -2443,7 +2443,7 @@
           <a:p>
             <a:fld id="{DD3575FE-2CC2-2845-A91B-203C440E7198}" type="datetimeFigureOut">
               <a:rPr lang="en-US" smtClean="0"/>
-              <a:t>10/15/19</a:t>
+              <a:t>1/28/20</a:t>
             </a:fld>
             <a:endParaRPr lang="en-US"/>
           </a:p>
@@ -3668,7 +3668,7 @@
           <a:p>
             <a:fld id="{DD3575FE-2CC2-2845-A91B-203C440E7198}" type="datetimeFigureOut">
               <a:rPr lang="en-US" smtClean="0"/>
-              <a:t>10/15/19</a:t>
+              <a:t>1/28/20</a:t>
             </a:fld>
             <a:endParaRPr lang="en-US"/>
           </a:p>
@@ -3706,7 +3706,7 @@
           <a:noFill/>
           <a:extLst>
             <a:ext uri="{909E8E84-426E-40dd-AFC4-6F175D3DCCD1}">
-              <a14:hiddenFill xmlns="" xmlns:a14="http://schemas.microsoft.com/office/drawing/2010/main">
+              <a14:hiddenFill xmlns:a14="http://schemas.microsoft.com/office/drawing/2010/main" xmlns="">
                 <a:solidFill>
                   <a:srgbClr val="FFFFFF"/>
                 </a:solidFill>
@@ -3747,7 +3747,7 @@
           <a:noFill/>
           <a:extLst>
             <a:ext uri="{909E8E84-426E-40dd-AFC4-6F175D3DCCD1}">
-              <a14:hiddenFill xmlns="" xmlns:a14="http://schemas.microsoft.com/office/drawing/2010/main">
+              <a14:hiddenFill xmlns:a14="http://schemas.microsoft.com/office/drawing/2010/main" xmlns="">
                 <a:solidFill>
                   <a:srgbClr val="FFFFFF"/>
                 </a:solidFill>
@@ -4330,7 +4330,7 @@
           <a:noFill/>
           <a:extLst>
             <a:ext uri="{909E8E84-426E-40dd-AFC4-6F175D3DCCD1}">
-              <a14:hiddenFill xmlns="" xmlns:a14="http://schemas.microsoft.com/office/drawing/2010/main">
+              <a14:hiddenFill xmlns:a14="http://schemas.microsoft.com/office/drawing/2010/main" xmlns="">
                 <a:solidFill>
                   <a:srgbClr val="FFFFFF"/>
                 </a:solidFill>
@@ -4369,7 +4369,7 @@
           <a:noFill/>
           <a:extLst>
             <a:ext uri="{909E8E84-426E-40dd-AFC4-6F175D3DCCD1}">
-              <a14:hiddenFill xmlns="" xmlns:a14="http://schemas.microsoft.com/office/drawing/2010/main">
+              <a14:hiddenFill xmlns:a14="http://schemas.microsoft.com/office/drawing/2010/main" xmlns="">
                 <a:solidFill>
                   <a:srgbClr val="FFFFFF"/>
                 </a:solidFill>
@@ -5032,7 +5032,7 @@
           <a:noFill/>
           <a:extLst>
             <a:ext uri="{909E8E84-426E-40dd-AFC4-6F175D3DCCD1}">
-              <a14:hiddenFill xmlns="" xmlns:a14="http://schemas.microsoft.com/office/drawing/2010/main">
+              <a14:hiddenFill xmlns:a14="http://schemas.microsoft.com/office/drawing/2010/main" xmlns="">
                 <a:solidFill>
                   <a:srgbClr val="FFFFFF"/>
                 </a:solidFill>
@@ -5079,7 +5079,7 @@
           <a:noFill/>
           <a:extLst>
             <a:ext uri="{909E8E84-426E-40dd-AFC4-6F175D3DCCD1}">
-              <a14:hiddenFill xmlns="" xmlns:a14="http://schemas.microsoft.com/office/drawing/2010/main">
+              <a14:hiddenFill xmlns:a14="http://schemas.microsoft.com/office/drawing/2010/main" xmlns="">
                 <a:solidFill>
                   <a:srgbClr val="FFFFFF"/>
                 </a:solidFill>
@@ -5130,14 +5130,14 @@
           <a:effectLst/>
           <a:extLst>
             <a:ext uri="{909E8E84-426E-40dd-AFC4-6F175D3DCCD1}">
-              <a14:hiddenFill xmlns="" xmlns:a14="http://schemas.microsoft.com/office/drawing/2010/main">
+              <a14:hiddenFill xmlns:a14="http://schemas.microsoft.com/office/drawing/2010/main" xmlns="">
                 <a:solidFill>
                   <a:schemeClr val="accent1"/>
                 </a:solidFill>
               </a14:hiddenFill>
             </a:ext>
             <a:ext uri="{91240B29-F687-4f45-9708-019B960494DF}">
-              <a14:hiddenLine xmlns="" xmlns:a14="http://schemas.microsoft.com/office/drawing/2010/main" w="9525">
+              <a14:hiddenLine xmlns:a14="http://schemas.microsoft.com/office/drawing/2010/main" xmlns="" w="9525">
                 <a:solidFill>
                   <a:schemeClr val="tx1"/>
                 </a:solidFill>
@@ -5147,7 +5147,7 @@
               </a14:hiddenLine>
             </a:ext>
             <a:ext uri="{AF507438-7753-43e0-B8FC-AC1667EBCBE1}">
-              <a14:hiddenEffects xmlns="" xmlns:a14="http://schemas.microsoft.com/office/drawing/2010/main">
+              <a14:hiddenEffects xmlns:a14="http://schemas.microsoft.com/office/drawing/2010/main" xmlns="">
                 <a:effectLst>
                   <a:outerShdw dist="35921" dir="2700000" algn="ctr" rotWithShape="0">
                     <a:schemeClr val="bg2"/>
@@ -5200,14 +5200,14 @@
           <a:effectLst/>
           <a:extLst>
             <a:ext uri="{909E8E84-426E-40dd-AFC4-6F175D3DCCD1}">
-              <a14:hiddenFill xmlns="" xmlns:a14="http://schemas.microsoft.com/office/drawing/2010/main">
+              <a14:hiddenFill xmlns:a14="http://schemas.microsoft.com/office/drawing/2010/main" xmlns="">
                 <a:solidFill>
                   <a:schemeClr val="accent1"/>
                 </a:solidFill>
               </a14:hiddenFill>
             </a:ext>
             <a:ext uri="{91240B29-F687-4f45-9708-019B960494DF}">
-              <a14:hiddenLine xmlns="" xmlns:a14="http://schemas.microsoft.com/office/drawing/2010/main" w="9525">
+              <a14:hiddenLine xmlns:a14="http://schemas.microsoft.com/office/drawing/2010/main" xmlns="" w="9525">
                 <a:solidFill>
                   <a:schemeClr val="tx1"/>
                 </a:solidFill>
@@ -5217,7 +5217,7 @@
               </a14:hiddenLine>
             </a:ext>
             <a:ext uri="{AF507438-7753-43e0-B8FC-AC1667EBCBE1}">
-              <a14:hiddenEffects xmlns="" xmlns:a14="http://schemas.microsoft.com/office/drawing/2010/main">
+              <a14:hiddenEffects xmlns:a14="http://schemas.microsoft.com/office/drawing/2010/main" xmlns="">
                 <a:effectLst>
                   <a:outerShdw dist="35921" dir="2700000" algn="ctr" rotWithShape="0">
                     <a:schemeClr val="bg2"/>
@@ -5544,7 +5544,7 @@
           <a:noFill/>
           <a:extLst>
             <a:ext uri="{909E8E84-426E-40dd-AFC4-6F175D3DCCD1}">
-              <a14:hiddenFill xmlns="" xmlns:a14="http://schemas.microsoft.com/office/drawing/2010/main">
+              <a14:hiddenFill xmlns:a14="http://schemas.microsoft.com/office/drawing/2010/main" xmlns="">
                 <a:solidFill>
                   <a:srgbClr val="FFFFFF"/>
                 </a:solidFill>
@@ -5583,7 +5583,7 @@
           <a:noFill/>
           <a:extLst>
             <a:ext uri="{909E8E84-426E-40dd-AFC4-6F175D3DCCD1}">
-              <a14:hiddenFill xmlns="" xmlns:a14="http://schemas.microsoft.com/office/drawing/2010/main">
+              <a14:hiddenFill xmlns:a14="http://schemas.microsoft.com/office/drawing/2010/main" xmlns="">
                 <a:solidFill>
                   <a:srgbClr val="FFFFFF"/>
                 </a:solidFill>
@@ -5805,7 +5805,7 @@
           <a:noFill/>
           <a:extLst>
             <a:ext uri="{909E8E84-426E-40dd-AFC4-6F175D3DCCD1}">
-              <a14:hiddenFill xmlns="" xmlns:a14="http://schemas.microsoft.com/office/drawing/2010/main">
+              <a14:hiddenFill xmlns:a14="http://schemas.microsoft.com/office/drawing/2010/main" xmlns="">
                 <a:solidFill>
                   <a:srgbClr val="FFFFFF"/>
                 </a:solidFill>
@@ -5852,7 +5852,7 @@
           <a:noFill/>
           <a:extLst>
             <a:ext uri="{909E8E84-426E-40dd-AFC4-6F175D3DCCD1}">
-              <a14:hiddenFill xmlns="" xmlns:a14="http://schemas.microsoft.com/office/drawing/2010/main">
+              <a14:hiddenFill xmlns:a14="http://schemas.microsoft.com/office/drawing/2010/main" xmlns="">
                 <a:solidFill>
                   <a:srgbClr val="FFFFFF"/>
                 </a:solidFill>
@@ -5903,14 +5903,14 @@
           <a:effectLst/>
           <a:extLst>
             <a:ext uri="{909E8E84-426E-40dd-AFC4-6F175D3DCCD1}">
-              <a14:hiddenFill xmlns="" xmlns:a14="http://schemas.microsoft.com/office/drawing/2010/main">
+              <a14:hiddenFill xmlns:a14="http://schemas.microsoft.com/office/drawing/2010/main" xmlns="">
                 <a:solidFill>
                   <a:schemeClr val="accent1"/>
                 </a:solidFill>
               </a14:hiddenFill>
             </a:ext>
             <a:ext uri="{91240B29-F687-4f45-9708-019B960494DF}">
-              <a14:hiddenLine xmlns="" xmlns:a14="http://schemas.microsoft.com/office/drawing/2010/main" w="9525">
+              <a14:hiddenLine xmlns:a14="http://schemas.microsoft.com/office/drawing/2010/main" xmlns="" w="9525">
                 <a:solidFill>
                   <a:schemeClr val="tx1"/>
                 </a:solidFill>
@@ -5920,7 +5920,7 @@
               </a14:hiddenLine>
             </a:ext>
             <a:ext uri="{AF507438-7753-43e0-B8FC-AC1667EBCBE1}">
-              <a14:hiddenEffects xmlns="" xmlns:a14="http://schemas.microsoft.com/office/drawing/2010/main">
+              <a14:hiddenEffects xmlns:a14="http://schemas.microsoft.com/office/drawing/2010/main" xmlns="">
                 <a:effectLst>
                   <a:outerShdw dist="35921" dir="2700000" algn="ctr" rotWithShape="0">
                     <a:schemeClr val="bg2"/>
@@ -5973,14 +5973,14 @@
           <a:effectLst/>
           <a:extLst>
             <a:ext uri="{909E8E84-426E-40dd-AFC4-6F175D3DCCD1}">
-              <a14:hiddenFill xmlns="" xmlns:a14="http://schemas.microsoft.com/office/drawing/2010/main">
+              <a14:hiddenFill xmlns:a14="http://schemas.microsoft.com/office/drawing/2010/main" xmlns="">
                 <a:solidFill>
                   <a:schemeClr val="accent1"/>
                 </a:solidFill>
               </a14:hiddenFill>
             </a:ext>
             <a:ext uri="{91240B29-F687-4f45-9708-019B960494DF}">
-              <a14:hiddenLine xmlns="" xmlns:a14="http://schemas.microsoft.com/office/drawing/2010/main" w="9525">
+              <a14:hiddenLine xmlns:a14="http://schemas.microsoft.com/office/drawing/2010/main" xmlns="" w="9525">
                 <a:solidFill>
                   <a:schemeClr val="tx1"/>
                 </a:solidFill>
@@ -5990,7 +5990,7 @@
               </a14:hiddenLine>
             </a:ext>
             <a:ext uri="{AF507438-7753-43e0-B8FC-AC1667EBCBE1}">
-              <a14:hiddenEffects xmlns="" xmlns:a14="http://schemas.microsoft.com/office/drawing/2010/main">
+              <a14:hiddenEffects xmlns:a14="http://schemas.microsoft.com/office/drawing/2010/main" xmlns="">
                 <a:effectLst>
                   <a:outerShdw dist="35921" dir="2700000" algn="ctr" rotWithShape="0">
                     <a:schemeClr val="bg2"/>
@@ -6166,7 +6166,7 @@
           <a:p>
             <a:fld id="{DD3575FE-2CC2-2845-A91B-203C440E7198}" type="datetimeFigureOut">
               <a:rPr lang="en-US" smtClean="0"/>
-              <a:t>10/15/19</a:t>
+              <a:t>1/28/20</a:t>
             </a:fld>
             <a:endParaRPr lang="en-US"/>
           </a:p>
@@ -6423,7 +6423,7 @@
           <a:p>
             <a:fld id="{DD3575FE-2CC2-2845-A91B-203C440E7198}" type="datetimeFigureOut">
               <a:rPr lang="en-US" smtClean="0"/>
-              <a:t>10/15/19</a:t>
+              <a:t>1/28/20</a:t>
             </a:fld>
             <a:endParaRPr lang="en-US"/>
           </a:p>
@@ -6727,7 +6727,7 @@
           <a:p>
             <a:fld id="{DD3575FE-2CC2-2845-A91B-203C440E7198}" type="datetimeFigureOut">
               <a:rPr lang="en-US" smtClean="0"/>
-              <a:t>10/15/19</a:t>
+              <a:t>1/28/20</a:t>
             </a:fld>
             <a:endParaRPr lang="en-US"/>
           </a:p>
@@ -7176,7 +7176,7 @@
           <a:p>
             <a:fld id="{DD3575FE-2CC2-2845-A91B-203C440E7198}" type="datetimeFigureOut">
               <a:rPr lang="en-US" smtClean="0"/>
-              <a:t>10/15/19</a:t>
+              <a:t>1/28/20</a:t>
             </a:fld>
             <a:endParaRPr lang="en-US"/>
           </a:p>
@@ -7310,7 +7310,7 @@
           <a:p>
             <a:fld id="{DD3575FE-2CC2-2845-A91B-203C440E7198}" type="datetimeFigureOut">
               <a:rPr lang="en-US" smtClean="0"/>
-              <a:t>10/15/19</a:t>
+              <a:t>1/28/20</a:t>
             </a:fld>
             <a:endParaRPr lang="en-US"/>
           </a:p>
@@ -7416,7 +7416,7 @@
           <a:p>
             <a:fld id="{DD3575FE-2CC2-2845-A91B-203C440E7198}" type="datetimeFigureOut">
               <a:rPr lang="en-US" smtClean="0"/>
-              <a:t>10/15/19</a:t>
+              <a:t>1/28/20</a:t>
             </a:fld>
             <a:endParaRPr lang="en-US"/>
           </a:p>
@@ -7765,7 +7765,7 @@
           <a:p>
             <a:fld id="{DD3575FE-2CC2-2845-A91B-203C440E7198}" type="datetimeFigureOut">
               <a:rPr lang="en-US" smtClean="0"/>
-              <a:t>10/15/19</a:t>
+              <a:t>1/28/20</a:t>
             </a:fld>
             <a:endParaRPr lang="en-US"/>
           </a:p>
@@ -8121,13 +8121,19 @@
         </p:spPr>
         <p:txBody>
           <a:bodyPr>
-            <a:normAutofit/>
+            <a:normAutofit lnSpcReduction="10000"/>
           </a:bodyPr>
           <a:lstStyle/>
           <a:p>
             <a:r>
+              <a:rPr lang="en-US" b="1" dirty="0"/>
+              <a:t>Using R for Decision Modeling in Health Technology Assessment</a:t>
+            </a:r>
+          </a:p>
+          <a:p>
+            <a:r>
               <a:rPr lang="en-US" dirty="0"/>
-              <a:t>Cost-Effectiveness and Decision Modeling in R Workshop</a:t>
+              <a:t>CE16 </a:t>
             </a:r>
           </a:p>
           <a:p>
@@ -8136,13 +8142,13 @@
           <a:p>
             <a:r>
               <a:rPr lang="en-US" dirty="0"/>
-              <a:t>The CHOICE Institute, University of Washington</a:t>
+              <a:t>NIHES Erasmus Medical Center Rotterdam</a:t>
             </a:r>
           </a:p>
           <a:p>
             <a:r>
               <a:rPr lang="en-US" dirty="0"/>
-              <a:t>October 16-18, 2019</a:t>
+              <a:t>February, 2020</a:t>
             </a:r>
           </a:p>
         </p:txBody>
@@ -8201,7 +8207,7 @@
     </p:spTree>
     <p:extLst>
       <p:ext uri="{BB962C8B-B14F-4D97-AF65-F5344CB8AC3E}">
-        <p14:creationId xmlns:p14="http://schemas.microsoft.com/office/powerpoint/2010/main" val="126731327"/>
+        <p14:creationId xmlns:p14="http://schemas.microsoft.com/office/powerpoint/2010/main" val="3734642069"/>
       </p:ext>
     </p:extLst>
   </p:cSld>
@@ -9611,36 +9617,6 @@
           </a:p>
         </p:txBody>
       </p:sp>
-      <p:pic>
-        <p:nvPicPr>
-          <p:cNvPr id="14" name="Picture 13">
-            <a:extLst>
-              <a:ext uri="{FF2B5EF4-FFF2-40B4-BE49-F238E27FC236}">
-                <a16:creationId xmlns:a16="http://schemas.microsoft.com/office/drawing/2014/main" id="{9807CA33-F0A6-0D48-9E6D-A133435901F0}"/>
-              </a:ext>
-            </a:extLst>
-          </p:cNvPr>
-          <p:cNvPicPr>
-            <a:picLocks noChangeAspect="1"/>
-          </p:cNvPicPr>
-          <p:nvPr/>
-        </p:nvPicPr>
-        <p:blipFill>
-          <a:blip r:embed="rId2"/>
-          <a:stretch>
-            <a:fillRect/>
-          </a:stretch>
-        </p:blipFill>
-        <p:spPr>
-          <a:xfrm>
-            <a:off x="700345" y="2886023"/>
-            <a:ext cx="8443655" cy="3971977"/>
-          </a:xfrm>
-          <a:prstGeom prst="rect">
-            <a:avLst/>
-          </a:prstGeom>
-        </p:spPr>
-      </p:pic>
       <p:sp>
         <p:nvSpPr>
           <p:cNvPr id="18" name="Content Placeholder 3">
@@ -9862,6 +9838,36 @@
           </a:p>
         </p:txBody>
       </p:sp>
+      <p:pic>
+        <p:nvPicPr>
+          <p:cNvPr id="4" name="Picture 3">
+            <a:extLst>
+              <a:ext uri="{FF2B5EF4-FFF2-40B4-BE49-F238E27FC236}">
+                <a16:creationId xmlns:a16="http://schemas.microsoft.com/office/drawing/2014/main" id="{CBC91326-13A8-7A4E-8A04-16C414B3FACC}"/>
+              </a:ext>
+            </a:extLst>
+          </p:cNvPr>
+          <p:cNvPicPr>
+            <a:picLocks noChangeAspect="1"/>
+          </p:cNvPicPr>
+          <p:nvPr/>
+        </p:nvPicPr>
+        <p:blipFill>
+          <a:blip r:embed="rId2"/>
+          <a:stretch>
+            <a:fillRect/>
+          </a:stretch>
+        </p:blipFill>
+        <p:spPr>
+          <a:xfrm>
+            <a:off x="999581" y="3011318"/>
+            <a:ext cx="8076687" cy="3711215"/>
+          </a:xfrm>
+          <a:prstGeom prst="rect">
+            <a:avLst/>
+          </a:prstGeom>
+        </p:spPr>
+      </p:pic>
     </p:spTree>
     <p:extLst>
       <p:ext uri="{BB962C8B-B14F-4D97-AF65-F5344CB8AC3E}">
@@ -10338,8 +10344,8 @@
           </a:p>
         </p:txBody>
       </p:sp>
-      <mc:AlternateContent xmlns:mc="http://schemas.openxmlformats.org/markup-compatibility/2006" xmlns:a14="http://schemas.microsoft.com/office/drawing/2010/main">
-        <mc:Choice Requires="a14">
+      <mc:AlternateContent xmlns:mc="http://schemas.openxmlformats.org/markup-compatibility/2006">
+        <mc:Choice xmlns:a14="http://schemas.microsoft.com/office/drawing/2010/main" Requires="a14">
           <p:sp>
             <p:nvSpPr>
               <p:cNvPr id="3" name="Content Placeholder 2"/>
@@ -10390,7 +10396,7 @@
                 <a:pPr lvl="1"/>
                 <a:r>
                   <a:rPr lang="en-US" sz="2400" dirty="0"/>
-                  <a:t>E.g., The risk of developing recurrence among newly diagnosed cancer patients declines with time</a:t>
+                  <a:t>e.g., The risk of developing recurrence among newly diagnosed cancer patients declines with time</a:t>
                 </a:r>
                 <a:endParaRPr lang="en-US" sz="2800" dirty="0"/>
               </a:p>
@@ -10417,7 +10423,7 @@
             </p:txBody>
           </p:sp>
         </mc:Choice>
-        <mc:Fallback xmlns="">
+        <mc:Fallback>
           <p:sp>
             <p:nvSpPr>
               <p:cNvPr id="3" name="Content Placeholder 2"/>
@@ -10726,38 +10732,8 @@
           </a:p>
         </p:txBody>
       </p:sp>
-      <p:pic>
-        <p:nvPicPr>
-          <p:cNvPr id="7" name="Picture 6">
-            <a:extLst>
-              <a:ext uri="{FF2B5EF4-FFF2-40B4-BE49-F238E27FC236}">
-                <a16:creationId xmlns:a16="http://schemas.microsoft.com/office/drawing/2014/main" id="{73B37E53-5B86-3F4E-A662-99C3DE683780}"/>
-              </a:ext>
-            </a:extLst>
-          </p:cNvPr>
-          <p:cNvPicPr>
-            <a:picLocks noChangeAspect="1"/>
-          </p:cNvPicPr>
-          <p:nvPr/>
-        </p:nvPicPr>
-        <p:blipFill>
-          <a:blip r:embed="rId2"/>
-          <a:stretch>
-            <a:fillRect/>
-          </a:stretch>
-        </p:blipFill>
-        <p:spPr>
-          <a:xfrm>
-            <a:off x="763395" y="3775916"/>
-            <a:ext cx="8229880" cy="2956039"/>
-          </a:xfrm>
-          <a:prstGeom prst="rect">
-            <a:avLst/>
-          </a:prstGeom>
-        </p:spPr>
-      </p:pic>
-      <mc:AlternateContent xmlns:mc="http://schemas.openxmlformats.org/markup-compatibility/2006" xmlns:a14="http://schemas.microsoft.com/office/drawing/2010/main">
-        <mc:Choice Requires="a14">
+      <mc:AlternateContent xmlns:mc="http://schemas.openxmlformats.org/markup-compatibility/2006">
+        <mc:Choice xmlns:a14="http://schemas.microsoft.com/office/drawing/2010/main" Requires="a14">
           <p:sp>
             <p:nvSpPr>
               <p:cNvPr id="4" name="Content Placeholder 3">
@@ -10803,7 +10779,7 @@
                     <a:latin typeface="Courier New" panose="02070309020205020404" pitchFamily="49" charset="0"/>
                     <a:cs typeface="Courier New" panose="02070309020205020404" pitchFamily="49" charset="0"/>
                   </a:rPr>
-                  <a:t>a.P</a:t>
+                  <a:t>a_P</a:t>
                 </a:r>
                 <a:r>
                   <a:rPr lang="en-US" sz="2400" dirty="0">
@@ -10865,7 +10841,7 @@
             </p:txBody>
           </p:sp>
         </mc:Choice>
-        <mc:Fallback xmlns="">
+        <mc:Fallback>
           <p:sp>
             <p:nvSpPr>
               <p:cNvPr id="4" name="Content Placeholder 3">
@@ -10888,7 +10864,7 @@
                 <a:ext cx="7620000" cy="2561509"/>
               </a:xfrm>
               <a:blipFill>
-                <a:blip r:embed="rId3"/>
+                <a:blip r:embed="rId2"/>
                 <a:stretch>
                   <a:fillRect t="-2970" r="-1165"/>
                 </a:stretch>
@@ -10909,6 +10885,36 @@
           </p:sp>
         </mc:Fallback>
       </mc:AlternateContent>
+      <p:pic>
+        <p:nvPicPr>
+          <p:cNvPr id="5" name="Picture 4">
+            <a:extLst>
+              <a:ext uri="{FF2B5EF4-FFF2-40B4-BE49-F238E27FC236}">
+                <a16:creationId xmlns:a16="http://schemas.microsoft.com/office/drawing/2014/main" id="{AC47DCBF-5F75-874A-B1BB-47BF990C0ADF}"/>
+              </a:ext>
+            </a:extLst>
+          </p:cNvPr>
+          <p:cNvPicPr>
+            <a:picLocks noChangeAspect="1"/>
+          </p:cNvPicPr>
+          <p:nvPr/>
+        </p:nvPicPr>
+        <p:blipFill>
+          <a:blip r:embed="rId3"/>
+          <a:stretch>
+            <a:fillRect/>
+          </a:stretch>
+        </p:blipFill>
+        <p:spPr>
+          <a:xfrm>
+            <a:off x="840432" y="3550033"/>
+            <a:ext cx="7912725" cy="2867699"/>
+          </a:xfrm>
+          <a:prstGeom prst="rect">
+            <a:avLst/>
+          </a:prstGeom>
+        </p:spPr>
+      </p:pic>
     </p:spTree>
     <p:extLst>
       <p:ext uri="{BB962C8B-B14F-4D97-AF65-F5344CB8AC3E}">

</xml_diff>

<commit_message>
markov models updated including pptx
</commit_message>
<xml_diff>
--- a/Markov models/Slides/Markov Model Variants.pptx
+++ b/Markov models/Slides/Markov Model Variants.pptx
@@ -5,7 +5,7 @@
     <p:sldMasterId id="2147483690" r:id="rId1"/>
   </p:sldMasterIdLst>
   <p:notesMasterIdLst>
-    <p:notesMasterId r:id="rId19"/>
+    <p:notesMasterId r:id="rId18"/>
   </p:notesMasterIdLst>
   <p:sldIdLst>
     <p:sldId id="347" r:id="rId2"/>
@@ -16,15 +16,14 @@
     <p:sldId id="290" r:id="rId7"/>
     <p:sldId id="321" r:id="rId8"/>
     <p:sldId id="352" r:id="rId9"/>
-    <p:sldId id="293" r:id="rId10"/>
-    <p:sldId id="353" r:id="rId11"/>
+    <p:sldId id="353" r:id="rId10"/>
+    <p:sldId id="293" r:id="rId11"/>
     <p:sldId id="303" r:id="rId12"/>
-    <p:sldId id="350" r:id="rId13"/>
-    <p:sldId id="351" r:id="rId14"/>
-    <p:sldId id="288" r:id="rId15"/>
-    <p:sldId id="291" r:id="rId16"/>
-    <p:sldId id="258" r:id="rId17"/>
-    <p:sldId id="346" r:id="rId18"/>
+    <p:sldId id="351" r:id="rId13"/>
+    <p:sldId id="288" r:id="rId14"/>
+    <p:sldId id="291" r:id="rId15"/>
+    <p:sldId id="258" r:id="rId16"/>
+    <p:sldId id="346" r:id="rId17"/>
   </p:sldIdLst>
   <p:sldSz cx="9144000" cy="6858000" type="screen4x3"/>
   <p:notesSz cx="6858000" cy="9144000"/>
@@ -213,7 +212,7 @@
           <a:p>
             <a:fld id="{80022054-F6B9-B04E-9F80-BE6C2BED9348}" type="datetimeFigureOut">
               <a:rPr lang="en-US" smtClean="0"/>
-              <a:t>1/29/20</a:t>
+              <a:t>2/2/2020</a:t>
             </a:fld>
             <a:endParaRPr lang="en-US"/>
           </a:p>
@@ -825,7 +824,7 @@
   <p:cSld>
     <p:spTree>
       <p:nvGrpSpPr>
-        <p:cNvPr id="1" name="Shape 598"/>
+        <p:cNvPr id="1" name="Shape 1998"/>
         <p:cNvGrpSpPr/>
         <p:nvPr/>
       </p:nvGrpSpPr>
@@ -839,45 +838,7 @@
       </p:grpSpPr>
       <p:sp>
         <p:nvSpPr>
-          <p:cNvPr id="599" name="Shape 599"/>
-          <p:cNvSpPr txBox="1">
-            <a:spLocks noGrp="1"/>
-          </p:cNvSpPr>
-          <p:nvPr>
-            <p:ph type="body" idx="1"/>
-          </p:nvPr>
-        </p:nvSpPr>
-        <p:spPr>
-          <a:xfrm>
-            <a:off x="685800" y="4343401"/>
-            <a:ext cx="5486400" cy="4114800"/>
-          </a:xfrm>
-          <a:prstGeom prst="rect">
-            <a:avLst/>
-          </a:prstGeom>
-        </p:spPr>
-        <p:txBody>
-          <a:bodyPr spcFirstLastPara="1" wrap="square" lIns="91425" tIns="91425" rIns="91425" bIns="91425" anchor="t" anchorCtr="0">
-            <a:noAutofit/>
-          </a:bodyPr>
-          <a:lstStyle/>
-          <a:p>
-            <a:pPr marL="0" lvl="0" indent="0" rtl="0">
-              <a:spcBef>
-                <a:spcPts val="0"/>
-              </a:spcBef>
-              <a:spcAft>
-                <a:spcPts val="0"/>
-              </a:spcAft>
-              <a:buNone/>
-            </a:pPr>
-            <a:endParaRPr/>
-          </a:p>
-        </p:txBody>
-      </p:sp>
-      <p:sp>
-        <p:nvSpPr>
-          <p:cNvPr id="600" name="Shape 600"/>
+          <p:cNvPr id="1999" name="Shape 1999"/>
           <p:cNvSpPr>
             <a:spLocks noGrp="1" noRot="1" noChangeAspect="1"/>
           </p:cNvSpPr>
@@ -887,8 +848,8 @@
         </p:nvSpPr>
         <p:spPr>
           <a:xfrm>
-            <a:off x="1144588" y="684213"/>
-            <a:ext cx="4570412" cy="3429000"/>
+            <a:off x="1143000" y="685800"/>
+            <a:ext cx="4572000" cy="3429000"/>
           </a:xfrm>
           <a:custGeom>
             <a:avLst/>
@@ -916,77 +877,6 @@
           </a:custGeom>
         </p:spPr>
       </p:sp>
-    </p:spTree>
-    <p:extLst>
-      <p:ext uri="{BB962C8B-B14F-4D97-AF65-F5344CB8AC3E}">
-        <p14:creationId xmlns:p14="http://schemas.microsoft.com/office/powerpoint/2010/main" val="3353032091"/>
-      </p:ext>
-    </p:extLst>
-  </p:cSld>
-  <p:clrMapOvr>
-    <a:masterClrMapping/>
-  </p:clrMapOvr>
-</p:notes>
-</file>
-
-<file path=ppt/notesSlides/notesSlide5.xml><?xml version="1.0" encoding="utf-8"?>
-<p:notes xmlns:a="http://schemas.openxmlformats.org/drawingml/2006/main" xmlns:r="http://schemas.openxmlformats.org/officeDocument/2006/relationships" xmlns:p="http://schemas.openxmlformats.org/presentationml/2006/main" showMasterSp="0" showMasterPhAnim="0">
-  <p:cSld>
-    <p:spTree>
-      <p:nvGrpSpPr>
-        <p:cNvPr id="1" name="Shape 1998"/>
-        <p:cNvGrpSpPr/>
-        <p:nvPr/>
-      </p:nvGrpSpPr>
-      <p:grpSpPr>
-        <a:xfrm>
-          <a:off x="0" y="0"/>
-          <a:ext cx="0" cy="0"/>
-          <a:chOff x="0" y="0"/>
-          <a:chExt cx="0" cy="0"/>
-        </a:xfrm>
-      </p:grpSpPr>
-      <p:sp>
-        <p:nvSpPr>
-          <p:cNvPr id="1999" name="Shape 1999"/>
-          <p:cNvSpPr>
-            <a:spLocks noGrp="1" noRot="1" noChangeAspect="1"/>
-          </p:cNvSpPr>
-          <p:nvPr>
-            <p:ph type="sldImg" idx="2"/>
-          </p:nvPr>
-        </p:nvSpPr>
-        <p:spPr>
-          <a:xfrm>
-            <a:off x="1143000" y="685800"/>
-            <a:ext cx="4572000" cy="3429000"/>
-          </a:xfrm>
-          <a:custGeom>
-            <a:avLst/>
-            <a:gdLst/>
-            <a:ahLst/>
-            <a:cxnLst/>
-            <a:rect l="0" t="0" r="0" b="0"/>
-            <a:pathLst>
-              <a:path w="120000" h="120000" extrusionOk="0">
-                <a:moveTo>
-                  <a:pt x="0" y="0"/>
-                </a:moveTo>
-                <a:lnTo>
-                  <a:pt x="120000" y="0"/>
-                </a:lnTo>
-                <a:lnTo>
-                  <a:pt x="120000" y="120000"/>
-                </a:lnTo>
-                <a:lnTo>
-                  <a:pt x="0" y="120000"/>
-                </a:lnTo>
-                <a:close/>
-              </a:path>
-            </a:pathLst>
-          </a:custGeom>
-        </p:spPr>
-      </p:sp>
       <p:sp>
         <p:nvSpPr>
           <p:cNvPr id="2000" name="Shape 2000"/>
@@ -1061,7 +951,7 @@
             </a:pPr>
             <a:fld id="{00000000-1234-1234-1234-123412341234}" type="slidenum">
               <a:rPr lang="nl-NL"/>
-              <a:t>15</a:t>
+              <a:t>14</a:t>
             </a:fld>
             <a:endParaRPr/>
           </a:p>
@@ -1080,7 +970,7 @@
 </p:notes>
 </file>
 
-<file path=ppt/notesSlides/notesSlide6.xml><?xml version="1.0" encoding="utf-8"?>
+<file path=ppt/notesSlides/notesSlide5.xml><?xml version="1.0" encoding="utf-8"?>
 <p:notes xmlns:a="http://schemas.openxmlformats.org/drawingml/2006/main" xmlns:r="http://schemas.openxmlformats.org/officeDocument/2006/relationships" xmlns:p="http://schemas.openxmlformats.org/presentationml/2006/main" showMasterSp="0" showMasterPhAnim="0">
   <p:cSld>
     <p:spTree>
@@ -1696,7 +1586,7 @@
           <a:p>
             <a:fld id="{5BA465BA-58CD-5648-8542-F88D33A1D558}" type="datetime1">
               <a:rPr lang="en-US" smtClean="0"/>
-              <a:t>1/29/20</a:t>
+              <a:t>2/2/2020</a:t>
             </a:fld>
             <a:endParaRPr lang="en-US"/>
           </a:p>
@@ -2029,7 +1919,7 @@
           <a:p>
             <a:fld id="{E0285D2B-991D-6E41-96CD-86451D0EA8B6}" type="datetime1">
               <a:rPr lang="en-US" smtClean="0"/>
-              <a:t>1/29/20</a:t>
+              <a:t>2/2/2020</a:t>
             </a:fld>
             <a:endParaRPr lang="en-US"/>
           </a:p>
@@ -2213,7 +2103,7 @@
           <a:p>
             <a:fld id="{F58F080E-3479-FC41-A03E-486F34AFEBA5}" type="datetime1">
               <a:rPr lang="en-US" smtClean="0"/>
-              <a:t>1/29/20</a:t>
+              <a:t>2/2/2020</a:t>
             </a:fld>
             <a:endParaRPr lang="en-US"/>
           </a:p>
@@ -2403,7 +2293,7 @@
           <a:p>
             <a:fld id="{90A8F86B-5CB0-B646-932F-A77CEECF201B}" type="datetime1">
               <a:rPr lang="en-US" smtClean="0"/>
-              <a:t>1/29/20</a:t>
+              <a:t>2/2/2020</a:t>
             </a:fld>
             <a:endParaRPr lang="en-US"/>
           </a:p>
@@ -2555,7 +2445,7 @@
           <a:p>
             <a:fld id="{752AF0E9-FBC0-8F4F-83B9-AB34FBD396A5}" type="datetime1">
               <a:rPr lang="en-US" smtClean="0"/>
-              <a:t>1/29/20</a:t>
+              <a:t>2/2/2020</a:t>
             </a:fld>
             <a:endParaRPr lang="en-US"/>
           </a:p>
@@ -2830,7 +2720,7 @@
           <a:p>
             <a:fld id="{22F5944B-3964-1344-B4B0-FFFD5323E0E7}" type="datetime1">
               <a:rPr lang="en-US" smtClean="0"/>
-              <a:t>1/29/20</a:t>
+              <a:t>2/2/2020</a:t>
             </a:fld>
             <a:endParaRPr/>
           </a:p>
@@ -3784,7 +3674,7 @@
           <a:p>
             <a:fld id="{C85DF245-8919-D744-8B83-42A2D27B59A3}" type="datetime1">
               <a:rPr lang="en-US" smtClean="0"/>
-              <a:t>1/29/20</a:t>
+              <a:t>2/2/2020</a:t>
             </a:fld>
             <a:endParaRPr lang="en-US"/>
           </a:p>
@@ -3822,7 +3712,7 @@
           <a:noFill/>
           <a:extLst>
             <a:ext uri="{909E8E84-426E-40dd-AFC4-6F175D3DCCD1}">
-              <a14:hiddenFill xmlns="" xmlns:a14="http://schemas.microsoft.com/office/drawing/2010/main">
+              <a14:hiddenFill xmlns:a14="http://schemas.microsoft.com/office/drawing/2010/main" xmlns="">
                 <a:solidFill>
                   <a:srgbClr val="FFFFFF"/>
                 </a:solidFill>
@@ -3863,7 +3753,7 @@
           <a:noFill/>
           <a:extLst>
             <a:ext uri="{909E8E84-426E-40dd-AFC4-6F175D3DCCD1}">
-              <a14:hiddenFill xmlns="" xmlns:a14="http://schemas.microsoft.com/office/drawing/2010/main">
+              <a14:hiddenFill xmlns:a14="http://schemas.microsoft.com/office/drawing/2010/main" xmlns="">
                 <a:solidFill>
                   <a:srgbClr val="FFFFFF"/>
                 </a:solidFill>
@@ -4446,7 +4336,7 @@
           <a:noFill/>
           <a:extLst>
             <a:ext uri="{909E8E84-426E-40dd-AFC4-6F175D3DCCD1}">
-              <a14:hiddenFill xmlns="" xmlns:a14="http://schemas.microsoft.com/office/drawing/2010/main">
+              <a14:hiddenFill xmlns:a14="http://schemas.microsoft.com/office/drawing/2010/main" xmlns="">
                 <a:solidFill>
                   <a:srgbClr val="FFFFFF"/>
                 </a:solidFill>
@@ -4485,7 +4375,7 @@
           <a:noFill/>
           <a:extLst>
             <a:ext uri="{909E8E84-426E-40dd-AFC4-6F175D3DCCD1}">
-              <a14:hiddenFill xmlns="" xmlns:a14="http://schemas.microsoft.com/office/drawing/2010/main">
+              <a14:hiddenFill xmlns:a14="http://schemas.microsoft.com/office/drawing/2010/main" xmlns="">
                 <a:solidFill>
                   <a:srgbClr val="FFFFFF"/>
                 </a:solidFill>
@@ -5148,7 +5038,7 @@
           <a:noFill/>
           <a:extLst>
             <a:ext uri="{909E8E84-426E-40dd-AFC4-6F175D3DCCD1}">
-              <a14:hiddenFill xmlns="" xmlns:a14="http://schemas.microsoft.com/office/drawing/2010/main">
+              <a14:hiddenFill xmlns:a14="http://schemas.microsoft.com/office/drawing/2010/main" xmlns="">
                 <a:solidFill>
                   <a:srgbClr val="FFFFFF"/>
                 </a:solidFill>
@@ -5195,7 +5085,7 @@
           <a:noFill/>
           <a:extLst>
             <a:ext uri="{909E8E84-426E-40dd-AFC4-6F175D3DCCD1}">
-              <a14:hiddenFill xmlns="" xmlns:a14="http://schemas.microsoft.com/office/drawing/2010/main">
+              <a14:hiddenFill xmlns:a14="http://schemas.microsoft.com/office/drawing/2010/main" xmlns="">
                 <a:solidFill>
                   <a:srgbClr val="FFFFFF"/>
                 </a:solidFill>
@@ -5246,14 +5136,14 @@
           <a:effectLst/>
           <a:extLst>
             <a:ext uri="{909E8E84-426E-40dd-AFC4-6F175D3DCCD1}">
-              <a14:hiddenFill xmlns="" xmlns:a14="http://schemas.microsoft.com/office/drawing/2010/main">
+              <a14:hiddenFill xmlns:a14="http://schemas.microsoft.com/office/drawing/2010/main" xmlns="">
                 <a:solidFill>
                   <a:schemeClr val="accent1"/>
                 </a:solidFill>
               </a14:hiddenFill>
             </a:ext>
             <a:ext uri="{91240B29-F687-4f45-9708-019B960494DF}">
-              <a14:hiddenLine xmlns="" xmlns:a14="http://schemas.microsoft.com/office/drawing/2010/main" w="9525">
+              <a14:hiddenLine xmlns:a14="http://schemas.microsoft.com/office/drawing/2010/main" xmlns="" w="9525">
                 <a:solidFill>
                   <a:schemeClr val="tx1"/>
                 </a:solidFill>
@@ -5263,7 +5153,7 @@
               </a14:hiddenLine>
             </a:ext>
             <a:ext uri="{AF507438-7753-43e0-B8FC-AC1667EBCBE1}">
-              <a14:hiddenEffects xmlns="" xmlns:a14="http://schemas.microsoft.com/office/drawing/2010/main">
+              <a14:hiddenEffects xmlns:a14="http://schemas.microsoft.com/office/drawing/2010/main" xmlns="">
                 <a:effectLst>
                   <a:outerShdw dist="35921" dir="2700000" algn="ctr" rotWithShape="0">
                     <a:schemeClr val="bg2"/>
@@ -5316,14 +5206,14 @@
           <a:effectLst/>
           <a:extLst>
             <a:ext uri="{909E8E84-426E-40dd-AFC4-6F175D3DCCD1}">
-              <a14:hiddenFill xmlns="" xmlns:a14="http://schemas.microsoft.com/office/drawing/2010/main">
+              <a14:hiddenFill xmlns:a14="http://schemas.microsoft.com/office/drawing/2010/main" xmlns="">
                 <a:solidFill>
                   <a:schemeClr val="accent1"/>
                 </a:solidFill>
               </a14:hiddenFill>
             </a:ext>
             <a:ext uri="{91240B29-F687-4f45-9708-019B960494DF}">
-              <a14:hiddenLine xmlns="" xmlns:a14="http://schemas.microsoft.com/office/drawing/2010/main" w="9525">
+              <a14:hiddenLine xmlns:a14="http://schemas.microsoft.com/office/drawing/2010/main" xmlns="" w="9525">
                 <a:solidFill>
                   <a:schemeClr val="tx1"/>
                 </a:solidFill>
@@ -5333,7 +5223,7 @@
               </a14:hiddenLine>
             </a:ext>
             <a:ext uri="{AF507438-7753-43e0-B8FC-AC1667EBCBE1}">
-              <a14:hiddenEffects xmlns="" xmlns:a14="http://schemas.microsoft.com/office/drawing/2010/main">
+              <a14:hiddenEffects xmlns:a14="http://schemas.microsoft.com/office/drawing/2010/main" xmlns="">
                 <a:effectLst>
                   <a:outerShdw dist="35921" dir="2700000" algn="ctr" rotWithShape="0">
                     <a:schemeClr val="bg2"/>
@@ -5660,7 +5550,7 @@
           <a:noFill/>
           <a:extLst>
             <a:ext uri="{909E8E84-426E-40dd-AFC4-6F175D3DCCD1}">
-              <a14:hiddenFill xmlns="" xmlns:a14="http://schemas.microsoft.com/office/drawing/2010/main">
+              <a14:hiddenFill xmlns:a14="http://schemas.microsoft.com/office/drawing/2010/main" xmlns="">
                 <a:solidFill>
                   <a:srgbClr val="FFFFFF"/>
                 </a:solidFill>
@@ -5699,7 +5589,7 @@
           <a:noFill/>
           <a:extLst>
             <a:ext uri="{909E8E84-426E-40dd-AFC4-6F175D3DCCD1}">
-              <a14:hiddenFill xmlns="" xmlns:a14="http://schemas.microsoft.com/office/drawing/2010/main">
+              <a14:hiddenFill xmlns:a14="http://schemas.microsoft.com/office/drawing/2010/main" xmlns="">
                 <a:solidFill>
                   <a:srgbClr val="FFFFFF"/>
                 </a:solidFill>
@@ -5921,7 +5811,7 @@
           <a:noFill/>
           <a:extLst>
             <a:ext uri="{909E8E84-426E-40dd-AFC4-6F175D3DCCD1}">
-              <a14:hiddenFill xmlns="" xmlns:a14="http://schemas.microsoft.com/office/drawing/2010/main">
+              <a14:hiddenFill xmlns:a14="http://schemas.microsoft.com/office/drawing/2010/main" xmlns="">
                 <a:solidFill>
                   <a:srgbClr val="FFFFFF"/>
                 </a:solidFill>
@@ -5968,7 +5858,7 @@
           <a:noFill/>
           <a:extLst>
             <a:ext uri="{909E8E84-426E-40dd-AFC4-6F175D3DCCD1}">
-              <a14:hiddenFill xmlns="" xmlns:a14="http://schemas.microsoft.com/office/drawing/2010/main">
+              <a14:hiddenFill xmlns:a14="http://schemas.microsoft.com/office/drawing/2010/main" xmlns="">
                 <a:solidFill>
                   <a:srgbClr val="FFFFFF"/>
                 </a:solidFill>
@@ -6019,14 +5909,14 @@
           <a:effectLst/>
           <a:extLst>
             <a:ext uri="{909E8E84-426E-40dd-AFC4-6F175D3DCCD1}">
-              <a14:hiddenFill xmlns="" xmlns:a14="http://schemas.microsoft.com/office/drawing/2010/main">
+              <a14:hiddenFill xmlns:a14="http://schemas.microsoft.com/office/drawing/2010/main" xmlns="">
                 <a:solidFill>
                   <a:schemeClr val="accent1"/>
                 </a:solidFill>
               </a14:hiddenFill>
             </a:ext>
             <a:ext uri="{91240B29-F687-4f45-9708-019B960494DF}">
-              <a14:hiddenLine xmlns="" xmlns:a14="http://schemas.microsoft.com/office/drawing/2010/main" w="9525">
+              <a14:hiddenLine xmlns:a14="http://schemas.microsoft.com/office/drawing/2010/main" xmlns="" w="9525">
                 <a:solidFill>
                   <a:schemeClr val="tx1"/>
                 </a:solidFill>
@@ -6036,7 +5926,7 @@
               </a14:hiddenLine>
             </a:ext>
             <a:ext uri="{AF507438-7753-43e0-B8FC-AC1667EBCBE1}">
-              <a14:hiddenEffects xmlns="" xmlns:a14="http://schemas.microsoft.com/office/drawing/2010/main">
+              <a14:hiddenEffects xmlns:a14="http://schemas.microsoft.com/office/drawing/2010/main" xmlns="">
                 <a:effectLst>
                   <a:outerShdw dist="35921" dir="2700000" algn="ctr" rotWithShape="0">
                     <a:schemeClr val="bg2"/>
@@ -6089,14 +5979,14 @@
           <a:effectLst/>
           <a:extLst>
             <a:ext uri="{909E8E84-426E-40dd-AFC4-6F175D3DCCD1}">
-              <a14:hiddenFill xmlns="" xmlns:a14="http://schemas.microsoft.com/office/drawing/2010/main">
+              <a14:hiddenFill xmlns:a14="http://schemas.microsoft.com/office/drawing/2010/main" xmlns="">
                 <a:solidFill>
                   <a:schemeClr val="accent1"/>
                 </a:solidFill>
               </a14:hiddenFill>
             </a:ext>
             <a:ext uri="{91240B29-F687-4f45-9708-019B960494DF}">
-              <a14:hiddenLine xmlns="" xmlns:a14="http://schemas.microsoft.com/office/drawing/2010/main" w="9525">
+              <a14:hiddenLine xmlns:a14="http://schemas.microsoft.com/office/drawing/2010/main" xmlns="" w="9525">
                 <a:solidFill>
                   <a:schemeClr val="tx1"/>
                 </a:solidFill>
@@ -6106,7 +5996,7 @@
               </a14:hiddenLine>
             </a:ext>
             <a:ext uri="{AF507438-7753-43e0-B8FC-AC1667EBCBE1}">
-              <a14:hiddenEffects xmlns="" xmlns:a14="http://schemas.microsoft.com/office/drawing/2010/main">
+              <a14:hiddenEffects xmlns:a14="http://schemas.microsoft.com/office/drawing/2010/main" xmlns="">
                 <a:effectLst>
                   <a:outerShdw dist="35921" dir="2700000" algn="ctr" rotWithShape="0">
                     <a:schemeClr val="bg2"/>
@@ -6282,7 +6172,7 @@
           <a:p>
             <a:fld id="{6DBFE1C1-52FA-014F-9922-AD9C38F32A04}" type="datetime1">
               <a:rPr lang="en-US" smtClean="0"/>
-              <a:t>1/29/20</a:t>
+              <a:t>2/2/2020</a:t>
             </a:fld>
             <a:endParaRPr lang="en-US"/>
           </a:p>
@@ -6539,7 +6429,7 @@
           <a:p>
             <a:fld id="{830C0508-C174-C448-A4A5-EBBC728F1201}" type="datetime1">
               <a:rPr lang="en-US" smtClean="0"/>
-              <a:t>1/29/20</a:t>
+              <a:t>2/2/2020</a:t>
             </a:fld>
             <a:endParaRPr lang="en-US"/>
           </a:p>
@@ -6843,7 +6733,7 @@
           <a:p>
             <a:fld id="{D89347E7-97B4-2F43-A642-30C7025187B7}" type="datetime1">
               <a:rPr lang="en-US" smtClean="0"/>
-              <a:t>1/29/20</a:t>
+              <a:t>2/2/2020</a:t>
             </a:fld>
             <a:endParaRPr lang="en-US"/>
           </a:p>
@@ -7292,7 +7182,7 @@
           <a:p>
             <a:fld id="{5A6B9EDF-33B7-3446-A774-F418080B35CF}" type="datetime1">
               <a:rPr lang="en-US" smtClean="0"/>
-              <a:t>1/29/20</a:t>
+              <a:t>2/2/2020</a:t>
             </a:fld>
             <a:endParaRPr lang="en-US"/>
           </a:p>
@@ -7426,7 +7316,7 @@
           <a:p>
             <a:fld id="{3856A1F0-64A3-774A-BEF5-0BB470A3FBCB}" type="datetime1">
               <a:rPr lang="en-US" smtClean="0"/>
-              <a:t>1/29/20</a:t>
+              <a:t>2/2/2020</a:t>
             </a:fld>
             <a:endParaRPr lang="en-US"/>
           </a:p>
@@ -7532,7 +7422,7 @@
           <a:p>
             <a:fld id="{7BF604F8-C7C2-9244-A9D0-D4B3019D66AA}" type="datetime1">
               <a:rPr lang="en-US" smtClean="0"/>
-              <a:t>1/29/20</a:t>
+              <a:t>2/2/2020</a:t>
             </a:fld>
             <a:endParaRPr lang="en-US"/>
           </a:p>
@@ -7881,7 +7771,7 @@
           <a:p>
             <a:fld id="{26A15BF6-4530-D64B-83B9-5FF391B1AA81}" type="datetime1">
               <a:rPr lang="en-US" smtClean="0"/>
-              <a:t>1/29/20</a:t>
+              <a:t>2/2/2020</a:t>
             </a:fld>
             <a:endParaRPr lang="en-US"/>
           </a:p>
@@ -8353,10 +8243,186 @@
       </p:grpSpPr>
       <p:sp>
         <p:nvSpPr>
-          <p:cNvPr id="2" name="Title 1">
+          <p:cNvPr id="2" name="Title 1"/>
+          <p:cNvSpPr>
+            <a:spLocks noGrp="1"/>
+          </p:cNvSpPr>
+          <p:nvPr>
+            <p:ph type="title"/>
+          </p:nvPr>
+        </p:nvSpPr>
+        <p:spPr/>
+        <p:txBody>
+          <a:bodyPr/>
+          <a:lstStyle/>
+          <a:p>
+            <a:r>
+              <a:rPr lang="en-US" dirty="0"/>
+              <a:t>Tunnel states</a:t>
+            </a:r>
+          </a:p>
+        </p:txBody>
+      </p:sp>
+      <mc:AlternateContent xmlns:mc="http://schemas.openxmlformats.org/markup-compatibility/2006">
+        <mc:Choice xmlns:a14="http://schemas.microsoft.com/office/drawing/2010/main" Requires="a14">
+          <p:sp>
+            <p:nvSpPr>
+              <p:cNvPr id="3" name="Content Placeholder 2"/>
+              <p:cNvSpPr>
+                <a:spLocks noGrp="1"/>
+              </p:cNvSpPr>
+              <p:nvPr>
+                <p:ph idx="1"/>
+              </p:nvPr>
+            </p:nvSpPr>
+            <p:spPr/>
+            <p:txBody>
+              <a:bodyPr>
+                <a:noAutofit/>
+              </a:bodyPr>
+              <a:lstStyle/>
+              <a:p>
+                <a:pPr marL="114300" indent="0">
+                  <a:buNone/>
+                </a:pPr>
+                <a:endParaRPr lang="en-US" sz="2000" dirty="0"/>
+              </a:p>
+              <a:p>
+                <a:pPr marL="114300" indent="0">
+                  <a:buNone/>
+                </a:pPr>
+                <a:r>
+                  <a:rPr lang="en-US" sz="2000" dirty="0"/>
+                  <a:t>If transition probabilities do not depend on the time since model start, replacing </a:t>
+                </a:r>
+                <a14:m>
+                  <m:oMath xmlns:m="http://schemas.openxmlformats.org/officeDocument/2006/math">
+                    <m:r>
+                      <a:rPr lang="es-ES" sz="2000" i="1">
+                        <a:latin typeface="Cambria Math" panose="02040503050406030204" pitchFamily="18" charset="0"/>
+                      </a:rPr>
+                      <m:t>𝑃</m:t>
+                    </m:r>
+                  </m:oMath>
+                </a14:m>
+                <a:r>
+                  <a:rPr lang="en-US" sz="2000" dirty="0"/>
+                  <a:t> with </a:t>
+                </a:r>
+                <a14:m>
+                  <m:oMath xmlns:m="http://schemas.openxmlformats.org/officeDocument/2006/math">
+                    <m:sSub>
+                      <m:sSubPr>
+                        <m:ctrlPr>
+                          <a:rPr lang="es-ES" sz="2000" i="1">
+                            <a:latin typeface="Cambria Math" panose="02040503050406030204" pitchFamily="18" charset="0"/>
+                          </a:rPr>
+                        </m:ctrlPr>
+                      </m:sSubPr>
+                      <m:e>
+                        <m:r>
+                          <a:rPr lang="es-ES" sz="2000" i="1">
+                            <a:latin typeface="Cambria Math" panose="02040503050406030204" pitchFamily="18" charset="0"/>
+                          </a:rPr>
+                          <m:t>𝑃</m:t>
+                        </m:r>
+                      </m:e>
+                      <m:sub>
+                        <m:r>
+                          <a:rPr lang="es-ES" sz="2000" i="1">
+                            <a:latin typeface="Cambria Math" panose="02040503050406030204" pitchFamily="18" charset="0"/>
+                          </a:rPr>
+                          <m:t>𝑡</m:t>
+                        </m:r>
+                      </m:sub>
+                    </m:sSub>
+                    <m:r>
+                      <a:rPr lang="es-ES" sz="2000" b="0" i="0" smtClean="0">
+                        <a:latin typeface="Cambria Math" panose="02040503050406030204" pitchFamily="18" charset="0"/>
+                      </a:rPr>
+                      <m:t> </m:t>
+                    </m:r>
+                  </m:oMath>
+                </a14:m>
+                <a:r>
+                  <a:rPr lang="en-US" sz="2000" dirty="0"/>
+                  <a:t>does not work</a:t>
+                </a:r>
+              </a:p>
+              <a:p>
+                <a:pPr lvl="1"/>
+                <a:r>
+                  <a:rPr lang="en-US" dirty="0"/>
+                  <a:t>E.g., Cohort of healthy patients at risk for cancer, but once cancer is diagnosed the risk of recurrence depends on time since diagnosis</a:t>
+                </a:r>
+              </a:p>
+              <a:p>
+                <a:endParaRPr lang="en-US" sz="2000" dirty="0"/>
+              </a:p>
+              <a:p>
+                <a:r>
+                  <a:rPr lang="en-US" sz="2000" dirty="0"/>
+                  <a:t>Solution?</a:t>
+                </a:r>
+              </a:p>
+              <a:p>
+                <a:pPr lvl="1"/>
+                <a:r>
+                  <a:rPr lang="en-US" sz="1800" dirty="0"/>
+                  <a:t>Create “tunnel” states</a:t>
+                </a:r>
+              </a:p>
+              <a:p>
+                <a:pPr lvl="1"/>
+                <a:endParaRPr lang="en-US" sz="1800" dirty="0"/>
+              </a:p>
+              <a:p>
+                <a:pPr lvl="1"/>
+                <a:endParaRPr lang="en-US" sz="1800" dirty="0"/>
+              </a:p>
+            </p:txBody>
+          </p:sp>
+        </mc:Choice>
+        <mc:Fallback>
+          <p:sp>
+            <p:nvSpPr>
+              <p:cNvPr id="3" name="Content Placeholder 2"/>
+              <p:cNvSpPr>
+                <a:spLocks noGrp="1" noRot="1" noChangeAspect="1" noMove="1" noResize="1" noEditPoints="1" noAdjustHandles="1" noChangeArrowheads="1" noChangeShapeType="1" noTextEdit="1"/>
+              </p:cNvSpPr>
+              <p:nvPr>
+                <p:ph idx="1"/>
+              </p:nvPr>
+            </p:nvSpPr>
+            <p:spPr>
+              <a:blipFill>
+                <a:blip r:embed="rId2"/>
+                <a:stretch>
+                  <a:fillRect/>
+                </a:stretch>
+              </a:blipFill>
+            </p:spPr>
+            <p:txBody>
+              <a:bodyPr/>
+              <a:lstStyle/>
+              <a:p>
+                <a:r>
+                  <a:rPr lang="en-US">
+                    <a:noFill/>
+                  </a:rPr>
+                  <a:t> </a:t>
+                </a:r>
+              </a:p>
+            </p:txBody>
+          </p:sp>
+        </mc:Fallback>
+      </mc:AlternateContent>
+      <p:sp>
+        <p:nvSpPr>
+          <p:cNvPr id="4" name="Slide Number Placeholder 3">
             <a:extLst>
               <a:ext uri="{FF2B5EF4-FFF2-40B4-BE49-F238E27FC236}">
-                <a16:creationId xmlns:a16="http://schemas.microsoft.com/office/drawing/2014/main" id="{194DCA39-1E19-0848-8B28-3E7D84B3BB94}"/>
+                <a16:creationId xmlns:a16="http://schemas.microsoft.com/office/drawing/2014/main" id="{488FFA15-08BF-3249-898C-43719AA1A524}"/>
               </a:ext>
             </a:extLst>
           </p:cNvPr>
@@ -8364,7 +8430,7 @@
             <a:spLocks noGrp="1"/>
           </p:cNvSpPr>
           <p:nvPr>
-            <p:ph type="title"/>
+            <p:ph type="sldNum" sz="quarter" idx="12"/>
           </p:nvPr>
         </p:nvSpPr>
         <p:spPr/>
@@ -8372,378 +8438,65 @@
           <a:bodyPr/>
           <a:lstStyle/>
           <a:p>
-            <a:r>
-              <a:rPr lang="en-US" sz="3200" dirty="0"/>
-              <a:t>When history matters, create more states…</a:t>
-            </a:r>
-          </a:p>
-        </p:txBody>
-      </p:sp>
-      <p:sp>
-        <p:nvSpPr>
-          <p:cNvPr id="4" name="Content Placeholder 3">
+            <a:fld id="{0798D939-2D9E-2142-A80A-FFDECD1E5A9B}" type="slidenum">
+              <a:rPr lang="en-US" smtClean="0"/>
+              <a:t>10</a:t>
+            </a:fld>
+            <a:endParaRPr lang="en-US"/>
+          </a:p>
+        </p:txBody>
+      </p:sp>
+      <p:pic>
+        <p:nvPicPr>
+          <p:cNvPr id="1026" name="Picture 2" descr="Image result for maastunnel&quot;">
             <a:extLst>
               <a:ext uri="{FF2B5EF4-FFF2-40B4-BE49-F238E27FC236}">
-                <a16:creationId xmlns:a16="http://schemas.microsoft.com/office/drawing/2014/main" id="{2461F1E7-6A22-0C4C-9D4E-F9CB8628A038}"/>
+                <a16:creationId xmlns:a16="http://schemas.microsoft.com/office/drawing/2014/main" id="{46BC62FA-8C56-4972-A871-C0B2F8CC9055}"/>
               </a:ext>
             </a:extLst>
           </p:cNvPr>
-          <p:cNvSpPr>
-            <a:spLocks noGrp="1"/>
-          </p:cNvSpPr>
-          <p:nvPr>
-            <p:ph idx="1"/>
-          </p:nvPr>
-        </p:nvSpPr>
-        <p:spPr/>
-        <p:txBody>
-          <a:bodyPr>
-            <a:normAutofit lnSpcReduction="10000"/>
-          </a:bodyPr>
-          <a:lstStyle/>
-          <a:p>
-            <a:r>
-              <a:rPr lang="en-US" sz="2400" dirty="0"/>
-              <a:t>Well, Sick, Dead</a:t>
-            </a:r>
-          </a:p>
-          <a:p>
-            <a:r>
-              <a:rPr lang="en-US" sz="2400" dirty="0"/>
-              <a:t>Persons can recover from Sick (return to Well)</a:t>
-            </a:r>
-          </a:p>
-          <a:p>
-            <a:r>
-              <a:rPr lang="en-US" sz="2400" dirty="0"/>
-              <a:t>Once one illness occurs the risk of having a second illness or dying of second illness increases</a:t>
-            </a:r>
-          </a:p>
-          <a:p>
-            <a:r>
-              <a:rPr lang="en-US" sz="2400" dirty="0"/>
-              <a:t>Well (S</a:t>
-            </a:r>
-            <a:r>
-              <a:rPr lang="en-US" sz="2400" baseline="-25000" dirty="0"/>
-              <a:t>0</a:t>
-            </a:r>
-            <a:r>
-              <a:rPr lang="en-US" sz="2400" dirty="0"/>
-              <a:t>), Well (S</a:t>
-            </a:r>
-            <a:r>
-              <a:rPr lang="en-US" sz="2400" baseline="-25000" dirty="0"/>
-              <a:t>1</a:t>
-            </a:r>
-            <a:r>
-              <a:rPr lang="en-US" sz="2400" dirty="0"/>
-              <a:t>), Sick (S</a:t>
-            </a:r>
-            <a:r>
-              <a:rPr lang="en-US" sz="2400" baseline="-25000" dirty="0"/>
-              <a:t>0</a:t>
-            </a:r>
-            <a:r>
-              <a:rPr lang="en-US" sz="2400" dirty="0"/>
-              <a:t>), Sick (S</a:t>
-            </a:r>
-            <a:r>
-              <a:rPr lang="en-US" sz="2400" baseline="-25000" dirty="0"/>
-              <a:t>1</a:t>
-            </a:r>
-            <a:r>
-              <a:rPr lang="en-US" sz="2400" dirty="0"/>
-              <a:t>), Dead</a:t>
-            </a:r>
-          </a:p>
-          <a:p>
-            <a:r>
-              <a:rPr lang="en-US" sz="2400" dirty="0"/>
-              <a:t>Treatment reduces the risk of getting sick but has a long-term side effect that increases risk of dying</a:t>
-            </a:r>
-          </a:p>
-          <a:p>
-            <a:r>
-              <a:rPr lang="en-US" sz="2400" dirty="0"/>
-              <a:t>Well (S</a:t>
-            </a:r>
-            <a:r>
-              <a:rPr lang="en-US" sz="2400" baseline="-25000" dirty="0"/>
-              <a:t>0</a:t>
-            </a:r>
-            <a:r>
-              <a:rPr lang="en-US" sz="2400" dirty="0"/>
-              <a:t>,E</a:t>
-            </a:r>
-            <a:r>
-              <a:rPr lang="en-US" sz="2400" baseline="-25000" dirty="0"/>
-              <a:t>0</a:t>
-            </a:r>
-            <a:r>
-              <a:rPr lang="en-US" sz="2400" dirty="0"/>
-              <a:t>), Well (S</a:t>
-            </a:r>
-            <a:r>
-              <a:rPr lang="en-US" sz="2400" baseline="-25000" dirty="0"/>
-              <a:t>0</a:t>
-            </a:r>
-            <a:r>
-              <a:rPr lang="en-US" sz="2400" dirty="0"/>
-              <a:t>, E</a:t>
-            </a:r>
-            <a:r>
-              <a:rPr lang="en-US" sz="2400" baseline="-25000" dirty="0"/>
-              <a:t>1</a:t>
-            </a:r>
-            <a:r>
-              <a:rPr lang="en-US" sz="2400" dirty="0"/>
-              <a:t>), Well (S</a:t>
-            </a:r>
-            <a:r>
-              <a:rPr lang="en-US" sz="2400" baseline="-25000" dirty="0"/>
-              <a:t>1</a:t>
-            </a:r>
-            <a:r>
-              <a:rPr lang="en-US" sz="2400" dirty="0"/>
-              <a:t>, E</a:t>
-            </a:r>
-            <a:r>
-              <a:rPr lang="en-US" sz="2400" baseline="-25000" dirty="0"/>
-              <a:t>0</a:t>
-            </a:r>
-            <a:r>
-              <a:rPr lang="en-US" sz="2400" dirty="0"/>
-              <a:t>), Well (S</a:t>
-            </a:r>
-            <a:r>
-              <a:rPr lang="en-US" sz="2400" baseline="-25000" dirty="0"/>
-              <a:t>1</a:t>
-            </a:r>
-            <a:r>
-              <a:rPr lang="en-US" sz="2400" dirty="0"/>
-              <a:t>, E</a:t>
-            </a:r>
-            <a:r>
-              <a:rPr lang="en-US" sz="2400" baseline="-25000" dirty="0"/>
-              <a:t>1</a:t>
-            </a:r>
-            <a:r>
-              <a:rPr lang="en-US" sz="2400" dirty="0"/>
-              <a:t>), Sick (S</a:t>
-            </a:r>
-            <a:r>
-              <a:rPr lang="en-US" sz="2400" baseline="-25000" dirty="0"/>
-              <a:t>0</a:t>
-            </a:r>
-            <a:r>
-              <a:rPr lang="en-US" sz="2400" dirty="0"/>
-              <a:t>, E</a:t>
-            </a:r>
-            <a:r>
-              <a:rPr lang="en-US" sz="2400" baseline="-25000" dirty="0"/>
-              <a:t>0</a:t>
-            </a:r>
-            <a:r>
-              <a:rPr lang="en-US" sz="2400" dirty="0"/>
-              <a:t>), Sick (S</a:t>
-            </a:r>
-            <a:r>
-              <a:rPr lang="en-US" sz="2400" baseline="-25000" dirty="0"/>
-              <a:t>0</a:t>
-            </a:r>
-            <a:r>
-              <a:rPr lang="en-US" sz="2400" dirty="0"/>
-              <a:t>, E</a:t>
-            </a:r>
-            <a:r>
-              <a:rPr lang="en-US" sz="2400" baseline="-25000" dirty="0"/>
-              <a:t>1</a:t>
-            </a:r>
-            <a:r>
-              <a:rPr lang="en-US" sz="2400" dirty="0"/>
-              <a:t>), Sick (S</a:t>
-            </a:r>
-            <a:r>
-              <a:rPr lang="en-US" sz="2400" baseline="-25000" dirty="0"/>
-              <a:t>1</a:t>
-            </a:r>
-            <a:r>
-              <a:rPr lang="en-US" sz="2400" dirty="0"/>
-              <a:t>, E</a:t>
-            </a:r>
-            <a:r>
-              <a:rPr lang="en-US" sz="2400" baseline="-25000" dirty="0"/>
-              <a:t>0</a:t>
-            </a:r>
-            <a:r>
-              <a:rPr lang="en-US" sz="2400" dirty="0"/>
-              <a:t>) Sick (S</a:t>
-            </a:r>
-            <a:r>
-              <a:rPr lang="en-US" sz="2400" baseline="-25000" dirty="0"/>
-              <a:t>1</a:t>
-            </a:r>
-            <a:r>
-              <a:rPr lang="en-US" sz="2400" dirty="0"/>
-              <a:t>, E</a:t>
-            </a:r>
-            <a:r>
-              <a:rPr lang="en-US" sz="2400" baseline="-25000" dirty="0"/>
-              <a:t>1</a:t>
-            </a:r>
-            <a:r>
-              <a:rPr lang="en-US" sz="2400" dirty="0"/>
-              <a:t>), Dead</a:t>
-            </a:r>
-          </a:p>
-        </p:txBody>
-      </p:sp>
-      <p:sp>
-        <p:nvSpPr>
-          <p:cNvPr id="5" name="Slide Number Placeholder 28">
+          <p:cNvPicPr>
+            <a:picLocks noChangeAspect="1" noChangeArrowheads="1"/>
+          </p:cNvPicPr>
+          <p:nvPr/>
+        </p:nvPicPr>
+        <p:blipFill>
+          <a:blip r:embed="rId3">
             <a:extLst>
-              <a:ext uri="{FF2B5EF4-FFF2-40B4-BE49-F238E27FC236}">
-                <a16:creationId xmlns:a16="http://schemas.microsoft.com/office/drawing/2014/main" id="{5DF03D01-79BC-7346-9D8F-05C0B1B84D5C}"/>
+              <a:ext uri="{28A0092B-C50C-407E-A947-70E740481C1C}">
+                <a14:useLocalDpi xmlns:a14="http://schemas.microsoft.com/office/drawing/2010/main" val="0"/>
               </a:ext>
             </a:extLst>
-          </p:cNvPr>
-          <p:cNvSpPr>
-            <a:spLocks noGrp="1"/>
-          </p:cNvSpPr>
-          <p:nvPr>
-            <p:ph type="sldNum" sz="quarter" idx="12"/>
-          </p:nvPr>
-        </p:nvSpPr>
-        <p:spPr>
-          <a:xfrm>
-            <a:off x="8559864" y="6453336"/>
-            <a:ext cx="548640" cy="396240"/>
-          </a:xfrm>
-        </p:spPr>
-        <p:txBody>
-          <a:bodyPr/>
-          <a:lstStyle>
-            <a:lvl1pPr eaLnBrk="0" hangingPunct="0">
-              <a:defRPr>
-                <a:solidFill>
-                  <a:schemeClr val="tx1"/>
-                </a:solidFill>
-                <a:latin typeface="Arial" panose="020B0604020202020204" pitchFamily="34" charset="0"/>
-              </a:defRPr>
-            </a:lvl1pPr>
-            <a:lvl2pPr marL="742950" indent="-285750" eaLnBrk="0" hangingPunct="0">
-              <a:defRPr>
-                <a:solidFill>
-                  <a:schemeClr val="tx1"/>
-                </a:solidFill>
-                <a:latin typeface="Arial" panose="020B0604020202020204" pitchFamily="34" charset="0"/>
-              </a:defRPr>
-            </a:lvl2pPr>
-            <a:lvl3pPr marL="1143000" indent="-228600" eaLnBrk="0" hangingPunct="0">
-              <a:defRPr>
-                <a:solidFill>
-                  <a:schemeClr val="tx1"/>
-                </a:solidFill>
-                <a:latin typeface="Arial" panose="020B0604020202020204" pitchFamily="34" charset="0"/>
-              </a:defRPr>
-            </a:lvl3pPr>
-            <a:lvl4pPr marL="1600200" indent="-228600" eaLnBrk="0" hangingPunct="0">
-              <a:defRPr>
-                <a:solidFill>
-                  <a:schemeClr val="tx1"/>
-                </a:solidFill>
-                <a:latin typeface="Arial" panose="020B0604020202020204" pitchFamily="34" charset="0"/>
-              </a:defRPr>
-            </a:lvl4pPr>
-            <a:lvl5pPr marL="2057400" indent="-228600" eaLnBrk="0" hangingPunct="0">
-              <a:defRPr>
-                <a:solidFill>
-                  <a:schemeClr val="tx1"/>
-                </a:solidFill>
-                <a:latin typeface="Arial" panose="020B0604020202020204" pitchFamily="34" charset="0"/>
-              </a:defRPr>
-            </a:lvl5pPr>
-            <a:lvl6pPr marL="2514600" indent="-228600" eaLnBrk="0" fontAlgn="base" hangingPunct="0">
-              <a:spcBef>
-                <a:spcPct val="0"/>
-              </a:spcBef>
-              <a:spcAft>
-                <a:spcPct val="0"/>
-              </a:spcAft>
-              <a:defRPr>
-                <a:solidFill>
-                  <a:schemeClr val="tx1"/>
-                </a:solidFill>
-                <a:latin typeface="Arial" panose="020B0604020202020204" pitchFamily="34" charset="0"/>
-              </a:defRPr>
-            </a:lvl6pPr>
-            <a:lvl7pPr marL="2971800" indent="-228600" eaLnBrk="0" fontAlgn="base" hangingPunct="0">
-              <a:spcBef>
-                <a:spcPct val="0"/>
-              </a:spcBef>
-              <a:spcAft>
-                <a:spcPct val="0"/>
-              </a:spcAft>
-              <a:defRPr>
-                <a:solidFill>
-                  <a:schemeClr val="tx1"/>
-                </a:solidFill>
-                <a:latin typeface="Arial" panose="020B0604020202020204" pitchFamily="34" charset="0"/>
-              </a:defRPr>
-            </a:lvl7pPr>
-            <a:lvl8pPr marL="3429000" indent="-228600" eaLnBrk="0" fontAlgn="base" hangingPunct="0">
-              <a:spcBef>
-                <a:spcPct val="0"/>
-              </a:spcBef>
-              <a:spcAft>
-                <a:spcPct val="0"/>
-              </a:spcAft>
-              <a:defRPr>
-                <a:solidFill>
-                  <a:schemeClr val="tx1"/>
-                </a:solidFill>
-                <a:latin typeface="Arial" panose="020B0604020202020204" pitchFamily="34" charset="0"/>
-              </a:defRPr>
-            </a:lvl8pPr>
-            <a:lvl9pPr marL="3886200" indent="-228600" eaLnBrk="0" fontAlgn="base" hangingPunct="0">
-              <a:spcBef>
-                <a:spcPct val="0"/>
-              </a:spcBef>
-              <a:spcAft>
-                <a:spcPct val="0"/>
-              </a:spcAft>
-              <a:defRPr>
-                <a:solidFill>
-                  <a:schemeClr val="tx1"/>
-                </a:solidFill>
-                <a:latin typeface="Arial" panose="020B0604020202020204" pitchFamily="34" charset="0"/>
-              </a:defRPr>
-            </a:lvl9pPr>
-          </a:lstStyle>
-          <a:p>
-            <a:pPr eaLnBrk="1" hangingPunct="1"/>
-            <a:fld id="{3F7E73E1-F280-4386-87FD-01754258053D}" type="slidenum">
-              <a:rPr lang="en-US">
-                <a:solidFill>
-                  <a:schemeClr val="accent1"/>
-                </a:solidFill>
-              </a:rPr>
-              <a:pPr eaLnBrk="1" hangingPunct="1"/>
-              <a:t>10</a:t>
-            </a:fld>
-            <a:endParaRPr lang="en-US" dirty="0">
-              <a:solidFill>
-                <a:schemeClr val="accent1"/>
-              </a:solidFill>
-            </a:endParaRPr>
-          </a:p>
-        </p:txBody>
-      </p:sp>
+          </a:blip>
+          <a:srcRect/>
+          <a:stretch>
+            <a:fillRect/>
+          </a:stretch>
+        </p:blipFill>
+        <p:spPr bwMode="auto">
+          <a:xfrm>
+            <a:off x="4650432" y="3909219"/>
+            <a:ext cx="3926148" cy="2619318"/>
+          </a:xfrm>
+          <a:prstGeom prst="rect">
+            <a:avLst/>
+          </a:prstGeom>
+          <a:noFill/>
+          <a:extLst>
+            <a:ext uri="{909E8E84-426E-40DD-AFC4-6F175D3DCCD1}">
+              <a14:hiddenFill xmlns:a14="http://schemas.microsoft.com/office/drawing/2010/main">
+                <a:solidFill>
+                  <a:srgbClr val="FFFFFF"/>
+                </a:solidFill>
+              </a14:hiddenFill>
+            </a:ext>
+          </a:extLst>
+        </p:spPr>
+      </p:pic>
     </p:spTree>
     <p:extLst>
       <p:ext uri="{BB962C8B-B14F-4D97-AF65-F5344CB8AC3E}">
-        <p14:creationId xmlns:p14="http://schemas.microsoft.com/office/powerpoint/2010/main" val="2441470660"/>
+        <p14:creationId xmlns:p14="http://schemas.microsoft.com/office/powerpoint/2010/main" val="1555524041"/>
       </p:ext>
     </p:extLst>
   </p:cSld>
@@ -8771,7 +8524,7 @@
                             </p:stCondLst>
                             <p:childTnLst>
                               <p:par>
-                                <p:cTn id="5" presetID="1" presetClass="entr" presetSubtype="0" fill="hold" grpId="0" nodeType="clickEffect">
+                                <p:cTn id="5" presetID="1" presetClass="entr" presetSubtype="0" fill="hold" nodeType="clickEffect">
                                   <p:stCondLst>
                                     <p:cond delay="0"/>
                                   </p:stCondLst>
@@ -8784,9 +8537,9 @@
                                           </p:stCondLst>
                                         </p:cTn>
                                         <p:tgtEl>
-                                          <p:spTgt spid="4">
+                                          <p:spTgt spid="3">
                                             <p:txEl>
-                                              <p:pRg st="0" end="0"/>
+                                              <p:pRg st="5" end="5"/>
                                             </p:txEl>
                                           </p:spTgt>
                                         </p:tgtEl>
@@ -8801,239 +8554,21 @@
                                   </p:childTnLst>
                                 </p:cTn>
                               </p:par>
-                            </p:childTnLst>
-                          </p:cTn>
-                        </p:par>
-                      </p:childTnLst>
-                    </p:cTn>
-                  </p:par>
-                  <p:par>
-                    <p:cTn id="7" fill="hold">
-                      <p:stCondLst>
-                        <p:cond delay="indefinite"/>
-                      </p:stCondLst>
-                      <p:childTnLst>
-                        <p:par>
-                          <p:cTn id="8" fill="hold">
-                            <p:stCondLst>
-                              <p:cond delay="0"/>
-                            </p:stCondLst>
-                            <p:childTnLst>
                               <p:par>
-                                <p:cTn id="9" presetID="1" presetClass="entr" presetSubtype="0" fill="hold" grpId="0" nodeType="clickEffect">
+                                <p:cTn id="7" presetID="1" presetClass="entr" presetSubtype="0" fill="hold" nodeType="withEffect">
                                   <p:stCondLst>
                                     <p:cond delay="0"/>
                                   </p:stCondLst>
                                   <p:childTnLst>
                                     <p:set>
                                       <p:cBhvr>
-                                        <p:cTn id="10" dur="1" fill="hold">
+                                        <p:cTn id="8" dur="1" fill="hold">
                                           <p:stCondLst>
                                             <p:cond delay="0"/>
                                           </p:stCondLst>
                                         </p:cTn>
                                         <p:tgtEl>
-                                          <p:spTgt spid="4">
-                                            <p:txEl>
-                                              <p:pRg st="1" end="1"/>
-                                            </p:txEl>
-                                          </p:spTgt>
-                                        </p:tgtEl>
-                                        <p:attrNameLst>
-                                          <p:attrName>style.visibility</p:attrName>
-                                        </p:attrNameLst>
-                                      </p:cBhvr>
-                                      <p:to>
-                                        <p:strVal val="visible"/>
-                                      </p:to>
-                                    </p:set>
-                                  </p:childTnLst>
-                                </p:cTn>
-                              </p:par>
-                            </p:childTnLst>
-                          </p:cTn>
-                        </p:par>
-                      </p:childTnLst>
-                    </p:cTn>
-                  </p:par>
-                  <p:par>
-                    <p:cTn id="11" fill="hold">
-                      <p:stCondLst>
-                        <p:cond delay="indefinite"/>
-                      </p:stCondLst>
-                      <p:childTnLst>
-                        <p:par>
-                          <p:cTn id="12" fill="hold">
-                            <p:stCondLst>
-                              <p:cond delay="0"/>
-                            </p:stCondLst>
-                            <p:childTnLst>
-                              <p:par>
-                                <p:cTn id="13" presetID="1" presetClass="entr" presetSubtype="0" fill="hold" grpId="0" nodeType="clickEffect">
-                                  <p:stCondLst>
-                                    <p:cond delay="0"/>
-                                  </p:stCondLst>
-                                  <p:childTnLst>
-                                    <p:set>
-                                      <p:cBhvr>
-                                        <p:cTn id="14" dur="1" fill="hold">
-                                          <p:stCondLst>
-                                            <p:cond delay="0"/>
-                                          </p:stCondLst>
-                                        </p:cTn>
-                                        <p:tgtEl>
-                                          <p:spTgt spid="4">
-                                            <p:txEl>
-                                              <p:pRg st="2" end="2"/>
-                                            </p:txEl>
-                                          </p:spTgt>
-                                        </p:tgtEl>
-                                        <p:attrNameLst>
-                                          <p:attrName>style.visibility</p:attrName>
-                                        </p:attrNameLst>
-                                      </p:cBhvr>
-                                      <p:to>
-                                        <p:strVal val="visible"/>
-                                      </p:to>
-                                    </p:set>
-                                  </p:childTnLst>
-                                </p:cTn>
-                              </p:par>
-                            </p:childTnLst>
-                          </p:cTn>
-                        </p:par>
-                      </p:childTnLst>
-                    </p:cTn>
-                  </p:par>
-                  <p:par>
-                    <p:cTn id="15" fill="hold">
-                      <p:stCondLst>
-                        <p:cond delay="indefinite"/>
-                      </p:stCondLst>
-                      <p:childTnLst>
-                        <p:par>
-                          <p:cTn id="16" fill="hold">
-                            <p:stCondLst>
-                              <p:cond delay="0"/>
-                            </p:stCondLst>
-                            <p:childTnLst>
-                              <p:par>
-                                <p:cTn id="17" presetID="1" presetClass="entr" presetSubtype="0" fill="hold" grpId="0" nodeType="clickEffect">
-                                  <p:stCondLst>
-                                    <p:cond delay="0"/>
-                                  </p:stCondLst>
-                                  <p:childTnLst>
-                                    <p:set>
-                                      <p:cBhvr>
-                                        <p:cTn id="18" dur="1" fill="hold">
-                                          <p:stCondLst>
-                                            <p:cond delay="0"/>
-                                          </p:stCondLst>
-                                        </p:cTn>
-                                        <p:tgtEl>
-                                          <p:spTgt spid="4">
-                                            <p:txEl>
-                                              <p:pRg st="3" end="3"/>
-                                            </p:txEl>
-                                          </p:spTgt>
-                                        </p:tgtEl>
-                                        <p:attrNameLst>
-                                          <p:attrName>style.visibility</p:attrName>
-                                        </p:attrNameLst>
-                                      </p:cBhvr>
-                                      <p:to>
-                                        <p:strVal val="visible"/>
-                                      </p:to>
-                                    </p:set>
-                                  </p:childTnLst>
-                                </p:cTn>
-                              </p:par>
-                            </p:childTnLst>
-                          </p:cTn>
-                        </p:par>
-                      </p:childTnLst>
-                    </p:cTn>
-                  </p:par>
-                  <p:par>
-                    <p:cTn id="19" fill="hold">
-                      <p:stCondLst>
-                        <p:cond delay="indefinite"/>
-                      </p:stCondLst>
-                      <p:childTnLst>
-                        <p:par>
-                          <p:cTn id="20" fill="hold">
-                            <p:stCondLst>
-                              <p:cond delay="0"/>
-                            </p:stCondLst>
-                            <p:childTnLst>
-                              <p:par>
-                                <p:cTn id="21" presetID="1" presetClass="entr" presetSubtype="0" fill="hold" grpId="0" nodeType="clickEffect">
-                                  <p:stCondLst>
-                                    <p:cond delay="0"/>
-                                  </p:stCondLst>
-                                  <p:childTnLst>
-                                    <p:set>
-                                      <p:cBhvr>
-                                        <p:cTn id="22" dur="1" fill="hold">
-                                          <p:stCondLst>
-                                            <p:cond delay="0"/>
-                                          </p:stCondLst>
-                                        </p:cTn>
-                                        <p:tgtEl>
-                                          <p:spTgt spid="4">
-                                            <p:txEl>
-                                              <p:pRg st="4" end="4"/>
-                                            </p:txEl>
-                                          </p:spTgt>
-                                        </p:tgtEl>
-                                        <p:attrNameLst>
-                                          <p:attrName>style.visibility</p:attrName>
-                                        </p:attrNameLst>
-                                      </p:cBhvr>
-                                      <p:to>
-                                        <p:strVal val="visible"/>
-                                      </p:to>
-                                    </p:set>
-                                  </p:childTnLst>
-                                </p:cTn>
-                              </p:par>
-                            </p:childTnLst>
-                          </p:cTn>
-                        </p:par>
-                      </p:childTnLst>
-                    </p:cTn>
-                  </p:par>
-                  <p:par>
-                    <p:cTn id="23" fill="hold">
-                      <p:stCondLst>
-                        <p:cond delay="indefinite"/>
-                      </p:stCondLst>
-                      <p:childTnLst>
-                        <p:par>
-                          <p:cTn id="24" fill="hold">
-                            <p:stCondLst>
-                              <p:cond delay="0"/>
-                            </p:stCondLst>
-                            <p:childTnLst>
-                              <p:par>
-                                <p:cTn id="25" presetID="1" presetClass="entr" presetSubtype="0" fill="hold" grpId="0" nodeType="clickEffect">
-                                  <p:stCondLst>
-                                    <p:cond delay="0"/>
-                                  </p:stCondLst>
-                                  <p:childTnLst>
-                                    <p:set>
-                                      <p:cBhvr>
-                                        <p:cTn id="26" dur="1" fill="hold">
-                                          <p:stCondLst>
-                                            <p:cond delay="0"/>
-                                          </p:stCondLst>
-                                        </p:cTn>
-                                        <p:tgtEl>
-                                          <p:spTgt spid="4">
-                                            <p:txEl>
-                                              <p:pRg st="5" end="5"/>
-                                            </p:txEl>
-                                          </p:spTgt>
+                                          <p:spTgt spid="1026"/>
                                         </p:tgtEl>
                                         <p:attrNameLst>
                                           <p:attrName>style.visibility</p:attrName>
@@ -9073,9 +8608,6 @@
         </p:cTn>
       </p:par>
     </p:tnLst>
-    <p:bldLst>
-      <p:bldP spid="4" grpId="0" build="p"/>
-    </p:bldLst>
   </p:timing>
 </p:sld>
 </file>
@@ -9931,852 +9463,6 @@
   <p:cSld>
     <p:spTree>
       <p:nvGrpSpPr>
-        <p:cNvPr id="1" name="Shape 601"/>
-        <p:cNvGrpSpPr/>
-        <p:nvPr/>
-      </p:nvGrpSpPr>
-      <p:grpSpPr>
-        <a:xfrm>
-          <a:off x="0" y="0"/>
-          <a:ext cx="0" cy="0"/>
-          <a:chOff x="0" y="0"/>
-          <a:chExt cx="0" cy="0"/>
-        </a:xfrm>
-      </p:grpSpPr>
-      <p:sp>
-        <p:nvSpPr>
-          <p:cNvPr id="602" name="Shape 602"/>
-          <p:cNvSpPr txBox="1">
-            <a:spLocks noGrp="1"/>
-          </p:cNvSpPr>
-          <p:nvPr>
-            <p:ph type="title"/>
-          </p:nvPr>
-        </p:nvSpPr>
-        <p:spPr>
-          <a:xfrm>
-            <a:off x="840432" y="274638"/>
-            <a:ext cx="7963100" cy="1143000"/>
-          </a:xfrm>
-          <a:prstGeom prst="rect">
-            <a:avLst/>
-          </a:prstGeom>
-          <a:noFill/>
-          <a:ln>
-            <a:noFill/>
-          </a:ln>
-        </p:spPr>
-        <p:txBody>
-          <a:bodyPr spcFirstLastPara="1" wrap="square" lIns="91425" tIns="45700" rIns="91425" bIns="45700" anchor="ctr" anchorCtr="0">
-            <a:noAutofit/>
-          </a:bodyPr>
-          <a:lstStyle/>
-          <a:p>
-            <a:pPr marL="0" marR="0" lvl="0" indent="0" rtl="0">
-              <a:spcBef>
-                <a:spcPts val="0"/>
-              </a:spcBef>
-              <a:spcAft>
-                <a:spcPts val="0"/>
-              </a:spcAft>
-              <a:buNone/>
-            </a:pPr>
-            <a:r>
-              <a:rPr lang="nl-NL" dirty="0">
-                <a:solidFill>
-                  <a:srgbClr val="000000"/>
-                </a:solidFill>
-              </a:rPr>
-              <a:t>State Time</a:t>
-            </a:r>
-            <a:endParaRPr sz="4000" i="0" u="none" strike="noStrike" cap="none" dirty="0">
-              <a:solidFill>
-                <a:srgbClr val="000000"/>
-              </a:solidFill>
-            </a:endParaRPr>
-          </a:p>
-        </p:txBody>
-      </p:sp>
-      <p:sp>
-        <p:nvSpPr>
-          <p:cNvPr id="640" name="Shape 640"/>
-          <p:cNvSpPr txBox="1">
-            <a:spLocks noGrp="1"/>
-          </p:cNvSpPr>
-          <p:nvPr>
-            <p:ph type="sldNum" sz="quarter" idx="12"/>
-          </p:nvPr>
-        </p:nvSpPr>
-        <p:spPr>
-          <a:xfrm>
-            <a:off x="8595360" y="6447551"/>
-            <a:ext cx="548640" cy="396240"/>
-          </a:xfrm>
-          <a:prstGeom prst="rect">
-            <a:avLst/>
-          </a:prstGeom>
-          <a:noFill/>
-          <a:ln>
-            <a:noFill/>
-          </a:ln>
-        </p:spPr>
-        <p:txBody>
-          <a:bodyPr spcFirstLastPara="1" wrap="square" lIns="91425" tIns="45700" rIns="91425" bIns="45700" anchor="t" anchorCtr="0">
-            <a:noAutofit/>
-          </a:bodyPr>
-          <a:lstStyle/>
-          <a:p>
-            <a:pPr marL="0" lvl="0" indent="0" rtl="0">
-              <a:spcBef>
-                <a:spcPts val="0"/>
-              </a:spcBef>
-              <a:spcAft>
-                <a:spcPts val="0"/>
-              </a:spcAft>
-              <a:buClr>
-                <a:srgbClr val="000000"/>
-              </a:buClr>
-              <a:buFont typeface="Arial"/>
-              <a:buNone/>
-            </a:pPr>
-            <a:fld id="{00000000-1234-1234-1234-123412341234}" type="slidenum">
-              <a:rPr lang="nl-NL"/>
-              <a:t>12</a:t>
-            </a:fld>
-            <a:endParaRPr dirty="0"/>
-          </a:p>
-        </p:txBody>
-      </p:sp>
-      <p:sp>
-        <p:nvSpPr>
-          <p:cNvPr id="47" name="Shape 646"/>
-          <p:cNvSpPr/>
-          <p:nvPr/>
-        </p:nvSpPr>
-        <p:spPr>
-          <a:xfrm>
-            <a:off x="1345543" y="2270696"/>
-            <a:ext cx="1200600" cy="840600"/>
-          </a:xfrm>
-          <a:prstGeom prst="ellipse">
-            <a:avLst/>
-          </a:prstGeom>
-          <a:solidFill>
-            <a:srgbClr val="E6EEEE"/>
-          </a:solidFill>
-          <a:ln w="25400" cap="flat" cmpd="sng">
-            <a:solidFill>
-              <a:srgbClr val="667E7E"/>
-            </a:solidFill>
-            <a:prstDash val="solid"/>
-            <a:round/>
-            <a:headEnd type="none" w="sm" len="sm"/>
-            <a:tailEnd type="none" w="sm" len="sm"/>
-          </a:ln>
-        </p:spPr>
-        <p:txBody>
-          <a:bodyPr spcFirstLastPara="1" wrap="square" lIns="91425" tIns="45700" rIns="91425" bIns="45700" anchor="ctr" anchorCtr="0">
-            <a:noAutofit/>
-          </a:bodyPr>
-          <a:lstStyle/>
-          <a:p>
-            <a:pPr marL="0" marR="0" lvl="0" indent="0" algn="ctr" rtl="0">
-              <a:spcBef>
-                <a:spcPts val="0"/>
-              </a:spcBef>
-              <a:spcAft>
-                <a:spcPts val="0"/>
-              </a:spcAft>
-              <a:buNone/>
-            </a:pPr>
-            <a:r>
-              <a:rPr lang="nl-NL" sz="1600" b="1" dirty="0" err="1">
-                <a:solidFill>
-                  <a:srgbClr val="3F3F3F"/>
-                </a:solidFill>
-                <a:latin typeface="Calibri"/>
-                <a:ea typeface="Calibri"/>
-                <a:cs typeface="Calibri"/>
-                <a:sym typeface="Calibri"/>
-              </a:rPr>
-              <a:t>Healthy</a:t>
-            </a:r>
-            <a:endParaRPr sz="1600" b="1" dirty="0">
-              <a:solidFill>
-                <a:srgbClr val="3F3F3F"/>
-              </a:solidFill>
-              <a:latin typeface="Calibri"/>
-              <a:ea typeface="Calibri"/>
-              <a:cs typeface="Calibri"/>
-              <a:sym typeface="Calibri"/>
-            </a:endParaRPr>
-          </a:p>
-        </p:txBody>
-      </p:sp>
-      <p:sp>
-        <p:nvSpPr>
-          <p:cNvPr id="48" name="Shape 647"/>
-          <p:cNvSpPr/>
-          <p:nvPr/>
-        </p:nvSpPr>
-        <p:spPr>
-          <a:xfrm>
-            <a:off x="3123543" y="2270696"/>
-            <a:ext cx="1200600" cy="840600"/>
-          </a:xfrm>
-          <a:prstGeom prst="ellipse">
-            <a:avLst/>
-          </a:prstGeom>
-          <a:solidFill>
-            <a:srgbClr val="E6EEEE"/>
-          </a:solidFill>
-          <a:ln w="25400" cap="flat" cmpd="sng">
-            <a:solidFill>
-              <a:srgbClr val="667E7E"/>
-            </a:solidFill>
-            <a:prstDash val="solid"/>
-            <a:round/>
-            <a:headEnd type="none" w="sm" len="sm"/>
-            <a:tailEnd type="none" w="sm" len="sm"/>
-          </a:ln>
-        </p:spPr>
-        <p:txBody>
-          <a:bodyPr spcFirstLastPara="1" wrap="square" lIns="91425" tIns="45700" rIns="91425" bIns="45700" anchor="ctr" anchorCtr="0">
-            <a:noAutofit/>
-          </a:bodyPr>
-          <a:lstStyle/>
-          <a:p>
-            <a:pPr marL="0" marR="0" lvl="0" indent="0" algn="ctr" rtl="0">
-              <a:spcBef>
-                <a:spcPts val="0"/>
-              </a:spcBef>
-              <a:spcAft>
-                <a:spcPts val="0"/>
-              </a:spcAft>
-              <a:buNone/>
-            </a:pPr>
-            <a:r>
-              <a:rPr lang="nl-NL" sz="1600" b="1" dirty="0">
-                <a:solidFill>
-                  <a:srgbClr val="3F3F3F"/>
-                </a:solidFill>
-                <a:latin typeface="Calibri"/>
-                <a:ea typeface="Calibri"/>
-                <a:cs typeface="Calibri"/>
-                <a:sym typeface="Calibri"/>
-              </a:rPr>
-              <a:t>Cancer</a:t>
-            </a:r>
-            <a:endParaRPr sz="1600" b="1" dirty="0">
-              <a:solidFill>
-                <a:srgbClr val="3F3F3F"/>
-              </a:solidFill>
-              <a:latin typeface="Calibri"/>
-              <a:ea typeface="Calibri"/>
-              <a:cs typeface="Calibri"/>
-              <a:sym typeface="Calibri"/>
-            </a:endParaRPr>
-          </a:p>
-        </p:txBody>
-      </p:sp>
-      <p:sp>
-        <p:nvSpPr>
-          <p:cNvPr id="49" name="Shape 648"/>
-          <p:cNvSpPr/>
-          <p:nvPr/>
-        </p:nvSpPr>
-        <p:spPr>
-          <a:xfrm>
-            <a:off x="5026233" y="2266078"/>
-            <a:ext cx="1200600" cy="840600"/>
-          </a:xfrm>
-          <a:prstGeom prst="ellipse">
-            <a:avLst/>
-          </a:prstGeom>
-          <a:solidFill>
-            <a:srgbClr val="E6EEEE"/>
-          </a:solidFill>
-          <a:ln w="25400" cap="flat" cmpd="sng">
-            <a:solidFill>
-              <a:srgbClr val="667E7E"/>
-            </a:solidFill>
-            <a:prstDash val="solid"/>
-            <a:round/>
-            <a:headEnd type="none" w="sm" len="sm"/>
-            <a:tailEnd type="none" w="sm" len="sm"/>
-          </a:ln>
-        </p:spPr>
-        <p:txBody>
-          <a:bodyPr spcFirstLastPara="1" wrap="square" lIns="91425" tIns="45700" rIns="91425" bIns="45700" anchor="ctr" anchorCtr="0">
-            <a:noAutofit/>
-          </a:bodyPr>
-          <a:lstStyle/>
-          <a:p>
-            <a:pPr marL="0" marR="0" lvl="0" indent="0" algn="ctr" rtl="0">
-              <a:spcBef>
-                <a:spcPts val="0"/>
-              </a:spcBef>
-              <a:spcAft>
-                <a:spcPts val="0"/>
-              </a:spcAft>
-              <a:buNone/>
-            </a:pPr>
-            <a:r>
-              <a:rPr lang="nl-NL" sz="1600" b="1" dirty="0" err="1">
-                <a:solidFill>
-                  <a:srgbClr val="3F3F3F"/>
-                </a:solidFill>
-                <a:latin typeface="Calibri"/>
-                <a:ea typeface="Calibri"/>
-                <a:cs typeface="Calibri"/>
-                <a:sym typeface="Calibri"/>
-              </a:rPr>
-              <a:t>Recur</a:t>
-            </a:r>
-            <a:endParaRPr sz="1600" b="1" dirty="0">
-              <a:solidFill>
-                <a:srgbClr val="3F3F3F"/>
-              </a:solidFill>
-              <a:latin typeface="Calibri"/>
-              <a:ea typeface="Calibri"/>
-              <a:cs typeface="Calibri"/>
-              <a:sym typeface="Calibri"/>
-            </a:endParaRPr>
-          </a:p>
-        </p:txBody>
-      </p:sp>
-      <p:cxnSp>
-        <p:nvCxnSpPr>
-          <p:cNvPr id="50" name="Shape 649"/>
-          <p:cNvCxnSpPr/>
-          <p:nvPr/>
-        </p:nvCxnSpPr>
-        <p:spPr>
-          <a:xfrm rot="16200000" flipH="1">
-            <a:off x="2834593" y="1381946"/>
-            <a:ext cx="600" cy="1778100"/>
-          </a:xfrm>
-          <a:prstGeom prst="curvedConnector3">
-            <a:avLst>
-              <a:gd name="adj1" fmla="val -26835667"/>
-            </a:avLst>
-          </a:prstGeom>
-          <a:noFill/>
-          <a:ln w="25400" cap="flat" cmpd="sng">
-            <a:solidFill>
-              <a:srgbClr val="3F3F3F"/>
-            </a:solidFill>
-            <a:prstDash val="solid"/>
-            <a:round/>
-            <a:headEnd type="none" w="sm" len="sm"/>
-            <a:tailEnd type="triangle" w="lg" len="lg"/>
-          </a:ln>
-        </p:spPr>
-      </p:cxnSp>
-      <p:cxnSp>
-        <p:nvCxnSpPr>
-          <p:cNvPr id="51" name="Shape 650"/>
-          <p:cNvCxnSpPr/>
-          <p:nvPr/>
-        </p:nvCxnSpPr>
-        <p:spPr>
-          <a:xfrm rot="16200000">
-            <a:off x="4672893" y="1317146"/>
-            <a:ext cx="4500" cy="1902600"/>
-          </a:xfrm>
-          <a:prstGeom prst="curvedConnector3">
-            <a:avLst>
-              <a:gd name="adj1" fmla="val 3136645"/>
-            </a:avLst>
-          </a:prstGeom>
-          <a:noFill/>
-          <a:ln w="25400" cap="flat" cmpd="sng">
-            <a:solidFill>
-              <a:srgbClr val="3F3F3F"/>
-            </a:solidFill>
-            <a:prstDash val="solid"/>
-            <a:round/>
-            <a:headEnd type="none" w="sm" len="sm"/>
-            <a:tailEnd type="triangle" w="lg" len="lg"/>
-          </a:ln>
-        </p:spPr>
-      </p:cxnSp>
-      <p:cxnSp>
-        <p:nvCxnSpPr>
-          <p:cNvPr id="53" name="Shape 652"/>
-          <p:cNvCxnSpPr/>
-          <p:nvPr/>
-        </p:nvCxnSpPr>
-        <p:spPr>
-          <a:xfrm rot="10800000" flipH="1">
-            <a:off x="1345543" y="2393800"/>
-            <a:ext cx="175824" cy="297197"/>
-          </a:xfrm>
-          <a:prstGeom prst="curvedConnector4">
-            <a:avLst>
-              <a:gd name="adj1" fmla="val -130016"/>
-              <a:gd name="adj2" fmla="val 218340"/>
-            </a:avLst>
-          </a:prstGeom>
-          <a:noFill/>
-          <a:ln w="25400" cap="flat" cmpd="sng">
-            <a:solidFill>
-              <a:srgbClr val="3F3F3F"/>
-            </a:solidFill>
-            <a:prstDash val="solid"/>
-            <a:round/>
-            <a:headEnd type="none" w="sm" len="sm"/>
-            <a:tailEnd type="triangle" w="lg" len="lg"/>
-          </a:ln>
-        </p:spPr>
-      </p:cxnSp>
-      <p:cxnSp>
-        <p:nvCxnSpPr>
-          <p:cNvPr id="54" name="Shape 653"/>
-          <p:cNvCxnSpPr/>
-          <p:nvPr/>
-        </p:nvCxnSpPr>
-        <p:spPr>
-          <a:xfrm rot="10800000" flipH="1" flipV="1">
-            <a:off x="3123543" y="2690995"/>
-            <a:ext cx="175824" cy="297197"/>
-          </a:xfrm>
-          <a:prstGeom prst="curvedConnector4">
-            <a:avLst>
-              <a:gd name="adj1" fmla="val -130016"/>
-              <a:gd name="adj2" fmla="val 218340"/>
-            </a:avLst>
-          </a:prstGeom>
-          <a:noFill/>
-          <a:ln w="25400" cap="flat" cmpd="sng">
-            <a:solidFill>
-              <a:srgbClr val="3F3F3F"/>
-            </a:solidFill>
-            <a:prstDash val="solid"/>
-            <a:round/>
-            <a:headEnd type="none" w="sm" len="sm"/>
-            <a:tailEnd type="triangle" w="lg" len="lg"/>
-          </a:ln>
-        </p:spPr>
-      </p:cxnSp>
-      <p:cxnSp>
-        <p:nvCxnSpPr>
-          <p:cNvPr id="55" name="Shape 654"/>
-          <p:cNvCxnSpPr/>
-          <p:nvPr/>
-        </p:nvCxnSpPr>
-        <p:spPr>
-          <a:xfrm rot="10800000" flipH="1" flipV="1">
-            <a:off x="5026233" y="2686377"/>
-            <a:ext cx="175824" cy="297197"/>
-          </a:xfrm>
-          <a:prstGeom prst="curvedConnector4">
-            <a:avLst>
-              <a:gd name="adj1" fmla="val -130016"/>
-              <a:gd name="adj2" fmla="val 218340"/>
-            </a:avLst>
-          </a:prstGeom>
-          <a:noFill/>
-          <a:ln w="25400" cap="flat" cmpd="sng">
-            <a:solidFill>
-              <a:srgbClr val="3F3F3F"/>
-            </a:solidFill>
-            <a:prstDash val="solid"/>
-            <a:round/>
-            <a:headEnd type="none" w="sm" len="sm"/>
-            <a:tailEnd type="triangle" w="lg" len="lg"/>
-          </a:ln>
-        </p:spPr>
-      </p:cxnSp>
-      <p:sp>
-        <p:nvSpPr>
-          <p:cNvPr id="63" name="Shape 648">
-            <a:extLst>
-              <a:ext uri="{FF2B5EF4-FFF2-40B4-BE49-F238E27FC236}">
-                <a16:creationId xmlns:a16="http://schemas.microsoft.com/office/drawing/2014/main" id="{717BA8C9-D866-EB40-BA08-4982E37CCE9B}"/>
-              </a:ext>
-            </a:extLst>
-          </p:cNvPr>
-          <p:cNvSpPr/>
-          <p:nvPr/>
-        </p:nvSpPr>
-        <p:spPr>
-          <a:xfrm>
-            <a:off x="6905933" y="2266078"/>
-            <a:ext cx="1200600" cy="840600"/>
-          </a:xfrm>
-          <a:prstGeom prst="ellipse">
-            <a:avLst/>
-          </a:prstGeom>
-          <a:solidFill>
-            <a:srgbClr val="E6EEEE"/>
-          </a:solidFill>
-          <a:ln w="25400" cap="flat" cmpd="sng">
-            <a:solidFill>
-              <a:srgbClr val="667E7E"/>
-            </a:solidFill>
-            <a:prstDash val="solid"/>
-            <a:round/>
-            <a:headEnd type="none" w="sm" len="sm"/>
-            <a:tailEnd type="none" w="sm" len="sm"/>
-          </a:ln>
-        </p:spPr>
-        <p:txBody>
-          <a:bodyPr spcFirstLastPara="1" wrap="square" lIns="91425" tIns="45700" rIns="91425" bIns="45700" anchor="ctr" anchorCtr="0">
-            <a:noAutofit/>
-          </a:bodyPr>
-          <a:lstStyle/>
-          <a:p>
-            <a:pPr marL="0" marR="0" lvl="0" indent="0" algn="ctr" rtl="0">
-              <a:spcBef>
-                <a:spcPts val="0"/>
-              </a:spcBef>
-              <a:spcAft>
-                <a:spcPts val="0"/>
-              </a:spcAft>
-              <a:buNone/>
-            </a:pPr>
-            <a:r>
-              <a:rPr lang="nl-NL" sz="1600" b="1" dirty="0">
-                <a:solidFill>
-                  <a:srgbClr val="3F3F3F"/>
-                </a:solidFill>
-                <a:latin typeface="Calibri"/>
-                <a:ea typeface="Calibri"/>
-                <a:cs typeface="Calibri"/>
-                <a:sym typeface="Calibri"/>
-              </a:rPr>
-              <a:t>Dead</a:t>
-            </a:r>
-            <a:endParaRPr sz="1600" b="1" dirty="0">
-              <a:solidFill>
-                <a:srgbClr val="3F3F3F"/>
-              </a:solidFill>
-              <a:latin typeface="Calibri"/>
-              <a:ea typeface="Calibri"/>
-              <a:cs typeface="Calibri"/>
-              <a:sym typeface="Calibri"/>
-            </a:endParaRPr>
-          </a:p>
-        </p:txBody>
-      </p:sp>
-      <p:sp>
-        <p:nvSpPr>
-          <p:cNvPr id="6" name="Right Brace 5">
-            <a:extLst>
-              <a:ext uri="{FF2B5EF4-FFF2-40B4-BE49-F238E27FC236}">
-                <a16:creationId xmlns:a16="http://schemas.microsoft.com/office/drawing/2014/main" id="{A9A6508D-CC88-914F-88E1-E9ACFD1730C3}"/>
-              </a:ext>
-            </a:extLst>
-          </p:cNvPr>
-          <p:cNvSpPr/>
-          <p:nvPr/>
-        </p:nvSpPr>
-        <p:spPr>
-          <a:xfrm>
-            <a:off x="6377502" y="2025570"/>
-            <a:ext cx="325012" cy="1412111"/>
-          </a:xfrm>
-          <a:prstGeom prst="rightBrace">
-            <a:avLst/>
-          </a:prstGeom>
-        </p:spPr>
-        <p:style>
-          <a:lnRef idx="1">
-            <a:schemeClr val="accent1"/>
-          </a:lnRef>
-          <a:fillRef idx="0">
-            <a:schemeClr val="accent1"/>
-          </a:fillRef>
-          <a:effectRef idx="0">
-            <a:schemeClr val="accent1"/>
-          </a:effectRef>
-          <a:fontRef idx="minor">
-            <a:schemeClr val="tx1"/>
-          </a:fontRef>
-        </p:style>
-        <p:txBody>
-          <a:bodyPr rtlCol="0" anchor="ctr"/>
-          <a:lstStyle/>
-          <a:p>
-            <a:pPr algn="ctr"/>
-            <a:endParaRPr lang="en-US"/>
-          </a:p>
-        </p:txBody>
-      </p:sp>
-      <p:sp>
-        <p:nvSpPr>
-          <p:cNvPr id="7" name="TextBox 6">
-            <a:extLst>
-              <a:ext uri="{FF2B5EF4-FFF2-40B4-BE49-F238E27FC236}">
-                <a16:creationId xmlns:a16="http://schemas.microsoft.com/office/drawing/2014/main" id="{F8554EC1-D5B9-0A4F-8723-C7833CA25D76}"/>
-              </a:ext>
-            </a:extLst>
-          </p:cNvPr>
-          <p:cNvSpPr txBox="1"/>
-          <p:nvPr/>
-        </p:nvSpPr>
-        <p:spPr>
-          <a:xfrm>
-            <a:off x="1808339" y="1691514"/>
-            <a:ext cx="1835759" cy="369332"/>
-          </a:xfrm>
-          <a:prstGeom prst="rect">
-            <a:avLst/>
-          </a:prstGeom>
-          <a:noFill/>
-        </p:spPr>
-        <p:txBody>
-          <a:bodyPr wrap="none" rtlCol="0">
-            <a:spAutoFit/>
-          </a:bodyPr>
-          <a:lstStyle/>
-          <a:p>
-            <a:r>
-              <a:rPr lang="en-US" dirty="0"/>
-              <a:t>f(model time)</a:t>
-            </a:r>
-          </a:p>
-        </p:txBody>
-      </p:sp>
-      <p:sp>
-        <p:nvSpPr>
-          <p:cNvPr id="64" name="TextBox 63">
-            <a:extLst>
-              <a:ext uri="{FF2B5EF4-FFF2-40B4-BE49-F238E27FC236}">
-                <a16:creationId xmlns:a16="http://schemas.microsoft.com/office/drawing/2014/main" id="{98F6581F-8BDF-7D4C-9D09-90FD5179B082}"/>
-              </a:ext>
-            </a:extLst>
-          </p:cNvPr>
-          <p:cNvSpPr txBox="1"/>
-          <p:nvPr/>
-        </p:nvSpPr>
-        <p:spPr>
-          <a:xfrm>
-            <a:off x="3894910" y="1691514"/>
-            <a:ext cx="1653017" cy="369332"/>
-          </a:xfrm>
-          <a:prstGeom prst="rect">
-            <a:avLst/>
-          </a:prstGeom>
-          <a:noFill/>
-        </p:spPr>
-        <p:txBody>
-          <a:bodyPr wrap="none" rtlCol="0">
-            <a:spAutoFit/>
-          </a:bodyPr>
-          <a:lstStyle/>
-          <a:p>
-            <a:r>
-              <a:rPr lang="en-US" dirty="0"/>
-              <a:t>f(state time)</a:t>
-            </a:r>
-          </a:p>
-        </p:txBody>
-      </p:sp>
-      <p:sp>
-        <p:nvSpPr>
-          <p:cNvPr id="8" name="TextBox 7">
-            <a:extLst>
-              <a:ext uri="{FF2B5EF4-FFF2-40B4-BE49-F238E27FC236}">
-                <a16:creationId xmlns:a16="http://schemas.microsoft.com/office/drawing/2014/main" id="{69F2D24B-FA25-4547-92AD-497B42119E1B}"/>
-              </a:ext>
-            </a:extLst>
-          </p:cNvPr>
-          <p:cNvSpPr txBox="1"/>
-          <p:nvPr/>
-        </p:nvSpPr>
-        <p:spPr>
-          <a:xfrm>
-            <a:off x="2684745" y="3976527"/>
-            <a:ext cx="2078197" cy="461665"/>
-          </a:xfrm>
-          <a:prstGeom prst="rect">
-            <a:avLst/>
-          </a:prstGeom>
-          <a:noFill/>
-        </p:spPr>
-        <p:txBody>
-          <a:bodyPr wrap="none" rtlCol="0">
-            <a:spAutoFit/>
-          </a:bodyPr>
-          <a:lstStyle/>
-          <a:p>
-            <a:pPr algn="ctr"/>
-            <a:r>
-              <a:rPr lang="en-US" sz="2400" dirty="0"/>
-              <a:t>Tunnel state</a:t>
-            </a:r>
-          </a:p>
-        </p:txBody>
-      </p:sp>
-      <p:cxnSp>
-        <p:nvCxnSpPr>
-          <p:cNvPr id="10" name="Straight Arrow Connector 9">
-            <a:extLst>
-              <a:ext uri="{FF2B5EF4-FFF2-40B4-BE49-F238E27FC236}">
-                <a16:creationId xmlns:a16="http://schemas.microsoft.com/office/drawing/2014/main" id="{F17790A9-3CC1-7D46-A683-CB8930C8756E}"/>
-              </a:ext>
-            </a:extLst>
-          </p:cNvPr>
-          <p:cNvCxnSpPr>
-            <a:cxnSpLocks/>
-          </p:cNvCxnSpPr>
-          <p:nvPr/>
-        </p:nvCxnSpPr>
-        <p:spPr>
-          <a:xfrm flipV="1">
-            <a:off x="3726022" y="3220300"/>
-            <a:ext cx="0" cy="659369"/>
-          </a:xfrm>
-          <a:prstGeom prst="straightConnector1">
-            <a:avLst/>
-          </a:prstGeom>
-          <a:ln w="25400">
-            <a:solidFill>
-              <a:schemeClr val="tx1"/>
-            </a:solidFill>
-            <a:tailEnd type="triangle"/>
-          </a:ln>
-        </p:spPr>
-        <p:style>
-          <a:lnRef idx="1">
-            <a:schemeClr val="accent1"/>
-          </a:lnRef>
-          <a:fillRef idx="0">
-            <a:schemeClr val="accent1"/>
-          </a:fillRef>
-          <a:effectRef idx="0">
-            <a:schemeClr val="accent1"/>
-          </a:effectRef>
-          <a:fontRef idx="minor">
-            <a:schemeClr val="tx1"/>
-          </a:fontRef>
-        </p:style>
-      </p:cxnSp>
-    </p:spTree>
-    <p:extLst>
-      <p:ext uri="{BB962C8B-B14F-4D97-AF65-F5344CB8AC3E}">
-        <p14:creationId xmlns:p14="http://schemas.microsoft.com/office/powerpoint/2010/main" val="738698577"/>
-      </p:ext>
-    </p:extLst>
-  </p:cSld>
-  <p:clrMapOvr>
-    <a:masterClrMapping/>
-  </p:clrMapOvr>
-  <p:timing>
-    <p:tnLst>
-      <p:par>
-        <p:cTn id="1" dur="indefinite" restart="never" nodeType="tmRoot">
-          <p:childTnLst>
-            <p:seq concurrent="1" nextAc="seek">
-              <p:cTn id="2" dur="indefinite" nodeType="mainSeq">
-                <p:childTnLst>
-                  <p:par>
-                    <p:cTn id="3" fill="hold">
-                      <p:stCondLst>
-                        <p:cond delay="indefinite"/>
-                      </p:stCondLst>
-                      <p:childTnLst>
-                        <p:par>
-                          <p:cTn id="4" fill="hold">
-                            <p:stCondLst>
-                              <p:cond delay="0"/>
-                            </p:stCondLst>
-                            <p:childTnLst>
-                              <p:par>
-                                <p:cTn id="5" presetID="1" presetClass="entr" presetSubtype="0" fill="hold" grpId="0" nodeType="clickEffect">
-                                  <p:stCondLst>
-                                    <p:cond delay="0"/>
-                                  </p:stCondLst>
-                                  <p:childTnLst>
-                                    <p:set>
-                                      <p:cBhvr>
-                                        <p:cTn id="6" dur="1" fill="hold">
-                                          <p:stCondLst>
-                                            <p:cond delay="0"/>
-                                          </p:stCondLst>
-                                        </p:cTn>
-                                        <p:tgtEl>
-                                          <p:spTgt spid="8"/>
-                                        </p:tgtEl>
-                                        <p:attrNameLst>
-                                          <p:attrName>style.visibility</p:attrName>
-                                        </p:attrNameLst>
-                                      </p:cBhvr>
-                                      <p:to>
-                                        <p:strVal val="visible"/>
-                                      </p:to>
-                                    </p:set>
-                                  </p:childTnLst>
-                                </p:cTn>
-                              </p:par>
-                              <p:par>
-                                <p:cTn id="7" presetID="1" presetClass="entr" presetSubtype="0" fill="hold" nodeType="withEffect">
-                                  <p:stCondLst>
-                                    <p:cond delay="0"/>
-                                  </p:stCondLst>
-                                  <p:childTnLst>
-                                    <p:set>
-                                      <p:cBhvr>
-                                        <p:cTn id="8" dur="1" fill="hold">
-                                          <p:stCondLst>
-                                            <p:cond delay="0"/>
-                                          </p:stCondLst>
-                                        </p:cTn>
-                                        <p:tgtEl>
-                                          <p:spTgt spid="10"/>
-                                        </p:tgtEl>
-                                        <p:attrNameLst>
-                                          <p:attrName>style.visibility</p:attrName>
-                                        </p:attrNameLst>
-                                      </p:cBhvr>
-                                      <p:to>
-                                        <p:strVal val="visible"/>
-                                      </p:to>
-                                    </p:set>
-                                  </p:childTnLst>
-                                </p:cTn>
-                              </p:par>
-                            </p:childTnLst>
-                          </p:cTn>
-                        </p:par>
-                      </p:childTnLst>
-                    </p:cTn>
-                  </p:par>
-                </p:childTnLst>
-              </p:cTn>
-              <p:prevCondLst>
-                <p:cond evt="onPrev" delay="0">
-                  <p:tgtEl>
-                    <p:sldTgt/>
-                  </p:tgtEl>
-                </p:cond>
-              </p:prevCondLst>
-              <p:nextCondLst>
-                <p:cond evt="onNext" delay="0">
-                  <p:tgtEl>
-                    <p:sldTgt/>
-                  </p:tgtEl>
-                </p:cond>
-              </p:nextCondLst>
-            </p:seq>
-          </p:childTnLst>
-        </p:cTn>
-      </p:par>
-    </p:tnLst>
-    <p:bldLst>
-      <p:bldP spid="8" grpId="0"/>
-    </p:bldLst>
-  </p:timing>
-</p:sld>
-</file>
-
-<file path=ppt/slides/slide13.xml><?xml version="1.0" encoding="utf-8"?>
-<p:sld xmlns:a="http://schemas.openxmlformats.org/drawingml/2006/main" xmlns:r="http://schemas.openxmlformats.org/officeDocument/2006/relationships" xmlns:p="http://schemas.openxmlformats.org/presentationml/2006/main">
-  <p:cSld>
-    <p:spTree>
-      <p:nvGrpSpPr>
         <p:cNvPr id="1" name=""/>
         <p:cNvGrpSpPr/>
         <p:nvPr/>
@@ -12099,7 +10785,7 @@
                 </a:solidFill>
               </a:rPr>
               <a:pPr eaLnBrk="1" hangingPunct="1"/>
-              <a:t>13</a:t>
+              <a:t>12</a:t>
             </a:fld>
             <a:endParaRPr lang="en-US" dirty="0">
               <a:solidFill>
@@ -12164,7 +10850,7 @@
 </p:sld>
 </file>
 
-<file path=ppt/slides/slide14.xml><?xml version="1.0" encoding="utf-8"?>
+<file path=ppt/slides/slide13.xml><?xml version="1.0" encoding="utf-8"?>
 <p:sld xmlns:a="http://schemas.openxmlformats.org/drawingml/2006/main" xmlns:r="http://schemas.openxmlformats.org/officeDocument/2006/relationships" xmlns:p="http://schemas.openxmlformats.org/presentationml/2006/main">
   <p:cSld>
     <p:spTree>
@@ -12477,7 +11163,7 @@
           <a:p>
             <a:fld id="{0798D939-2D9E-2142-A80A-FFDECD1E5A9B}" type="slidenum">
               <a:rPr lang="en-US" smtClean="0"/>
-              <a:t>14</a:t>
+              <a:t>13</a:t>
             </a:fld>
             <a:endParaRPr lang="en-US"/>
           </a:p>
@@ -12496,7 +11182,7 @@
 </p:sld>
 </file>
 
-<file path=ppt/slides/slide15.xml><?xml version="1.0" encoding="utf-8"?>
+<file path=ppt/slides/slide14.xml><?xml version="1.0" encoding="utf-8"?>
 <p:sld xmlns:a="http://schemas.openxmlformats.org/drawingml/2006/main" xmlns:r="http://schemas.openxmlformats.org/officeDocument/2006/relationships" xmlns:p="http://schemas.openxmlformats.org/presentationml/2006/main">
   <p:cSld>
     <p:spTree>
@@ -12553,7 +11239,7 @@
             </a:pPr>
             <a:fld id="{00000000-1234-1234-1234-123412341234}" type="slidenum">
               <a:rPr lang="nl-NL"/>
-              <a:t>15</a:t>
+              <a:t>14</a:t>
             </a:fld>
             <a:endParaRPr/>
           </a:p>
@@ -12642,7 +11328,7 @@
 </p:sld>
 </file>
 
-<file path=ppt/slides/slide16.xml><?xml version="1.0" encoding="utf-8"?>
+<file path=ppt/slides/slide15.xml><?xml version="1.0" encoding="utf-8"?>
 <p:sld xmlns:a="http://schemas.openxmlformats.org/drawingml/2006/main" xmlns:r="http://schemas.openxmlformats.org/officeDocument/2006/relationships" xmlns:p="http://schemas.openxmlformats.org/presentationml/2006/main">
   <p:cSld>
     <p:spTree>
@@ -12676,7 +11362,7 @@
           <a:p>
             <a:fld id="{6F6CFCF5-3E37-0F40-BEC2-1413134B0080}" type="slidenum">
               <a:rPr lang="en-US" smtClean="0"/>
-              <a:t>16</a:t>
+              <a:t>15</a:t>
             </a:fld>
             <a:endParaRPr lang="en-US"/>
           </a:p>
@@ -12695,7 +11381,7 @@
 </p:sld>
 </file>
 
-<file path=ppt/slides/slide17.xml><?xml version="1.0" encoding="utf-8"?>
+<file path=ppt/slides/slide16.xml><?xml version="1.0" encoding="utf-8"?>
 <p:sld xmlns:a="http://schemas.openxmlformats.org/drawingml/2006/main" xmlns:r="http://schemas.openxmlformats.org/officeDocument/2006/relationships" xmlns:p="http://schemas.openxmlformats.org/presentationml/2006/main">
   <p:cSld>
     <p:spTree>
@@ -12756,7 +11442,7 @@
             </a:pPr>
             <a:fld id="{00000000-1234-1234-1234-123412341234}" type="slidenum">
               <a:rPr lang="nl-NL"/>
-              <a:t>17</a:t>
+              <a:t>16</a:t>
             </a:fld>
             <a:endParaRPr/>
           </a:p>
@@ -12820,8 +11506,8 @@
           </a:p>
         </p:txBody>
       </p:sp>
-      <mc:AlternateContent xmlns:mc="http://schemas.openxmlformats.org/markup-compatibility/2006">
-        <mc:Choice xmlns:a14="http://schemas.microsoft.com/office/drawing/2010/main" Requires="a14">
+      <mc:AlternateContent xmlns:mc="http://schemas.openxmlformats.org/markup-compatibility/2006" xmlns:a14="http://schemas.microsoft.com/office/drawing/2010/main">
+        <mc:Choice Requires="a14">
           <p:sp>
             <p:nvSpPr>
               <p:cNvPr id="3" name="Content Placeholder 2">
@@ -12931,7 +11617,7 @@
             </p:txBody>
           </p:sp>
         </mc:Choice>
-        <mc:Fallback>
+        <mc:Fallback xmlns="">
           <p:sp>
             <p:nvSpPr>
               <p:cNvPr id="3" name="Content Placeholder 2">
@@ -13154,13 +11840,7 @@
           <a:p>
             <a:r>
               <a:rPr lang="en-US" sz="2400" dirty="0"/>
-              <a:t>Markov models are typically run as cohorts with a single start age (may represent a narrow age range)</a:t>
-            </a:r>
-          </a:p>
-          <a:p>
-            <a:r>
-              <a:rPr lang="en-US" sz="2400" dirty="0"/>
-              <a:t>Transition probabilities often depend on age</a:t>
+              <a:t>Transition probabilities often depend on time since model start</a:t>
             </a:r>
           </a:p>
           <a:p>
@@ -13178,12 +11858,19 @@
             </a:r>
           </a:p>
           <a:p>
+            <a:pPr lvl="1"/>
+            <a:endParaRPr lang="en-US" sz="2400" dirty="0"/>
+          </a:p>
+          <a:p>
             <a:r>
               <a:rPr lang="en-US" sz="2400" dirty="0"/>
               <a:t>In other words, matrix P is not the same every cycle</a:t>
             </a:r>
           </a:p>
           <a:p>
+            <a:endParaRPr lang="en-US" sz="2400" dirty="0"/>
+          </a:p>
+          <a:p>
             <a:r>
               <a:rPr lang="en-US" sz="2400" dirty="0"/>
               <a:t>Replace matrix P with matrices P</a:t>
@@ -13194,7 +11881,7 @@
             </a:r>
             <a:r>
               <a:rPr lang="en-US" sz="2400" dirty="0"/>
-              <a:t>, where t is a proxy for age</a:t>
+              <a:t>, where t is time since model start</a:t>
             </a:r>
           </a:p>
         </p:txBody>
@@ -13938,7 +12625,7 @@
           <a:p>
             <a:r>
               <a:rPr lang="en-US" sz="2400" dirty="0"/>
-              <a:t>Many transition probabilities depend time since an event, not age</a:t>
+              <a:t>Many transition probabilities depend on model history, not time since model start </a:t>
             </a:r>
           </a:p>
           <a:p>
@@ -14130,193 +12817,10 @@
       </p:grpSpPr>
       <p:sp>
         <p:nvSpPr>
-          <p:cNvPr id="2" name="Title 1"/>
-          <p:cNvSpPr>
-            <a:spLocks noGrp="1"/>
-          </p:cNvSpPr>
-          <p:nvPr>
-            <p:ph type="title"/>
-          </p:nvPr>
-        </p:nvSpPr>
-        <p:spPr/>
-        <p:txBody>
-          <a:bodyPr/>
-          <a:lstStyle/>
-          <a:p>
-            <a:r>
-              <a:rPr lang="en-US" dirty="0"/>
-              <a:t>Time-Dependent Probabilities</a:t>
-            </a:r>
-          </a:p>
-        </p:txBody>
-      </p:sp>
-      <mc:AlternateContent xmlns:mc="http://schemas.openxmlformats.org/markup-compatibility/2006">
-        <mc:Choice xmlns:a14="http://schemas.microsoft.com/office/drawing/2010/main" Requires="a14">
-          <p:sp>
-            <p:nvSpPr>
-              <p:cNvPr id="3" name="Content Placeholder 2"/>
-              <p:cNvSpPr>
-                <a:spLocks noGrp="1"/>
-              </p:cNvSpPr>
-              <p:nvPr>
-                <p:ph idx="1"/>
-              </p:nvPr>
-            </p:nvSpPr>
-            <p:spPr/>
-            <p:txBody>
-              <a:bodyPr>
-                <a:noAutofit/>
-              </a:bodyPr>
-              <a:lstStyle/>
-              <a:p>
-                <a:r>
-                  <a:rPr lang="en-US" sz="2000" dirty="0"/>
-                  <a:t>The matrix P can be replaced with P</a:t>
-                </a:r>
-                <a:r>
-                  <a:rPr lang="en-US" sz="2000" baseline="-25000" dirty="0"/>
-                  <a:t>t</a:t>
-                </a:r>
-                <a:r>
-                  <a:rPr lang="en-US" sz="2000" dirty="0"/>
-                  <a:t> as long as the time-dependent risk pertains to the starting cohort</a:t>
-                </a:r>
-              </a:p>
-              <a:p>
-                <a:pPr lvl="1"/>
-                <a:r>
-                  <a:rPr lang="en-US" dirty="0"/>
-                  <a:t>E.g., Cohort of newly diagnosed cancer patients</a:t>
-                </a:r>
-              </a:p>
-              <a:p>
-                <a:endParaRPr lang="en-US" sz="2000" dirty="0"/>
-              </a:p>
-              <a:p>
-                <a:r>
-                  <a:rPr lang="en-US" sz="2000" dirty="0"/>
-                  <a:t>If transition probabilities depend on time spent in a state that is not the initial state, replacing </a:t>
-                </a:r>
-                <a14:m>
-                  <m:oMath xmlns:m="http://schemas.openxmlformats.org/officeDocument/2006/math">
-                    <m:r>
-                      <a:rPr lang="es-ES" sz="2000" i="1">
-                        <a:latin typeface="Cambria Math" panose="02040503050406030204" pitchFamily="18" charset="0"/>
-                      </a:rPr>
-                      <m:t>𝑃</m:t>
-                    </m:r>
-                  </m:oMath>
-                </a14:m>
-                <a:r>
-                  <a:rPr lang="en-US" sz="2000" dirty="0"/>
-                  <a:t> with </a:t>
-                </a:r>
-                <a14:m>
-                  <m:oMath xmlns:m="http://schemas.openxmlformats.org/officeDocument/2006/math">
-                    <m:sSub>
-                      <m:sSubPr>
-                        <m:ctrlPr>
-                          <a:rPr lang="es-ES" sz="2000" i="1">
-                            <a:latin typeface="Cambria Math" panose="02040503050406030204" pitchFamily="18" charset="0"/>
-                          </a:rPr>
-                        </m:ctrlPr>
-                      </m:sSubPr>
-                      <m:e>
-                        <m:r>
-                          <a:rPr lang="es-ES" sz="2000" i="1">
-                            <a:latin typeface="Cambria Math" panose="02040503050406030204" pitchFamily="18" charset="0"/>
-                          </a:rPr>
-                          <m:t>𝑃</m:t>
-                        </m:r>
-                      </m:e>
-                      <m:sub>
-                        <m:r>
-                          <a:rPr lang="es-ES" sz="2000" i="1">
-                            <a:latin typeface="Cambria Math" panose="02040503050406030204" pitchFamily="18" charset="0"/>
-                          </a:rPr>
-                          <m:t>𝑡</m:t>
-                        </m:r>
-                      </m:sub>
-                    </m:sSub>
-                    <m:r>
-                      <a:rPr lang="es-ES" sz="2000" b="0" i="0" smtClean="0">
-                        <a:latin typeface="Cambria Math" panose="02040503050406030204" pitchFamily="18" charset="0"/>
-                      </a:rPr>
-                      <m:t> </m:t>
-                    </m:r>
-                  </m:oMath>
-                </a14:m>
-                <a:r>
-                  <a:rPr lang="en-US" sz="2000" dirty="0"/>
-                  <a:t>does not work</a:t>
-                </a:r>
-              </a:p>
-              <a:p>
-                <a:pPr lvl="1"/>
-                <a:r>
-                  <a:rPr lang="en-US" dirty="0"/>
-                  <a:t>E.g., Cohort of healthy patients at risk for cancer, but once cancer is diagnosed the risk of recurrence depends on time since diagnosis</a:t>
-                </a:r>
-              </a:p>
-              <a:p>
-                <a:endParaRPr lang="en-US" sz="2000" dirty="0"/>
-              </a:p>
-              <a:p>
-                <a:r>
-                  <a:rPr lang="en-US" sz="2000" dirty="0"/>
-                  <a:t>Solution?</a:t>
-                </a:r>
-              </a:p>
-              <a:p>
-                <a:pPr lvl="1"/>
-                <a:r>
-                  <a:rPr lang="en-US" sz="1800" dirty="0"/>
-                  <a:t>Create “tunnel” states</a:t>
-                </a:r>
-              </a:p>
-            </p:txBody>
-          </p:sp>
-        </mc:Choice>
-        <mc:Fallback>
-          <p:sp>
-            <p:nvSpPr>
-              <p:cNvPr id="3" name="Content Placeholder 2"/>
-              <p:cNvSpPr>
-                <a:spLocks noGrp="1" noRot="1" noChangeAspect="1" noMove="1" noResize="1" noEditPoints="1" noAdjustHandles="1" noChangeArrowheads="1" noChangeShapeType="1" noTextEdit="1"/>
-              </p:cNvSpPr>
-              <p:nvPr>
-                <p:ph idx="1"/>
-              </p:nvPr>
-            </p:nvSpPr>
-            <p:spPr>
-              <a:blipFill>
-                <a:blip r:embed="rId2"/>
-                <a:stretch>
-                  <a:fillRect t="-763"/>
-                </a:stretch>
-              </a:blipFill>
-            </p:spPr>
-            <p:txBody>
-              <a:bodyPr/>
-              <a:lstStyle/>
-              <a:p>
-                <a:r>
-                  <a:rPr lang="en-US">
-                    <a:noFill/>
-                  </a:rPr>
-                  <a:t> </a:t>
-                </a:r>
-              </a:p>
-            </p:txBody>
-          </p:sp>
-        </mc:Fallback>
-      </mc:AlternateContent>
-      <p:sp>
-        <p:nvSpPr>
-          <p:cNvPr id="4" name="Slide Number Placeholder 3">
+          <p:cNvPr id="2" name="Title 1">
             <a:extLst>
               <a:ext uri="{FF2B5EF4-FFF2-40B4-BE49-F238E27FC236}">
-                <a16:creationId xmlns:a16="http://schemas.microsoft.com/office/drawing/2014/main" id="{488FFA15-08BF-3249-898C-43719AA1A524}"/>
+                <a16:creationId xmlns:a16="http://schemas.microsoft.com/office/drawing/2014/main" id="{194DCA39-1E19-0848-8B28-3E7D84B3BB94}"/>
               </a:ext>
             </a:extLst>
           </p:cNvPr>
@@ -14324,111 +12828,1584 @@
             <a:spLocks noGrp="1"/>
           </p:cNvSpPr>
           <p:nvPr>
+            <p:ph type="title"/>
+          </p:nvPr>
+        </p:nvSpPr>
+        <p:spPr/>
+        <p:txBody>
+          <a:bodyPr/>
+          <a:lstStyle/>
+          <a:p>
+            <a:r>
+              <a:rPr lang="en-US" sz="3200" dirty="0"/>
+              <a:t>When history matters, create more states…</a:t>
+            </a:r>
+          </a:p>
+        </p:txBody>
+      </p:sp>
+      <p:sp>
+        <p:nvSpPr>
+          <p:cNvPr id="4" name="Content Placeholder 3">
+            <a:extLst>
+              <a:ext uri="{FF2B5EF4-FFF2-40B4-BE49-F238E27FC236}">
+                <a16:creationId xmlns:a16="http://schemas.microsoft.com/office/drawing/2014/main" id="{2461F1E7-6A22-0C4C-9D4E-F9CB8628A038}"/>
+              </a:ext>
+            </a:extLst>
+          </p:cNvPr>
+          <p:cNvSpPr>
+            <a:spLocks noGrp="1"/>
+          </p:cNvSpPr>
+          <p:nvPr>
+            <p:ph idx="1"/>
+          </p:nvPr>
+        </p:nvSpPr>
+        <p:spPr>
+          <a:xfrm>
+            <a:off x="840432" y="1417638"/>
+            <a:ext cx="4793665" cy="4983162"/>
+          </a:xfrm>
+        </p:spPr>
+        <p:txBody>
+          <a:bodyPr>
+            <a:normAutofit/>
+          </a:bodyPr>
+          <a:lstStyle/>
+          <a:p>
+            <a:pPr marL="114300" indent="0">
+              <a:buNone/>
+            </a:pPr>
+            <a:r>
+              <a:rPr lang="en-US" sz="2000" dirty="0"/>
+              <a:t>	Healthy – Sick - Dead:</a:t>
+            </a:r>
+          </a:p>
+          <a:p>
+            <a:endParaRPr lang="en-US" sz="2000" dirty="0"/>
+          </a:p>
+          <a:p>
+            <a:endParaRPr lang="en-US" sz="2000" dirty="0"/>
+          </a:p>
+          <a:p>
+            <a:pPr marL="114300" indent="0">
+              <a:buNone/>
+            </a:pPr>
+            <a:r>
+              <a:rPr lang="en-US" sz="1800" dirty="0"/>
+              <a:t>Once recovered, the risk of getting sick again or dying increases </a:t>
+            </a:r>
+          </a:p>
+        </p:txBody>
+      </p:sp>
+      <p:sp>
+        <p:nvSpPr>
+          <p:cNvPr id="5" name="Slide Number Placeholder 28">
+            <a:extLst>
+              <a:ext uri="{FF2B5EF4-FFF2-40B4-BE49-F238E27FC236}">
+                <a16:creationId xmlns:a16="http://schemas.microsoft.com/office/drawing/2014/main" id="{5DF03D01-79BC-7346-9D8F-05C0B1B84D5C}"/>
+              </a:ext>
+            </a:extLst>
+          </p:cNvPr>
+          <p:cNvSpPr>
+            <a:spLocks noGrp="1"/>
+          </p:cNvSpPr>
+          <p:nvPr>
             <p:ph type="sldNum" sz="quarter" idx="12"/>
           </p:nvPr>
         </p:nvSpPr>
-        <p:spPr/>
+        <p:spPr>
+          <a:xfrm>
+            <a:off x="8184553" y="6501104"/>
+            <a:ext cx="548640" cy="396240"/>
+          </a:xfrm>
+        </p:spPr>
         <p:txBody>
           <a:bodyPr/>
-          <a:lstStyle/>
-          <a:p>
-            <a:fld id="{0798D939-2D9E-2142-A80A-FFDECD1E5A9B}" type="slidenum">
-              <a:rPr lang="en-US" smtClean="0"/>
+          <a:lstStyle>
+            <a:lvl1pPr eaLnBrk="0" hangingPunct="0">
+              <a:defRPr>
+                <a:solidFill>
+                  <a:schemeClr val="tx1"/>
+                </a:solidFill>
+                <a:latin typeface="Arial" panose="020B0604020202020204" pitchFamily="34" charset="0"/>
+              </a:defRPr>
+            </a:lvl1pPr>
+            <a:lvl2pPr marL="742950" indent="-285750" eaLnBrk="0" hangingPunct="0">
+              <a:defRPr>
+                <a:solidFill>
+                  <a:schemeClr val="tx1"/>
+                </a:solidFill>
+                <a:latin typeface="Arial" panose="020B0604020202020204" pitchFamily="34" charset="0"/>
+              </a:defRPr>
+            </a:lvl2pPr>
+            <a:lvl3pPr marL="1143000" indent="-228600" eaLnBrk="0" hangingPunct="0">
+              <a:defRPr>
+                <a:solidFill>
+                  <a:schemeClr val="tx1"/>
+                </a:solidFill>
+                <a:latin typeface="Arial" panose="020B0604020202020204" pitchFamily="34" charset="0"/>
+              </a:defRPr>
+            </a:lvl3pPr>
+            <a:lvl4pPr marL="1600200" indent="-228600" eaLnBrk="0" hangingPunct="0">
+              <a:defRPr>
+                <a:solidFill>
+                  <a:schemeClr val="tx1"/>
+                </a:solidFill>
+                <a:latin typeface="Arial" panose="020B0604020202020204" pitchFamily="34" charset="0"/>
+              </a:defRPr>
+            </a:lvl4pPr>
+            <a:lvl5pPr marL="2057400" indent="-228600" eaLnBrk="0" hangingPunct="0">
+              <a:defRPr>
+                <a:solidFill>
+                  <a:schemeClr val="tx1"/>
+                </a:solidFill>
+                <a:latin typeface="Arial" panose="020B0604020202020204" pitchFamily="34" charset="0"/>
+              </a:defRPr>
+            </a:lvl5pPr>
+            <a:lvl6pPr marL="2514600" indent="-228600" eaLnBrk="0" fontAlgn="base" hangingPunct="0">
+              <a:spcBef>
+                <a:spcPct val="0"/>
+              </a:spcBef>
+              <a:spcAft>
+                <a:spcPct val="0"/>
+              </a:spcAft>
+              <a:defRPr>
+                <a:solidFill>
+                  <a:schemeClr val="tx1"/>
+                </a:solidFill>
+                <a:latin typeface="Arial" panose="020B0604020202020204" pitchFamily="34" charset="0"/>
+              </a:defRPr>
+            </a:lvl6pPr>
+            <a:lvl7pPr marL="2971800" indent="-228600" eaLnBrk="0" fontAlgn="base" hangingPunct="0">
+              <a:spcBef>
+                <a:spcPct val="0"/>
+              </a:spcBef>
+              <a:spcAft>
+                <a:spcPct val="0"/>
+              </a:spcAft>
+              <a:defRPr>
+                <a:solidFill>
+                  <a:schemeClr val="tx1"/>
+                </a:solidFill>
+                <a:latin typeface="Arial" panose="020B0604020202020204" pitchFamily="34" charset="0"/>
+              </a:defRPr>
+            </a:lvl7pPr>
+            <a:lvl8pPr marL="3429000" indent="-228600" eaLnBrk="0" fontAlgn="base" hangingPunct="0">
+              <a:spcBef>
+                <a:spcPct val="0"/>
+              </a:spcBef>
+              <a:spcAft>
+                <a:spcPct val="0"/>
+              </a:spcAft>
+              <a:defRPr>
+                <a:solidFill>
+                  <a:schemeClr val="tx1"/>
+                </a:solidFill>
+                <a:latin typeface="Arial" panose="020B0604020202020204" pitchFamily="34" charset="0"/>
+              </a:defRPr>
+            </a:lvl8pPr>
+            <a:lvl9pPr marL="3886200" indent="-228600" eaLnBrk="0" fontAlgn="base" hangingPunct="0">
+              <a:spcBef>
+                <a:spcPct val="0"/>
+              </a:spcBef>
+              <a:spcAft>
+                <a:spcPct val="0"/>
+              </a:spcAft>
+              <a:defRPr>
+                <a:solidFill>
+                  <a:schemeClr val="tx1"/>
+                </a:solidFill>
+                <a:latin typeface="Arial" panose="020B0604020202020204" pitchFamily="34" charset="0"/>
+              </a:defRPr>
+            </a:lvl9pPr>
+          </a:lstStyle>
+          <a:p>
+            <a:pPr eaLnBrk="1" hangingPunct="1"/>
+            <a:fld id="{3F7E73E1-F280-4386-87FD-01754258053D}" type="slidenum">
+              <a:rPr lang="en-US">
+                <a:solidFill>
+                  <a:schemeClr val="accent1"/>
+                </a:solidFill>
+              </a:rPr>
+              <a:pPr eaLnBrk="1" hangingPunct="1"/>
               <a:t>9</a:t>
             </a:fld>
-            <a:endParaRPr lang="en-US"/>
+            <a:endParaRPr lang="en-US" dirty="0">
+              <a:solidFill>
+                <a:schemeClr val="accent1"/>
+              </a:solidFill>
+            </a:endParaRPr>
+          </a:p>
+        </p:txBody>
+      </p:sp>
+      <p:grpSp>
+        <p:nvGrpSpPr>
+          <p:cNvPr id="3" name="Group 2">
+            <a:extLst>
+              <a:ext uri="{FF2B5EF4-FFF2-40B4-BE49-F238E27FC236}">
+                <a16:creationId xmlns:a16="http://schemas.microsoft.com/office/drawing/2014/main" id="{800C97F1-8079-4BE6-AAF5-3CD251E791CD}"/>
+              </a:ext>
+            </a:extLst>
+          </p:cNvPr>
+          <p:cNvGrpSpPr/>
+          <p:nvPr/>
+        </p:nvGrpSpPr>
+        <p:grpSpPr>
+          <a:xfrm>
+            <a:off x="5634097" y="730156"/>
+            <a:ext cx="2925767" cy="2900630"/>
+            <a:chOff x="3997951" y="730156"/>
+            <a:chExt cx="2925767" cy="2900630"/>
+          </a:xfrm>
+        </p:grpSpPr>
+        <p:grpSp>
+          <p:nvGrpSpPr>
+            <p:cNvPr id="19" name="Group 18">
+              <a:extLst>
+                <a:ext uri="{FF2B5EF4-FFF2-40B4-BE49-F238E27FC236}">
+                  <a16:creationId xmlns:a16="http://schemas.microsoft.com/office/drawing/2014/main" id="{BE184D66-2D44-47A4-A719-D3C95E5ECC10}"/>
+                </a:ext>
+              </a:extLst>
+            </p:cNvPr>
+            <p:cNvGrpSpPr/>
+            <p:nvPr/>
+          </p:nvGrpSpPr>
+          <p:grpSpPr>
+            <a:xfrm>
+              <a:off x="3997951" y="730156"/>
+              <a:ext cx="2925767" cy="2900630"/>
+              <a:chOff x="2335461" y="1846641"/>
+              <a:chExt cx="5015880" cy="4450219"/>
+            </a:xfrm>
+          </p:grpSpPr>
+          <p:sp>
+            <p:nvSpPr>
+              <p:cNvPr id="20" name="Shape 646">
+                <a:extLst>
+                  <a:ext uri="{FF2B5EF4-FFF2-40B4-BE49-F238E27FC236}">
+                    <a16:creationId xmlns:a16="http://schemas.microsoft.com/office/drawing/2014/main" id="{88C0276E-2056-4DF8-8D1C-060B3F803335}"/>
+                  </a:ext>
+                </a:extLst>
+              </p:cNvPr>
+              <p:cNvSpPr/>
+              <p:nvPr/>
+            </p:nvSpPr>
+            <p:spPr>
+              <a:xfrm>
+                <a:off x="2335461" y="2798535"/>
+                <a:ext cx="1828800" cy="1371600"/>
+              </a:xfrm>
+              <a:prstGeom prst="ellipse">
+                <a:avLst/>
+              </a:prstGeom>
+              <a:solidFill>
+                <a:srgbClr val="E6EEEE"/>
+              </a:solidFill>
+              <a:ln w="25400" cap="flat" cmpd="sng">
+                <a:solidFill>
+                  <a:srgbClr val="667E7E"/>
+                </a:solidFill>
+                <a:prstDash val="solid"/>
+                <a:round/>
+                <a:headEnd type="none" w="sm" len="sm"/>
+                <a:tailEnd type="none" w="sm" len="sm"/>
+              </a:ln>
+            </p:spPr>
+            <p:txBody>
+              <a:bodyPr spcFirstLastPara="1" wrap="square" lIns="91425" tIns="45700" rIns="91425" bIns="45700" anchor="ctr" anchorCtr="0">
+                <a:noAutofit/>
+              </a:bodyPr>
+              <a:lstStyle/>
+              <a:p>
+                <a:pPr marL="0" marR="0" lvl="0" indent="0" algn="ctr" rtl="0">
+                  <a:spcBef>
+                    <a:spcPts val="0"/>
+                  </a:spcBef>
+                  <a:spcAft>
+                    <a:spcPts val="0"/>
+                  </a:spcAft>
+                  <a:buNone/>
+                </a:pPr>
+                <a:r>
+                  <a:rPr lang="nl-NL" sz="1000" b="1" dirty="0" err="1">
+                    <a:solidFill>
+                      <a:srgbClr val="3F3F3F"/>
+                    </a:solidFill>
+                    <a:latin typeface="Calibri"/>
+                    <a:ea typeface="Calibri"/>
+                    <a:cs typeface="Calibri"/>
+                    <a:sym typeface="Calibri"/>
+                  </a:rPr>
+                  <a:t>Healthy</a:t>
+                </a:r>
+                <a:r>
+                  <a:rPr lang="nl-NL" sz="1000" b="1" dirty="0">
+                    <a:solidFill>
+                      <a:srgbClr val="3F3F3F"/>
+                    </a:solidFill>
+                    <a:latin typeface="Calibri"/>
+                    <a:ea typeface="Calibri"/>
+                    <a:cs typeface="Calibri"/>
+                    <a:sym typeface="Calibri"/>
+                  </a:rPr>
+                  <a:t> (H)</a:t>
+                </a:r>
+                <a:endParaRPr sz="1000" b="1" dirty="0">
+                  <a:solidFill>
+                    <a:srgbClr val="3F3F3F"/>
+                  </a:solidFill>
+                  <a:latin typeface="Calibri"/>
+                  <a:ea typeface="Calibri"/>
+                  <a:cs typeface="Calibri"/>
+                  <a:sym typeface="Calibri"/>
+                </a:endParaRPr>
+              </a:p>
+            </p:txBody>
+          </p:sp>
+          <p:sp>
+            <p:nvSpPr>
+              <p:cNvPr id="21" name="Shape 646">
+                <a:extLst>
+                  <a:ext uri="{FF2B5EF4-FFF2-40B4-BE49-F238E27FC236}">
+                    <a16:creationId xmlns:a16="http://schemas.microsoft.com/office/drawing/2014/main" id="{FC26E0F2-546C-4CC0-AEC1-0680857DB7CF}"/>
+                  </a:ext>
+                </a:extLst>
+              </p:cNvPr>
+              <p:cNvSpPr/>
+              <p:nvPr/>
+            </p:nvSpPr>
+            <p:spPr>
+              <a:xfrm>
+                <a:off x="5522541" y="2798535"/>
+                <a:ext cx="1828800" cy="1371600"/>
+              </a:xfrm>
+              <a:prstGeom prst="ellipse">
+                <a:avLst/>
+              </a:prstGeom>
+              <a:solidFill>
+                <a:srgbClr val="E6EEEE"/>
+              </a:solidFill>
+              <a:ln w="25400" cap="flat" cmpd="sng">
+                <a:solidFill>
+                  <a:srgbClr val="667E7E"/>
+                </a:solidFill>
+                <a:prstDash val="solid"/>
+                <a:round/>
+                <a:headEnd type="none" w="sm" len="sm"/>
+                <a:tailEnd type="none" w="sm" len="sm"/>
+              </a:ln>
+            </p:spPr>
+            <p:txBody>
+              <a:bodyPr spcFirstLastPara="1" wrap="square" lIns="91425" tIns="45700" rIns="91425" bIns="45700" anchor="ctr" anchorCtr="0">
+                <a:noAutofit/>
+              </a:bodyPr>
+              <a:lstStyle/>
+              <a:p>
+                <a:pPr marL="0" marR="0" lvl="0" indent="0" algn="ctr" rtl="0">
+                  <a:spcBef>
+                    <a:spcPts val="0"/>
+                  </a:spcBef>
+                  <a:spcAft>
+                    <a:spcPts val="0"/>
+                  </a:spcAft>
+                  <a:buNone/>
+                </a:pPr>
+                <a:r>
+                  <a:rPr lang="nl-NL" sz="1000" b="1" dirty="0">
+                    <a:solidFill>
+                      <a:srgbClr val="3F3F3F"/>
+                    </a:solidFill>
+                    <a:latin typeface="Calibri"/>
+                    <a:ea typeface="Calibri"/>
+                    <a:cs typeface="Calibri"/>
+                    <a:sym typeface="Calibri"/>
+                  </a:rPr>
+                  <a:t>Sick (S)</a:t>
+                </a:r>
+                <a:endParaRPr sz="1000" b="1" dirty="0">
+                  <a:solidFill>
+                    <a:srgbClr val="3F3F3F"/>
+                  </a:solidFill>
+                  <a:latin typeface="Calibri"/>
+                  <a:ea typeface="Calibri"/>
+                  <a:cs typeface="Calibri"/>
+                  <a:sym typeface="Calibri"/>
+                </a:endParaRPr>
+              </a:p>
+            </p:txBody>
+          </p:sp>
+          <p:sp>
+            <p:nvSpPr>
+              <p:cNvPr id="22" name="Shape 646">
+                <a:extLst>
+                  <a:ext uri="{FF2B5EF4-FFF2-40B4-BE49-F238E27FC236}">
+                    <a16:creationId xmlns:a16="http://schemas.microsoft.com/office/drawing/2014/main" id="{34BA0C1D-B33D-4BD8-9BDE-B30F5577C0EB}"/>
+                  </a:ext>
+                </a:extLst>
+              </p:cNvPr>
+              <p:cNvSpPr/>
+              <p:nvPr/>
+            </p:nvSpPr>
+            <p:spPr>
+              <a:xfrm>
+                <a:off x="3929001" y="4925260"/>
+                <a:ext cx="1828800" cy="1371600"/>
+              </a:xfrm>
+              <a:prstGeom prst="ellipse">
+                <a:avLst/>
+              </a:prstGeom>
+              <a:solidFill>
+                <a:srgbClr val="E6EEEE"/>
+              </a:solidFill>
+              <a:ln w="25400" cap="flat" cmpd="sng">
+                <a:solidFill>
+                  <a:srgbClr val="667E7E"/>
+                </a:solidFill>
+                <a:prstDash val="solid"/>
+                <a:round/>
+                <a:headEnd type="none" w="sm" len="sm"/>
+                <a:tailEnd type="none" w="sm" len="sm"/>
+              </a:ln>
+            </p:spPr>
+            <p:txBody>
+              <a:bodyPr spcFirstLastPara="1" wrap="square" lIns="91425" tIns="45700" rIns="91425" bIns="45700" anchor="ctr" anchorCtr="0">
+                <a:noAutofit/>
+              </a:bodyPr>
+              <a:lstStyle/>
+              <a:p>
+                <a:pPr marL="0" marR="0" lvl="0" indent="0" algn="ctr" rtl="0">
+                  <a:spcBef>
+                    <a:spcPts val="0"/>
+                  </a:spcBef>
+                  <a:spcAft>
+                    <a:spcPts val="0"/>
+                  </a:spcAft>
+                  <a:buNone/>
+                </a:pPr>
+                <a:r>
+                  <a:rPr lang="nl-NL" sz="1000" b="1" dirty="0">
+                    <a:solidFill>
+                      <a:srgbClr val="3F3F3F"/>
+                    </a:solidFill>
+                    <a:latin typeface="Calibri"/>
+                    <a:ea typeface="Calibri"/>
+                    <a:cs typeface="Calibri"/>
+                    <a:sym typeface="Calibri"/>
+                  </a:rPr>
+                  <a:t>Dead</a:t>
+                </a:r>
+                <a:r>
+                  <a:rPr lang="nl-NL" sz="900" b="1" dirty="0">
+                    <a:solidFill>
+                      <a:srgbClr val="3F3F3F"/>
+                    </a:solidFill>
+                    <a:latin typeface="Calibri"/>
+                    <a:ea typeface="Calibri"/>
+                    <a:cs typeface="Calibri"/>
+                    <a:sym typeface="Calibri"/>
+                  </a:rPr>
+                  <a:t> (D)</a:t>
+                </a:r>
+                <a:endParaRPr sz="900" b="1" dirty="0">
+                  <a:solidFill>
+                    <a:srgbClr val="3F3F3F"/>
+                  </a:solidFill>
+                  <a:latin typeface="Calibri"/>
+                  <a:ea typeface="Calibri"/>
+                  <a:cs typeface="Calibri"/>
+                  <a:sym typeface="Calibri"/>
+                </a:endParaRPr>
+              </a:p>
+            </p:txBody>
+          </p:sp>
+          <p:cxnSp>
+            <p:nvCxnSpPr>
+              <p:cNvPr id="23" name="Shape 651">
+                <a:extLst>
+                  <a:ext uri="{FF2B5EF4-FFF2-40B4-BE49-F238E27FC236}">
+                    <a16:creationId xmlns:a16="http://schemas.microsoft.com/office/drawing/2014/main" id="{06677B15-9D20-4448-BA21-CFDAD393B49A}"/>
+                  </a:ext>
+                </a:extLst>
+              </p:cNvPr>
+              <p:cNvCxnSpPr>
+                <a:stCxn id="20" idx="0"/>
+                <a:endCxn id="21" idx="0"/>
+              </p:cNvCxnSpPr>
+              <p:nvPr/>
+            </p:nvCxnSpPr>
+            <p:spPr>
+              <a:xfrm rot="5400000" flipH="1" flipV="1">
+                <a:off x="4843401" y="1204995"/>
+                <a:ext cx="12700" cy="3187080"/>
+              </a:xfrm>
+              <a:prstGeom prst="curvedConnector3">
+                <a:avLst>
+                  <a:gd name="adj1" fmla="val 4090906"/>
+                </a:avLst>
+              </a:prstGeom>
+              <a:noFill/>
+              <a:ln w="25400" cap="flat" cmpd="sng">
+                <a:solidFill>
+                  <a:schemeClr val="accent2"/>
+                </a:solidFill>
+                <a:prstDash val="solid"/>
+                <a:round/>
+                <a:headEnd type="triangle" w="med" len="med"/>
+                <a:tailEnd type="triangle" w="med" len="med"/>
+              </a:ln>
+            </p:spPr>
+          </p:cxnSp>
+          <p:cxnSp>
+            <p:nvCxnSpPr>
+              <p:cNvPr id="24" name="Shape 651">
+                <a:extLst>
+                  <a:ext uri="{FF2B5EF4-FFF2-40B4-BE49-F238E27FC236}">
+                    <a16:creationId xmlns:a16="http://schemas.microsoft.com/office/drawing/2014/main" id="{4E2A7A3F-891C-4A38-8FF2-51086ED20B7B}"/>
+                  </a:ext>
+                </a:extLst>
+              </p:cNvPr>
+              <p:cNvCxnSpPr>
+                <a:stCxn id="20" idx="2"/>
+                <a:endCxn id="20" idx="1"/>
+              </p:cNvCxnSpPr>
+              <p:nvPr/>
+            </p:nvCxnSpPr>
+            <p:spPr>
+              <a:xfrm rot="10800000" flipH="1">
+                <a:off x="2335461" y="2999401"/>
+                <a:ext cx="267822" cy="484934"/>
+              </a:xfrm>
+              <a:prstGeom prst="curvedConnector4">
+                <a:avLst>
+                  <a:gd name="adj1" fmla="val -85355"/>
+                  <a:gd name="adj2" fmla="val 188562"/>
+                </a:avLst>
+              </a:prstGeom>
+              <a:noFill/>
+              <a:ln w="25400" cap="flat" cmpd="sng">
+                <a:solidFill>
+                  <a:srgbClr val="3F3F3F"/>
+                </a:solidFill>
+                <a:prstDash val="solid"/>
+                <a:round/>
+                <a:headEnd type="none" w="sm" len="sm"/>
+                <a:tailEnd type="triangle" w="lg" len="lg"/>
+              </a:ln>
+            </p:spPr>
+          </p:cxnSp>
+          <p:cxnSp>
+            <p:nvCxnSpPr>
+              <p:cNvPr id="25" name="Shape 651">
+                <a:extLst>
+                  <a:ext uri="{FF2B5EF4-FFF2-40B4-BE49-F238E27FC236}">
+                    <a16:creationId xmlns:a16="http://schemas.microsoft.com/office/drawing/2014/main" id="{1763CFB0-0966-4E84-BD9B-1DC9DBC53C48}"/>
+                  </a:ext>
+                </a:extLst>
+              </p:cNvPr>
+              <p:cNvCxnSpPr>
+                <a:stCxn id="21" idx="6"/>
+                <a:endCxn id="21" idx="7"/>
+              </p:cNvCxnSpPr>
+              <p:nvPr/>
+            </p:nvCxnSpPr>
+            <p:spPr>
+              <a:xfrm flipH="1" flipV="1">
+                <a:off x="7083519" y="2999401"/>
+                <a:ext cx="267822" cy="484934"/>
+              </a:xfrm>
+              <a:prstGeom prst="curvedConnector4">
+                <a:avLst>
+                  <a:gd name="adj1" fmla="val -85355"/>
+                  <a:gd name="adj2" fmla="val 188562"/>
+                </a:avLst>
+              </a:prstGeom>
+              <a:noFill/>
+              <a:ln w="25400" cap="flat" cmpd="sng">
+                <a:solidFill>
+                  <a:srgbClr val="3F3F3F"/>
+                </a:solidFill>
+                <a:prstDash val="solid"/>
+                <a:round/>
+                <a:headEnd type="none" w="sm" len="sm"/>
+                <a:tailEnd type="triangle" w="lg" len="lg"/>
+              </a:ln>
+            </p:spPr>
+          </p:cxnSp>
+          <p:cxnSp>
+            <p:nvCxnSpPr>
+              <p:cNvPr id="26" name="Shape 651">
+                <a:extLst>
+                  <a:ext uri="{FF2B5EF4-FFF2-40B4-BE49-F238E27FC236}">
+                    <a16:creationId xmlns:a16="http://schemas.microsoft.com/office/drawing/2014/main" id="{653248CC-6B1A-4437-85E6-181D026175DB}"/>
+                  </a:ext>
+                </a:extLst>
+              </p:cNvPr>
+              <p:cNvCxnSpPr>
+                <a:stCxn id="22" idx="2"/>
+                <a:endCxn id="22" idx="3"/>
+              </p:cNvCxnSpPr>
+              <p:nvPr/>
+            </p:nvCxnSpPr>
+            <p:spPr>
+              <a:xfrm rot="10800000" flipH="1" flipV="1">
+                <a:off x="3929001" y="5611060"/>
+                <a:ext cx="267822" cy="484934"/>
+              </a:xfrm>
+              <a:prstGeom prst="curvedConnector4">
+                <a:avLst>
+                  <a:gd name="adj1" fmla="val -85355"/>
+                  <a:gd name="adj2" fmla="val 188562"/>
+                </a:avLst>
+              </a:prstGeom>
+              <a:noFill/>
+              <a:ln w="25400" cap="flat" cmpd="sng">
+                <a:solidFill>
+                  <a:srgbClr val="3F3F3F"/>
+                </a:solidFill>
+                <a:prstDash val="solid"/>
+                <a:round/>
+                <a:headEnd type="none" w="sm" len="sm"/>
+                <a:tailEnd type="triangle" w="lg" len="lg"/>
+              </a:ln>
+            </p:spPr>
+          </p:cxnSp>
+          <p:cxnSp>
+            <p:nvCxnSpPr>
+              <p:cNvPr id="27" name="Shape 651">
+                <a:extLst>
+                  <a:ext uri="{FF2B5EF4-FFF2-40B4-BE49-F238E27FC236}">
+                    <a16:creationId xmlns:a16="http://schemas.microsoft.com/office/drawing/2014/main" id="{B2F5BF56-5930-4037-A4B9-21E03C7CF1AE}"/>
+                  </a:ext>
+                </a:extLst>
+              </p:cNvPr>
+              <p:cNvCxnSpPr>
+                <a:stCxn id="20" idx="4"/>
+                <a:endCxn id="22" idx="1"/>
+              </p:cNvCxnSpPr>
+              <p:nvPr/>
+            </p:nvCxnSpPr>
+            <p:spPr>
+              <a:xfrm>
+                <a:off x="3249861" y="4170135"/>
+                <a:ext cx="946962" cy="955991"/>
+              </a:xfrm>
+              <a:prstGeom prst="straightConnector1">
+                <a:avLst/>
+              </a:prstGeom>
+              <a:noFill/>
+              <a:ln w="25400" cap="flat" cmpd="sng">
+                <a:solidFill>
+                  <a:srgbClr val="3F3F3F"/>
+                </a:solidFill>
+                <a:prstDash val="solid"/>
+                <a:round/>
+                <a:headEnd type="none" w="sm" len="sm"/>
+                <a:tailEnd type="triangle" w="lg" len="lg"/>
+              </a:ln>
+            </p:spPr>
+          </p:cxnSp>
+          <p:cxnSp>
+            <p:nvCxnSpPr>
+              <p:cNvPr id="28" name="Shape 651">
+                <a:extLst>
+                  <a:ext uri="{FF2B5EF4-FFF2-40B4-BE49-F238E27FC236}">
+                    <a16:creationId xmlns:a16="http://schemas.microsoft.com/office/drawing/2014/main" id="{6C77C007-E319-46E2-B900-5DDADDAF8A9D}"/>
+                  </a:ext>
+                </a:extLst>
+              </p:cNvPr>
+              <p:cNvCxnSpPr>
+                <a:stCxn id="21" idx="4"/>
+                <a:endCxn id="22" idx="7"/>
+              </p:cNvCxnSpPr>
+              <p:nvPr/>
+            </p:nvCxnSpPr>
+            <p:spPr>
+              <a:xfrm flipH="1">
+                <a:off x="5489979" y="4170135"/>
+                <a:ext cx="946962" cy="955991"/>
+              </a:xfrm>
+              <a:prstGeom prst="straightConnector1">
+                <a:avLst/>
+              </a:prstGeom>
+              <a:noFill/>
+              <a:ln w="25400" cap="flat" cmpd="sng">
+                <a:solidFill>
+                  <a:srgbClr val="3F3F3F"/>
+                </a:solidFill>
+                <a:prstDash val="solid"/>
+                <a:round/>
+                <a:headEnd type="none" w="sm" len="sm"/>
+                <a:tailEnd type="triangle" w="lg" len="lg"/>
+              </a:ln>
+            </p:spPr>
+          </p:cxnSp>
+          <p:sp>
+            <p:nvSpPr>
+              <p:cNvPr id="29" name="Shape 671">
+                <a:extLst>
+                  <a:ext uri="{FF2B5EF4-FFF2-40B4-BE49-F238E27FC236}">
+                    <a16:creationId xmlns:a16="http://schemas.microsoft.com/office/drawing/2014/main" id="{BA51EAB2-B963-421A-A731-ABB27D7F6414}"/>
+                  </a:ext>
+                </a:extLst>
+              </p:cNvPr>
+              <p:cNvSpPr txBox="1"/>
+              <p:nvPr/>
+            </p:nvSpPr>
+            <p:spPr>
+              <a:xfrm>
+                <a:off x="4425574" y="1846641"/>
+                <a:ext cx="835654" cy="306109"/>
+              </a:xfrm>
+              <a:prstGeom prst="rect">
+                <a:avLst/>
+              </a:prstGeom>
+              <a:noFill/>
+              <a:ln>
+                <a:noFill/>
+              </a:ln>
+            </p:spPr>
+            <p:txBody>
+              <a:bodyPr spcFirstLastPara="1" wrap="square" lIns="91425" tIns="45700" rIns="91425" bIns="45700" anchor="t" anchorCtr="0">
+                <a:noAutofit/>
+              </a:bodyPr>
+              <a:lstStyle/>
+              <a:p>
+                <a:pPr marL="0" marR="0" lvl="0" indent="0" algn="ctr" rtl="0">
+                  <a:spcBef>
+                    <a:spcPts val="0"/>
+                  </a:spcBef>
+                  <a:spcAft>
+                    <a:spcPts val="0"/>
+                  </a:spcAft>
+                  <a:buNone/>
+                </a:pPr>
+                <a:endParaRPr sz="1100" dirty="0">
+                  <a:solidFill>
+                    <a:schemeClr val="dk1"/>
+                  </a:solidFill>
+                  <a:latin typeface="Calibri"/>
+                  <a:ea typeface="Calibri"/>
+                  <a:cs typeface="Calibri"/>
+                  <a:sym typeface="Calibri"/>
+                </a:endParaRPr>
+              </a:p>
+            </p:txBody>
+          </p:sp>
+        </p:grpSp>
+        <p:sp>
+          <p:nvSpPr>
+            <p:cNvPr id="32" name="Shape 671">
+              <a:extLst>
+                <a:ext uri="{FF2B5EF4-FFF2-40B4-BE49-F238E27FC236}">
+                  <a16:creationId xmlns:a16="http://schemas.microsoft.com/office/drawing/2014/main" id="{F7BFE984-6AC7-4D30-8943-2241A77D7FAA}"/>
+                </a:ext>
+              </a:extLst>
+            </p:cNvPr>
+            <p:cNvSpPr txBox="1"/>
+            <p:nvPr/>
+          </p:nvSpPr>
+          <p:spPr>
+            <a:xfrm>
+              <a:off x="5239860" y="1066804"/>
+              <a:ext cx="487438" cy="199520"/>
+            </a:xfrm>
+            <a:prstGeom prst="rect">
+              <a:avLst/>
+            </a:prstGeom>
+            <a:noFill/>
+            <a:ln>
+              <a:noFill/>
+            </a:ln>
+          </p:spPr>
+          <p:txBody>
+            <a:bodyPr spcFirstLastPara="1" wrap="square" lIns="91425" tIns="45700" rIns="91425" bIns="45700" anchor="t" anchorCtr="0">
+              <a:noAutofit/>
+            </a:bodyPr>
+            <a:lstStyle/>
+            <a:p>
+              <a:pPr marL="0" marR="0" lvl="0" indent="0" algn="ctr" rtl="0">
+                <a:spcBef>
+                  <a:spcPts val="0"/>
+                </a:spcBef>
+                <a:spcAft>
+                  <a:spcPts val="0"/>
+                </a:spcAft>
+                <a:buNone/>
+              </a:pPr>
+              <a:endParaRPr sz="1100" dirty="0">
+                <a:solidFill>
+                  <a:schemeClr val="dk1"/>
+                </a:solidFill>
+                <a:latin typeface="Calibri"/>
+                <a:ea typeface="Calibri"/>
+                <a:cs typeface="Calibri"/>
+                <a:sym typeface="Calibri"/>
+              </a:endParaRPr>
+            </a:p>
+          </p:txBody>
+        </p:sp>
+      </p:grpSp>
+      <p:grpSp>
+        <p:nvGrpSpPr>
+          <p:cNvPr id="34" name="Group 33">
+            <a:extLst>
+              <a:ext uri="{FF2B5EF4-FFF2-40B4-BE49-F238E27FC236}">
+                <a16:creationId xmlns:a16="http://schemas.microsoft.com/office/drawing/2014/main" id="{43230AA1-FC0C-4729-A719-510CF1C46C60}"/>
+              </a:ext>
+            </a:extLst>
+          </p:cNvPr>
+          <p:cNvGrpSpPr/>
+          <p:nvPr/>
+        </p:nvGrpSpPr>
+        <p:grpSpPr>
+          <a:xfrm>
+            <a:off x="1301402" y="3476768"/>
+            <a:ext cx="2925767" cy="2900630"/>
+            <a:chOff x="2335461" y="1846641"/>
+            <a:chExt cx="5015880" cy="4450219"/>
+          </a:xfrm>
+        </p:grpSpPr>
+        <p:sp>
+          <p:nvSpPr>
+            <p:cNvPr id="36" name="Shape 646">
+              <a:extLst>
+                <a:ext uri="{FF2B5EF4-FFF2-40B4-BE49-F238E27FC236}">
+                  <a16:creationId xmlns:a16="http://schemas.microsoft.com/office/drawing/2014/main" id="{1C91EBD1-467A-4BAA-A349-9875540ACFF9}"/>
+                </a:ext>
+              </a:extLst>
+            </p:cNvPr>
+            <p:cNvSpPr/>
+            <p:nvPr/>
+          </p:nvSpPr>
+          <p:spPr>
+            <a:xfrm>
+              <a:off x="2335461" y="2798535"/>
+              <a:ext cx="1828800" cy="1371600"/>
+            </a:xfrm>
+            <a:prstGeom prst="ellipse">
+              <a:avLst/>
+            </a:prstGeom>
+            <a:solidFill>
+              <a:srgbClr val="E6EEEE"/>
+            </a:solidFill>
+            <a:ln w="25400" cap="flat" cmpd="sng">
+              <a:solidFill>
+                <a:srgbClr val="667E7E"/>
+              </a:solidFill>
+              <a:prstDash val="solid"/>
+              <a:round/>
+              <a:headEnd type="none" w="sm" len="sm"/>
+              <a:tailEnd type="none" w="sm" len="sm"/>
+            </a:ln>
+          </p:spPr>
+          <p:txBody>
+            <a:bodyPr spcFirstLastPara="1" wrap="square" lIns="91425" tIns="45700" rIns="91425" bIns="45700" anchor="ctr" anchorCtr="0">
+              <a:noAutofit/>
+            </a:bodyPr>
+            <a:lstStyle/>
+            <a:p>
+              <a:pPr marL="0" marR="0" lvl="0" indent="0" algn="ctr" rtl="0">
+                <a:spcBef>
+                  <a:spcPts val="0"/>
+                </a:spcBef>
+                <a:spcAft>
+                  <a:spcPts val="0"/>
+                </a:spcAft>
+                <a:buNone/>
+              </a:pPr>
+              <a:r>
+                <a:rPr lang="nl-NL" sz="1000" b="1" dirty="0" err="1">
+                  <a:solidFill>
+                    <a:srgbClr val="3F3F3F"/>
+                  </a:solidFill>
+                  <a:latin typeface="Calibri"/>
+                  <a:ea typeface="Calibri"/>
+                  <a:cs typeface="Calibri"/>
+                  <a:sym typeface="Calibri"/>
+                </a:rPr>
+                <a:t>Healthy</a:t>
+              </a:r>
+              <a:r>
+                <a:rPr lang="nl-NL" sz="1000" b="1" dirty="0">
+                  <a:solidFill>
+                    <a:srgbClr val="3F3F3F"/>
+                  </a:solidFill>
+                  <a:latin typeface="Calibri"/>
+                  <a:ea typeface="Calibri"/>
+                  <a:cs typeface="Calibri"/>
+                  <a:sym typeface="Calibri"/>
+                </a:rPr>
+                <a:t> (H)</a:t>
+              </a:r>
+              <a:endParaRPr sz="1000" b="1" dirty="0">
+                <a:solidFill>
+                  <a:srgbClr val="3F3F3F"/>
+                </a:solidFill>
+                <a:latin typeface="Calibri"/>
+                <a:ea typeface="Calibri"/>
+                <a:cs typeface="Calibri"/>
+                <a:sym typeface="Calibri"/>
+              </a:endParaRPr>
+            </a:p>
+          </p:txBody>
+        </p:sp>
+        <p:sp>
+          <p:nvSpPr>
+            <p:cNvPr id="37" name="Shape 646">
+              <a:extLst>
+                <a:ext uri="{FF2B5EF4-FFF2-40B4-BE49-F238E27FC236}">
+                  <a16:creationId xmlns:a16="http://schemas.microsoft.com/office/drawing/2014/main" id="{878ED5B6-AA23-4985-B976-0EA1A42FFFF3}"/>
+                </a:ext>
+              </a:extLst>
+            </p:cNvPr>
+            <p:cNvSpPr/>
+            <p:nvPr/>
+          </p:nvSpPr>
+          <p:spPr>
+            <a:xfrm>
+              <a:off x="5557354" y="2798536"/>
+              <a:ext cx="1793987" cy="1325027"/>
+            </a:xfrm>
+            <a:prstGeom prst="ellipse">
+              <a:avLst/>
+            </a:prstGeom>
+            <a:solidFill>
+              <a:srgbClr val="E6EEEE"/>
+            </a:solidFill>
+            <a:ln w="25400" cap="flat" cmpd="sng">
+              <a:solidFill>
+                <a:srgbClr val="667E7E"/>
+              </a:solidFill>
+              <a:prstDash val="solid"/>
+              <a:round/>
+              <a:headEnd type="none" w="sm" len="sm"/>
+              <a:tailEnd type="none" w="sm" len="sm"/>
+            </a:ln>
+          </p:spPr>
+          <p:txBody>
+            <a:bodyPr spcFirstLastPara="1" wrap="square" lIns="91425" tIns="45700" rIns="91425" bIns="45700" anchor="ctr" anchorCtr="0">
+              <a:noAutofit/>
+            </a:bodyPr>
+            <a:lstStyle/>
+            <a:p>
+              <a:pPr marL="0" marR="0" lvl="0" indent="0" algn="ctr" rtl="0">
+                <a:spcBef>
+                  <a:spcPts val="0"/>
+                </a:spcBef>
+                <a:spcAft>
+                  <a:spcPts val="0"/>
+                </a:spcAft>
+                <a:buNone/>
+              </a:pPr>
+              <a:r>
+                <a:rPr lang="nl-NL" sz="1000" b="1" dirty="0">
+                  <a:solidFill>
+                    <a:srgbClr val="3F3F3F"/>
+                  </a:solidFill>
+                  <a:latin typeface="Calibri"/>
+                  <a:ea typeface="Calibri"/>
+                  <a:cs typeface="Calibri"/>
+                  <a:sym typeface="Calibri"/>
+                </a:rPr>
+                <a:t>Sick (S1)</a:t>
+              </a:r>
+              <a:endParaRPr sz="1000" b="1" dirty="0">
+                <a:solidFill>
+                  <a:srgbClr val="3F3F3F"/>
+                </a:solidFill>
+                <a:latin typeface="Calibri"/>
+                <a:ea typeface="Calibri"/>
+                <a:cs typeface="Calibri"/>
+                <a:sym typeface="Calibri"/>
+              </a:endParaRPr>
+            </a:p>
+          </p:txBody>
+        </p:sp>
+        <p:sp>
+          <p:nvSpPr>
+            <p:cNvPr id="38" name="Shape 646">
+              <a:extLst>
+                <a:ext uri="{FF2B5EF4-FFF2-40B4-BE49-F238E27FC236}">
+                  <a16:creationId xmlns:a16="http://schemas.microsoft.com/office/drawing/2014/main" id="{0BDCBE5B-2CEB-4159-8726-B25A35F8F5FB}"/>
+                </a:ext>
+              </a:extLst>
+            </p:cNvPr>
+            <p:cNvSpPr/>
+            <p:nvPr/>
+          </p:nvSpPr>
+          <p:spPr>
+            <a:xfrm>
+              <a:off x="3929001" y="4925260"/>
+              <a:ext cx="1828800" cy="1371600"/>
+            </a:xfrm>
+            <a:prstGeom prst="ellipse">
+              <a:avLst/>
+            </a:prstGeom>
+            <a:solidFill>
+              <a:srgbClr val="E6EEEE"/>
+            </a:solidFill>
+            <a:ln w="25400" cap="flat" cmpd="sng">
+              <a:solidFill>
+                <a:srgbClr val="667E7E"/>
+              </a:solidFill>
+              <a:prstDash val="solid"/>
+              <a:round/>
+              <a:headEnd type="none" w="sm" len="sm"/>
+              <a:tailEnd type="none" w="sm" len="sm"/>
+            </a:ln>
+          </p:spPr>
+          <p:txBody>
+            <a:bodyPr spcFirstLastPara="1" wrap="square" lIns="91425" tIns="45700" rIns="91425" bIns="45700" anchor="ctr" anchorCtr="0">
+              <a:noAutofit/>
+            </a:bodyPr>
+            <a:lstStyle/>
+            <a:p>
+              <a:pPr marL="0" marR="0" lvl="0" indent="0" algn="ctr" rtl="0">
+                <a:spcBef>
+                  <a:spcPts val="0"/>
+                </a:spcBef>
+                <a:spcAft>
+                  <a:spcPts val="0"/>
+                </a:spcAft>
+                <a:buNone/>
+              </a:pPr>
+              <a:r>
+                <a:rPr lang="nl-NL" sz="1000" b="1" dirty="0">
+                  <a:solidFill>
+                    <a:srgbClr val="3F3F3F"/>
+                  </a:solidFill>
+                  <a:latin typeface="Calibri"/>
+                  <a:ea typeface="Calibri"/>
+                  <a:cs typeface="Calibri"/>
+                  <a:sym typeface="Calibri"/>
+                </a:rPr>
+                <a:t>Dead</a:t>
+              </a:r>
+              <a:r>
+                <a:rPr lang="nl-NL" sz="900" b="1" dirty="0">
+                  <a:solidFill>
+                    <a:srgbClr val="3F3F3F"/>
+                  </a:solidFill>
+                  <a:latin typeface="Calibri"/>
+                  <a:ea typeface="Calibri"/>
+                  <a:cs typeface="Calibri"/>
+                  <a:sym typeface="Calibri"/>
+                </a:rPr>
+                <a:t> (D)</a:t>
+              </a:r>
+              <a:endParaRPr sz="900" b="1" dirty="0">
+                <a:solidFill>
+                  <a:srgbClr val="3F3F3F"/>
+                </a:solidFill>
+                <a:latin typeface="Calibri"/>
+                <a:ea typeface="Calibri"/>
+                <a:cs typeface="Calibri"/>
+                <a:sym typeface="Calibri"/>
+              </a:endParaRPr>
+            </a:p>
+          </p:txBody>
+        </p:sp>
+        <p:cxnSp>
+          <p:nvCxnSpPr>
+            <p:cNvPr id="39" name="Shape 651">
+              <a:extLst>
+                <a:ext uri="{FF2B5EF4-FFF2-40B4-BE49-F238E27FC236}">
+                  <a16:creationId xmlns:a16="http://schemas.microsoft.com/office/drawing/2014/main" id="{ED44998E-D399-497B-872C-3FF64A91726C}"/>
+                </a:ext>
+              </a:extLst>
+            </p:cNvPr>
+            <p:cNvCxnSpPr>
+              <a:cxnSpLocks/>
+            </p:cNvCxnSpPr>
+            <p:nvPr/>
+          </p:nvCxnSpPr>
+          <p:spPr>
+            <a:xfrm rot="5400000" flipH="1" flipV="1">
+              <a:off x="4853250" y="1196294"/>
+              <a:ext cx="19485" cy="3204485"/>
+            </a:xfrm>
+            <a:prstGeom prst="curvedConnector3">
+              <a:avLst>
+                <a:gd name="adj1" fmla="val 1800000"/>
+              </a:avLst>
+            </a:prstGeom>
+            <a:noFill/>
+            <a:ln w="25400" cap="flat" cmpd="sng">
+              <a:solidFill>
+                <a:schemeClr val="accent2"/>
+              </a:solidFill>
+              <a:prstDash val="solid"/>
+              <a:round/>
+              <a:headEnd type="none" w="med" len="med"/>
+              <a:tailEnd type="triangle" w="med" len="med"/>
+            </a:ln>
+          </p:spPr>
+        </p:cxnSp>
+        <p:cxnSp>
+          <p:nvCxnSpPr>
+            <p:cNvPr id="40" name="Shape 651">
+              <a:extLst>
+                <a:ext uri="{FF2B5EF4-FFF2-40B4-BE49-F238E27FC236}">
+                  <a16:creationId xmlns:a16="http://schemas.microsoft.com/office/drawing/2014/main" id="{5B354F72-171C-4EBB-8EB9-FCF0785A61FF}"/>
+                </a:ext>
+              </a:extLst>
+            </p:cNvPr>
+            <p:cNvCxnSpPr>
+              <a:stCxn id="36" idx="2"/>
+              <a:endCxn id="36" idx="1"/>
+            </p:cNvCxnSpPr>
+            <p:nvPr/>
+          </p:nvCxnSpPr>
+          <p:spPr>
+            <a:xfrm rot="10800000" flipH="1">
+              <a:off x="2335461" y="2999401"/>
+              <a:ext cx="267822" cy="484934"/>
+            </a:xfrm>
+            <a:prstGeom prst="curvedConnector4">
+              <a:avLst>
+                <a:gd name="adj1" fmla="val -85355"/>
+                <a:gd name="adj2" fmla="val 188562"/>
+              </a:avLst>
+            </a:prstGeom>
+            <a:noFill/>
+            <a:ln w="25400" cap="flat" cmpd="sng">
+              <a:solidFill>
+                <a:srgbClr val="3F3F3F"/>
+              </a:solidFill>
+              <a:prstDash val="solid"/>
+              <a:round/>
+              <a:headEnd type="none" w="sm" len="sm"/>
+              <a:tailEnd type="triangle" w="lg" len="lg"/>
+            </a:ln>
+          </p:spPr>
+        </p:cxnSp>
+        <p:cxnSp>
+          <p:nvCxnSpPr>
+            <p:cNvPr id="41" name="Shape 651">
+              <a:extLst>
+                <a:ext uri="{FF2B5EF4-FFF2-40B4-BE49-F238E27FC236}">
+                  <a16:creationId xmlns:a16="http://schemas.microsoft.com/office/drawing/2014/main" id="{5E777EFE-CF87-473B-BCE9-261AA05274FC}"/>
+                </a:ext>
+              </a:extLst>
+            </p:cNvPr>
+            <p:cNvCxnSpPr>
+              <a:cxnSpLocks/>
+              <a:stCxn id="37" idx="6"/>
+              <a:endCxn id="37" idx="7"/>
+            </p:cNvCxnSpPr>
+            <p:nvPr/>
+          </p:nvCxnSpPr>
+          <p:spPr>
+            <a:xfrm flipH="1" flipV="1">
+              <a:off x="7088617" y="2992581"/>
+              <a:ext cx="262724" cy="468468"/>
+            </a:xfrm>
+            <a:prstGeom prst="curvedConnector4">
+              <a:avLst>
+                <a:gd name="adj1" fmla="val -149171"/>
+                <a:gd name="adj2" fmla="val 216287"/>
+              </a:avLst>
+            </a:prstGeom>
+            <a:noFill/>
+            <a:ln w="25400" cap="flat" cmpd="sng">
+              <a:solidFill>
+                <a:srgbClr val="3F3F3F"/>
+              </a:solidFill>
+              <a:prstDash val="solid"/>
+              <a:round/>
+              <a:headEnd type="none" w="sm" len="sm"/>
+              <a:tailEnd type="triangle" w="lg" len="lg"/>
+            </a:ln>
+          </p:spPr>
+        </p:cxnSp>
+        <p:cxnSp>
+          <p:nvCxnSpPr>
+            <p:cNvPr id="42" name="Shape 651">
+              <a:extLst>
+                <a:ext uri="{FF2B5EF4-FFF2-40B4-BE49-F238E27FC236}">
+                  <a16:creationId xmlns:a16="http://schemas.microsoft.com/office/drawing/2014/main" id="{8E9FD526-E88A-4601-A176-AF26A5E5B16E}"/>
+                </a:ext>
+              </a:extLst>
+            </p:cNvPr>
+            <p:cNvCxnSpPr>
+              <a:stCxn id="38" idx="2"/>
+              <a:endCxn id="38" idx="3"/>
+            </p:cNvCxnSpPr>
+            <p:nvPr/>
+          </p:nvCxnSpPr>
+          <p:spPr>
+            <a:xfrm rot="10800000" flipH="1" flipV="1">
+              <a:off x="3929001" y="5611060"/>
+              <a:ext cx="267822" cy="484934"/>
+            </a:xfrm>
+            <a:prstGeom prst="curvedConnector4">
+              <a:avLst>
+                <a:gd name="adj1" fmla="val -85355"/>
+                <a:gd name="adj2" fmla="val 188562"/>
+              </a:avLst>
+            </a:prstGeom>
+            <a:noFill/>
+            <a:ln w="25400" cap="flat" cmpd="sng">
+              <a:solidFill>
+                <a:srgbClr val="3F3F3F"/>
+              </a:solidFill>
+              <a:prstDash val="solid"/>
+              <a:round/>
+              <a:headEnd type="none" w="sm" len="sm"/>
+              <a:tailEnd type="triangle" w="lg" len="lg"/>
+            </a:ln>
+          </p:spPr>
+        </p:cxnSp>
+        <p:cxnSp>
+          <p:nvCxnSpPr>
+            <p:cNvPr id="43" name="Shape 651">
+              <a:extLst>
+                <a:ext uri="{FF2B5EF4-FFF2-40B4-BE49-F238E27FC236}">
+                  <a16:creationId xmlns:a16="http://schemas.microsoft.com/office/drawing/2014/main" id="{1A76646A-972A-4F26-BCBB-358DEEAD26FE}"/>
+                </a:ext>
+              </a:extLst>
+            </p:cNvPr>
+            <p:cNvCxnSpPr>
+              <a:stCxn id="36" idx="4"/>
+              <a:endCxn id="38" idx="1"/>
+            </p:cNvCxnSpPr>
+            <p:nvPr/>
+          </p:nvCxnSpPr>
+          <p:spPr>
+            <a:xfrm>
+              <a:off x="3249861" y="4170135"/>
+              <a:ext cx="946962" cy="955991"/>
+            </a:xfrm>
+            <a:prstGeom prst="straightConnector1">
+              <a:avLst/>
+            </a:prstGeom>
+            <a:noFill/>
+            <a:ln w="25400" cap="flat" cmpd="sng">
+              <a:solidFill>
+                <a:srgbClr val="3F3F3F"/>
+              </a:solidFill>
+              <a:prstDash val="solid"/>
+              <a:round/>
+              <a:headEnd type="none" w="sm" len="sm"/>
+              <a:tailEnd type="triangle" w="lg" len="lg"/>
+            </a:ln>
+          </p:spPr>
+        </p:cxnSp>
+        <p:cxnSp>
+          <p:nvCxnSpPr>
+            <p:cNvPr id="44" name="Shape 651">
+              <a:extLst>
+                <a:ext uri="{FF2B5EF4-FFF2-40B4-BE49-F238E27FC236}">
+                  <a16:creationId xmlns:a16="http://schemas.microsoft.com/office/drawing/2014/main" id="{C746F1C3-6C74-4077-B305-D495F76A8535}"/>
+                </a:ext>
+              </a:extLst>
+            </p:cNvPr>
+            <p:cNvCxnSpPr>
+              <a:cxnSpLocks/>
+              <a:stCxn id="37" idx="4"/>
+              <a:endCxn id="38" idx="7"/>
+            </p:cNvCxnSpPr>
+            <p:nvPr/>
+          </p:nvCxnSpPr>
+          <p:spPr>
+            <a:xfrm flipH="1">
+              <a:off x="5489979" y="4123563"/>
+              <a:ext cx="964369" cy="1002564"/>
+            </a:xfrm>
+            <a:prstGeom prst="straightConnector1">
+              <a:avLst/>
+            </a:prstGeom>
+            <a:noFill/>
+            <a:ln w="25400" cap="flat" cmpd="sng">
+              <a:solidFill>
+                <a:srgbClr val="3F3F3F"/>
+              </a:solidFill>
+              <a:prstDash val="solid"/>
+              <a:round/>
+              <a:headEnd type="none" w="sm" len="sm"/>
+              <a:tailEnd type="triangle" w="lg" len="lg"/>
+            </a:ln>
+          </p:spPr>
+        </p:cxnSp>
+        <p:sp>
+          <p:nvSpPr>
+            <p:cNvPr id="45" name="Shape 671">
+              <a:extLst>
+                <a:ext uri="{FF2B5EF4-FFF2-40B4-BE49-F238E27FC236}">
+                  <a16:creationId xmlns:a16="http://schemas.microsoft.com/office/drawing/2014/main" id="{CEE2E57A-1868-4380-A683-757F6AE27F38}"/>
+                </a:ext>
+              </a:extLst>
+            </p:cNvPr>
+            <p:cNvSpPr txBox="1"/>
+            <p:nvPr/>
+          </p:nvSpPr>
+          <p:spPr>
+            <a:xfrm>
+              <a:off x="4425574" y="1846641"/>
+              <a:ext cx="835654" cy="306109"/>
+            </a:xfrm>
+            <a:prstGeom prst="rect">
+              <a:avLst/>
+            </a:prstGeom>
+            <a:noFill/>
+            <a:ln>
+              <a:noFill/>
+            </a:ln>
+          </p:spPr>
+          <p:txBody>
+            <a:bodyPr spcFirstLastPara="1" wrap="square" lIns="91425" tIns="45700" rIns="91425" bIns="45700" anchor="t" anchorCtr="0">
+              <a:noAutofit/>
+            </a:bodyPr>
+            <a:lstStyle/>
+            <a:p>
+              <a:pPr marL="0" marR="0" lvl="0" indent="0" algn="ctr" rtl="0">
+                <a:spcBef>
+                  <a:spcPts val="0"/>
+                </a:spcBef>
+                <a:spcAft>
+                  <a:spcPts val="0"/>
+                </a:spcAft>
+                <a:buNone/>
+              </a:pPr>
+              <a:endParaRPr sz="1100" dirty="0">
+                <a:solidFill>
+                  <a:schemeClr val="dk1"/>
+                </a:solidFill>
+                <a:latin typeface="Calibri"/>
+                <a:ea typeface="Calibri"/>
+                <a:cs typeface="Calibri"/>
+                <a:sym typeface="Calibri"/>
+              </a:endParaRPr>
+            </a:p>
+          </p:txBody>
+        </p:sp>
+      </p:grpSp>
+      <p:sp>
+        <p:nvSpPr>
+          <p:cNvPr id="58" name="Shape 646">
+            <a:extLst>
+              <a:ext uri="{FF2B5EF4-FFF2-40B4-BE49-F238E27FC236}">
+                <a16:creationId xmlns:a16="http://schemas.microsoft.com/office/drawing/2014/main" id="{F58C1AED-7A64-4584-A2A7-9B4C39420C46}"/>
+              </a:ext>
+            </a:extLst>
+          </p:cNvPr>
+          <p:cNvSpPr/>
+          <p:nvPr/>
+        </p:nvSpPr>
+        <p:spPr>
+          <a:xfrm>
+            <a:off x="4711451" y="4064551"/>
+            <a:ext cx="1046434" cy="863646"/>
+          </a:xfrm>
+          <a:prstGeom prst="ellipse">
+            <a:avLst/>
+          </a:prstGeom>
+          <a:solidFill>
+            <a:srgbClr val="E6EEEE"/>
+          </a:solidFill>
+          <a:ln w="25400" cap="flat" cmpd="sng">
+            <a:solidFill>
+              <a:srgbClr val="667E7E"/>
+            </a:solidFill>
+            <a:prstDash val="solid"/>
+            <a:round/>
+            <a:headEnd type="none" w="sm" len="sm"/>
+            <a:tailEnd type="none" w="sm" len="sm"/>
+          </a:ln>
+        </p:spPr>
+        <p:txBody>
+          <a:bodyPr spcFirstLastPara="1" wrap="square" lIns="91425" tIns="45700" rIns="91425" bIns="45700" anchor="ctr" anchorCtr="0">
+            <a:noAutofit/>
+          </a:bodyPr>
+          <a:lstStyle/>
+          <a:p>
+            <a:pPr marL="0" marR="0" lvl="0" indent="0" algn="ctr" rtl="0">
+              <a:spcBef>
+                <a:spcPts val="0"/>
+              </a:spcBef>
+              <a:spcAft>
+                <a:spcPts val="0"/>
+              </a:spcAft>
+              <a:buNone/>
+            </a:pPr>
+            <a:r>
+              <a:rPr lang="nl-NL" sz="1000" b="1" dirty="0">
+                <a:solidFill>
+                  <a:srgbClr val="3F3F3F"/>
+                </a:solidFill>
+                <a:latin typeface="Calibri"/>
+                <a:ea typeface="Calibri"/>
+                <a:cs typeface="Calibri"/>
+                <a:sym typeface="Calibri"/>
+              </a:rPr>
+              <a:t>Recovered (R)</a:t>
+            </a:r>
+            <a:endParaRPr sz="1000" b="1" dirty="0">
+              <a:solidFill>
+                <a:srgbClr val="3F3F3F"/>
+              </a:solidFill>
+              <a:latin typeface="Calibri"/>
+              <a:ea typeface="Calibri"/>
+              <a:cs typeface="Calibri"/>
+              <a:sym typeface="Calibri"/>
+            </a:endParaRPr>
+          </a:p>
+        </p:txBody>
+      </p:sp>
+      <p:cxnSp>
+        <p:nvCxnSpPr>
+          <p:cNvPr id="59" name="Shape 651">
+            <a:extLst>
+              <a:ext uri="{FF2B5EF4-FFF2-40B4-BE49-F238E27FC236}">
+                <a16:creationId xmlns:a16="http://schemas.microsoft.com/office/drawing/2014/main" id="{381F4E3C-1CDC-483E-A893-699CBADE4029}"/>
+              </a:ext>
+            </a:extLst>
+          </p:cNvPr>
+          <p:cNvCxnSpPr>
+            <a:cxnSpLocks/>
+          </p:cNvCxnSpPr>
+          <p:nvPr/>
+        </p:nvCxnSpPr>
+        <p:spPr>
+          <a:xfrm rot="5400000" flipH="1" flipV="1">
+            <a:off x="4452984" y="3315522"/>
+            <a:ext cx="32657" cy="1530716"/>
+          </a:xfrm>
+          <a:prstGeom prst="curvedConnector3">
+            <a:avLst>
+              <a:gd name="adj1" fmla="val 800003"/>
+            </a:avLst>
+          </a:prstGeom>
+          <a:noFill/>
+          <a:ln w="25400" cap="flat" cmpd="sng">
+            <a:solidFill>
+              <a:schemeClr val="accent2"/>
+            </a:solidFill>
+            <a:prstDash val="solid"/>
+            <a:round/>
+            <a:headEnd type="triangle" w="med" len="med"/>
+            <a:tailEnd type="triangle" w="med" len="med"/>
+          </a:ln>
+        </p:spPr>
+      </p:cxnSp>
+      <p:cxnSp>
+        <p:nvCxnSpPr>
+          <p:cNvPr id="62" name="Shape 651">
+            <a:extLst>
+              <a:ext uri="{FF2B5EF4-FFF2-40B4-BE49-F238E27FC236}">
+                <a16:creationId xmlns:a16="http://schemas.microsoft.com/office/drawing/2014/main" id="{304DC1E6-F587-4CB3-915F-6C1AD488FE57}"/>
+              </a:ext>
+            </a:extLst>
+          </p:cNvPr>
+          <p:cNvCxnSpPr>
+            <a:cxnSpLocks/>
+            <a:stCxn id="58" idx="6"/>
+            <a:endCxn id="58" idx="7"/>
+          </p:cNvCxnSpPr>
+          <p:nvPr/>
+        </p:nvCxnSpPr>
+        <p:spPr>
+          <a:xfrm flipH="1" flipV="1">
+            <a:off x="5604638" y="4191029"/>
+            <a:ext cx="153247" cy="305345"/>
+          </a:xfrm>
+          <a:prstGeom prst="curvedConnector4">
+            <a:avLst>
+              <a:gd name="adj1" fmla="val -149171"/>
+              <a:gd name="adj2" fmla="val 216287"/>
+            </a:avLst>
+          </a:prstGeom>
+          <a:noFill/>
+          <a:ln w="25400" cap="flat" cmpd="sng">
+            <a:solidFill>
+              <a:srgbClr val="3F3F3F"/>
+            </a:solidFill>
+            <a:prstDash val="solid"/>
+            <a:round/>
+            <a:headEnd type="none" w="sm" len="sm"/>
+            <a:tailEnd type="triangle" w="lg" len="lg"/>
+          </a:ln>
+        </p:spPr>
+      </p:cxnSp>
+      <p:cxnSp>
+        <p:nvCxnSpPr>
+          <p:cNvPr id="65" name="Shape 651">
+            <a:extLst>
+              <a:ext uri="{FF2B5EF4-FFF2-40B4-BE49-F238E27FC236}">
+                <a16:creationId xmlns:a16="http://schemas.microsoft.com/office/drawing/2014/main" id="{B07C418A-5FBB-4259-9C37-90045EAF98D6}"/>
+              </a:ext>
+            </a:extLst>
+          </p:cNvPr>
+          <p:cNvCxnSpPr>
+            <a:cxnSpLocks/>
+            <a:stCxn id="58" idx="3"/>
+            <a:endCxn id="38" idx="6"/>
+          </p:cNvCxnSpPr>
+          <p:nvPr/>
+        </p:nvCxnSpPr>
+        <p:spPr>
+          <a:xfrm flipH="1">
+            <a:off x="3297656" y="4801719"/>
+            <a:ext cx="1567042" cy="1128678"/>
+          </a:xfrm>
+          <a:prstGeom prst="straightConnector1">
+            <a:avLst/>
+          </a:prstGeom>
+          <a:noFill/>
+          <a:ln w="25400" cap="flat" cmpd="sng">
+            <a:solidFill>
+              <a:srgbClr val="3F3F3F"/>
+            </a:solidFill>
+            <a:prstDash val="solid"/>
+            <a:round/>
+            <a:headEnd type="none" w="sm" len="sm"/>
+            <a:tailEnd type="triangle" w="lg" len="lg"/>
+          </a:ln>
+        </p:spPr>
+      </p:cxnSp>
+      <p:sp>
+        <p:nvSpPr>
+          <p:cNvPr id="68" name="Rectangle 67">
+            <a:extLst>
+              <a:ext uri="{FF2B5EF4-FFF2-40B4-BE49-F238E27FC236}">
+                <a16:creationId xmlns:a16="http://schemas.microsoft.com/office/drawing/2014/main" id="{9706C428-6221-4805-92E8-72487E2C41C4}"/>
+              </a:ext>
+            </a:extLst>
+          </p:cNvPr>
+          <p:cNvSpPr/>
+          <p:nvPr/>
+        </p:nvSpPr>
+        <p:spPr>
+          <a:xfrm>
+            <a:off x="4601494" y="5780067"/>
+            <a:ext cx="4236673" cy="369332"/>
+          </a:xfrm>
+          <a:prstGeom prst="rect">
+            <a:avLst/>
+          </a:prstGeom>
+        </p:spPr>
+        <p:txBody>
+          <a:bodyPr wrap="none">
+            <a:spAutoFit/>
+          </a:bodyPr>
+          <a:lstStyle/>
+          <a:p>
+            <a:r>
+              <a:rPr lang="en-US" dirty="0"/>
+              <a:t>Healthy – Sick – Recovered - Dead</a:t>
+            </a:r>
           </a:p>
         </p:txBody>
       </p:sp>
     </p:spTree>
     <p:extLst>
       <p:ext uri="{BB962C8B-B14F-4D97-AF65-F5344CB8AC3E}">
-        <p14:creationId xmlns:p14="http://schemas.microsoft.com/office/powerpoint/2010/main" val="1555524041"/>
+        <p14:creationId xmlns:p14="http://schemas.microsoft.com/office/powerpoint/2010/main" val="2441470660"/>
       </p:ext>
     </p:extLst>
   </p:cSld>
   <p:clrMapOvr>
     <a:masterClrMapping/>
   </p:clrMapOvr>
-  <p:timing>
-    <p:tnLst>
-      <p:par>
-        <p:cTn id="1" dur="indefinite" restart="never" nodeType="tmRoot">
-          <p:childTnLst>
-            <p:seq concurrent="1" nextAc="seek">
-              <p:cTn id="2" dur="indefinite" nodeType="mainSeq">
-                <p:childTnLst>
-                  <p:par>
-                    <p:cTn id="3" fill="hold">
-                      <p:stCondLst>
-                        <p:cond delay="indefinite"/>
-                      </p:stCondLst>
-                      <p:childTnLst>
-                        <p:par>
-                          <p:cTn id="4" fill="hold">
-                            <p:stCondLst>
-                              <p:cond delay="0"/>
-                            </p:stCondLst>
-                            <p:childTnLst>
-                              <p:par>
-                                <p:cTn id="5" presetID="1" presetClass="entr" presetSubtype="0" fill="hold" nodeType="clickEffect">
-                                  <p:stCondLst>
-                                    <p:cond delay="0"/>
-                                  </p:stCondLst>
-                                  <p:childTnLst>
-                                    <p:set>
-                                      <p:cBhvr>
-                                        <p:cTn id="6" dur="1" fill="hold">
-                                          <p:stCondLst>
-                                            <p:cond delay="0"/>
-                                          </p:stCondLst>
-                                        </p:cTn>
-                                        <p:tgtEl>
-                                          <p:spTgt spid="3">
-                                            <p:txEl>
-                                              <p:pRg st="7" end="7"/>
-                                            </p:txEl>
-                                          </p:spTgt>
-                                        </p:tgtEl>
-                                        <p:attrNameLst>
-                                          <p:attrName>style.visibility</p:attrName>
-                                        </p:attrNameLst>
-                                      </p:cBhvr>
-                                      <p:to>
-                                        <p:strVal val="visible"/>
-                                      </p:to>
-                                    </p:set>
-                                  </p:childTnLst>
-                                </p:cTn>
-                              </p:par>
-                            </p:childTnLst>
-                          </p:cTn>
-                        </p:par>
-                      </p:childTnLst>
-                    </p:cTn>
-                  </p:par>
-                </p:childTnLst>
-              </p:cTn>
-              <p:prevCondLst>
-                <p:cond evt="onPrev" delay="0">
-                  <p:tgtEl>
-                    <p:sldTgt/>
-                  </p:tgtEl>
-                </p:cond>
-              </p:prevCondLst>
-              <p:nextCondLst>
-                <p:cond evt="onNext" delay="0">
-                  <p:tgtEl>
-                    <p:sldTgt/>
-                  </p:tgtEl>
-                </p:cond>
-              </p:nextCondLst>
-            </p:seq>
-          </p:childTnLst>
-        </p:cTn>
-      </p:par>
-    </p:tnLst>
-  </p:timing>
 </p:sld>
 </file>
 

</xml_diff>

<commit_message>
Update the varients from the Markov models
</commit_message>
<xml_diff>
--- a/Markov models/Slides/Markov Model Variants.pptx
+++ b/Markov models/Slides/Markov Model Variants.pptx
@@ -5,7 +5,7 @@
     <p:sldMasterId id="2147483690" r:id="rId1"/>
   </p:sldMasterIdLst>
   <p:notesMasterIdLst>
-    <p:notesMasterId r:id="rId18"/>
+    <p:notesMasterId r:id="rId19"/>
   </p:notesMasterIdLst>
   <p:sldIdLst>
     <p:sldId id="347" r:id="rId2"/>
@@ -22,8 +22,9 @@
     <p:sldId id="351" r:id="rId13"/>
     <p:sldId id="288" r:id="rId14"/>
     <p:sldId id="291" r:id="rId15"/>
-    <p:sldId id="258" r:id="rId16"/>
-    <p:sldId id="346" r:id="rId17"/>
+    <p:sldId id="354" r:id="rId16"/>
+    <p:sldId id="258" r:id="rId17"/>
+    <p:sldId id="346" r:id="rId18"/>
   </p:sldIdLst>
   <p:sldSz cx="9144000" cy="6858000" type="screen4x3"/>
   <p:notesSz cx="6858000" cy="9144000"/>
@@ -212,7 +213,7 @@
           <a:p>
             <a:fld id="{80022054-F6B9-B04E-9F80-BE6C2BED9348}" type="datetimeFigureOut">
               <a:rPr lang="en-US" smtClean="0"/>
-              <a:t>2/2/2020</a:t>
+              <a:t>2/3/20</a:t>
             </a:fld>
             <a:endParaRPr lang="en-US"/>
           </a:p>
@@ -1586,7 +1587,7 @@
           <a:p>
             <a:fld id="{5BA465BA-58CD-5648-8542-F88D33A1D558}" type="datetime1">
               <a:rPr lang="en-US" smtClean="0"/>
-              <a:t>2/2/2020</a:t>
+              <a:t>2/3/20</a:t>
             </a:fld>
             <a:endParaRPr lang="en-US"/>
           </a:p>
@@ -1919,7 +1920,7 @@
           <a:p>
             <a:fld id="{E0285D2B-991D-6E41-96CD-86451D0EA8B6}" type="datetime1">
               <a:rPr lang="en-US" smtClean="0"/>
-              <a:t>2/2/2020</a:t>
+              <a:t>2/3/20</a:t>
             </a:fld>
             <a:endParaRPr lang="en-US"/>
           </a:p>
@@ -2103,7 +2104,7 @@
           <a:p>
             <a:fld id="{F58F080E-3479-FC41-A03E-486F34AFEBA5}" type="datetime1">
               <a:rPr lang="en-US" smtClean="0"/>
-              <a:t>2/2/2020</a:t>
+              <a:t>2/3/20</a:t>
             </a:fld>
             <a:endParaRPr lang="en-US"/>
           </a:p>
@@ -2293,7 +2294,7 @@
           <a:p>
             <a:fld id="{90A8F86B-5CB0-B646-932F-A77CEECF201B}" type="datetime1">
               <a:rPr lang="en-US" smtClean="0"/>
-              <a:t>2/2/2020</a:t>
+              <a:t>2/3/20</a:t>
             </a:fld>
             <a:endParaRPr lang="en-US"/>
           </a:p>
@@ -2445,7 +2446,7 @@
           <a:p>
             <a:fld id="{752AF0E9-FBC0-8F4F-83B9-AB34FBD396A5}" type="datetime1">
               <a:rPr lang="en-US" smtClean="0"/>
-              <a:t>2/2/2020</a:t>
+              <a:t>2/3/20</a:t>
             </a:fld>
             <a:endParaRPr lang="en-US"/>
           </a:p>
@@ -2720,7 +2721,7 @@
           <a:p>
             <a:fld id="{22F5944B-3964-1344-B4B0-FFFD5323E0E7}" type="datetime1">
               <a:rPr lang="en-US" smtClean="0"/>
-              <a:t>2/2/2020</a:t>
+              <a:t>2/3/20</a:t>
             </a:fld>
             <a:endParaRPr/>
           </a:p>
@@ -3674,7 +3675,7 @@
           <a:p>
             <a:fld id="{C85DF245-8919-D744-8B83-42A2D27B59A3}" type="datetime1">
               <a:rPr lang="en-US" smtClean="0"/>
-              <a:t>2/2/2020</a:t>
+              <a:t>2/3/20</a:t>
             </a:fld>
             <a:endParaRPr lang="en-US"/>
           </a:p>
@@ -3712,7 +3713,7 @@
           <a:noFill/>
           <a:extLst>
             <a:ext uri="{909E8E84-426E-40dd-AFC4-6F175D3DCCD1}">
-              <a14:hiddenFill xmlns:a14="http://schemas.microsoft.com/office/drawing/2010/main" xmlns="">
+              <a14:hiddenFill xmlns="" xmlns:a14="http://schemas.microsoft.com/office/drawing/2010/main">
                 <a:solidFill>
                   <a:srgbClr val="FFFFFF"/>
                 </a:solidFill>
@@ -3753,7 +3754,7 @@
           <a:noFill/>
           <a:extLst>
             <a:ext uri="{909E8E84-426E-40dd-AFC4-6F175D3DCCD1}">
-              <a14:hiddenFill xmlns:a14="http://schemas.microsoft.com/office/drawing/2010/main" xmlns="">
+              <a14:hiddenFill xmlns="" xmlns:a14="http://schemas.microsoft.com/office/drawing/2010/main">
                 <a:solidFill>
                   <a:srgbClr val="FFFFFF"/>
                 </a:solidFill>
@@ -4336,7 +4337,7 @@
           <a:noFill/>
           <a:extLst>
             <a:ext uri="{909E8E84-426E-40dd-AFC4-6F175D3DCCD1}">
-              <a14:hiddenFill xmlns:a14="http://schemas.microsoft.com/office/drawing/2010/main" xmlns="">
+              <a14:hiddenFill xmlns="" xmlns:a14="http://schemas.microsoft.com/office/drawing/2010/main">
                 <a:solidFill>
                   <a:srgbClr val="FFFFFF"/>
                 </a:solidFill>
@@ -4375,7 +4376,7 @@
           <a:noFill/>
           <a:extLst>
             <a:ext uri="{909E8E84-426E-40dd-AFC4-6F175D3DCCD1}">
-              <a14:hiddenFill xmlns:a14="http://schemas.microsoft.com/office/drawing/2010/main" xmlns="">
+              <a14:hiddenFill xmlns="" xmlns:a14="http://schemas.microsoft.com/office/drawing/2010/main">
                 <a:solidFill>
                   <a:srgbClr val="FFFFFF"/>
                 </a:solidFill>
@@ -5038,7 +5039,7 @@
           <a:noFill/>
           <a:extLst>
             <a:ext uri="{909E8E84-426E-40dd-AFC4-6F175D3DCCD1}">
-              <a14:hiddenFill xmlns:a14="http://schemas.microsoft.com/office/drawing/2010/main" xmlns="">
+              <a14:hiddenFill xmlns="" xmlns:a14="http://schemas.microsoft.com/office/drawing/2010/main">
                 <a:solidFill>
                   <a:srgbClr val="FFFFFF"/>
                 </a:solidFill>
@@ -5085,7 +5086,7 @@
           <a:noFill/>
           <a:extLst>
             <a:ext uri="{909E8E84-426E-40dd-AFC4-6F175D3DCCD1}">
-              <a14:hiddenFill xmlns:a14="http://schemas.microsoft.com/office/drawing/2010/main" xmlns="">
+              <a14:hiddenFill xmlns="" xmlns:a14="http://schemas.microsoft.com/office/drawing/2010/main">
                 <a:solidFill>
                   <a:srgbClr val="FFFFFF"/>
                 </a:solidFill>
@@ -5136,14 +5137,14 @@
           <a:effectLst/>
           <a:extLst>
             <a:ext uri="{909E8E84-426E-40dd-AFC4-6F175D3DCCD1}">
-              <a14:hiddenFill xmlns:a14="http://schemas.microsoft.com/office/drawing/2010/main" xmlns="">
+              <a14:hiddenFill xmlns="" xmlns:a14="http://schemas.microsoft.com/office/drawing/2010/main">
                 <a:solidFill>
                   <a:schemeClr val="accent1"/>
                 </a:solidFill>
               </a14:hiddenFill>
             </a:ext>
             <a:ext uri="{91240B29-F687-4f45-9708-019B960494DF}">
-              <a14:hiddenLine xmlns:a14="http://schemas.microsoft.com/office/drawing/2010/main" xmlns="" w="9525">
+              <a14:hiddenLine xmlns="" xmlns:a14="http://schemas.microsoft.com/office/drawing/2010/main" w="9525">
                 <a:solidFill>
                   <a:schemeClr val="tx1"/>
                 </a:solidFill>
@@ -5153,7 +5154,7 @@
               </a14:hiddenLine>
             </a:ext>
             <a:ext uri="{AF507438-7753-43e0-B8FC-AC1667EBCBE1}">
-              <a14:hiddenEffects xmlns:a14="http://schemas.microsoft.com/office/drawing/2010/main" xmlns="">
+              <a14:hiddenEffects xmlns="" xmlns:a14="http://schemas.microsoft.com/office/drawing/2010/main">
                 <a:effectLst>
                   <a:outerShdw dist="35921" dir="2700000" algn="ctr" rotWithShape="0">
                     <a:schemeClr val="bg2"/>
@@ -5206,14 +5207,14 @@
           <a:effectLst/>
           <a:extLst>
             <a:ext uri="{909E8E84-426E-40dd-AFC4-6F175D3DCCD1}">
-              <a14:hiddenFill xmlns:a14="http://schemas.microsoft.com/office/drawing/2010/main" xmlns="">
+              <a14:hiddenFill xmlns="" xmlns:a14="http://schemas.microsoft.com/office/drawing/2010/main">
                 <a:solidFill>
                   <a:schemeClr val="accent1"/>
                 </a:solidFill>
               </a14:hiddenFill>
             </a:ext>
             <a:ext uri="{91240B29-F687-4f45-9708-019B960494DF}">
-              <a14:hiddenLine xmlns:a14="http://schemas.microsoft.com/office/drawing/2010/main" xmlns="" w="9525">
+              <a14:hiddenLine xmlns="" xmlns:a14="http://schemas.microsoft.com/office/drawing/2010/main" w="9525">
                 <a:solidFill>
                   <a:schemeClr val="tx1"/>
                 </a:solidFill>
@@ -5223,7 +5224,7 @@
               </a14:hiddenLine>
             </a:ext>
             <a:ext uri="{AF507438-7753-43e0-B8FC-AC1667EBCBE1}">
-              <a14:hiddenEffects xmlns:a14="http://schemas.microsoft.com/office/drawing/2010/main" xmlns="">
+              <a14:hiddenEffects xmlns="" xmlns:a14="http://schemas.microsoft.com/office/drawing/2010/main">
                 <a:effectLst>
                   <a:outerShdw dist="35921" dir="2700000" algn="ctr" rotWithShape="0">
                     <a:schemeClr val="bg2"/>
@@ -5550,7 +5551,7 @@
           <a:noFill/>
           <a:extLst>
             <a:ext uri="{909E8E84-426E-40dd-AFC4-6F175D3DCCD1}">
-              <a14:hiddenFill xmlns:a14="http://schemas.microsoft.com/office/drawing/2010/main" xmlns="">
+              <a14:hiddenFill xmlns="" xmlns:a14="http://schemas.microsoft.com/office/drawing/2010/main">
                 <a:solidFill>
                   <a:srgbClr val="FFFFFF"/>
                 </a:solidFill>
@@ -5589,7 +5590,7 @@
           <a:noFill/>
           <a:extLst>
             <a:ext uri="{909E8E84-426E-40dd-AFC4-6F175D3DCCD1}">
-              <a14:hiddenFill xmlns:a14="http://schemas.microsoft.com/office/drawing/2010/main" xmlns="">
+              <a14:hiddenFill xmlns="" xmlns:a14="http://schemas.microsoft.com/office/drawing/2010/main">
                 <a:solidFill>
                   <a:srgbClr val="FFFFFF"/>
                 </a:solidFill>
@@ -5811,7 +5812,7 @@
           <a:noFill/>
           <a:extLst>
             <a:ext uri="{909E8E84-426E-40dd-AFC4-6F175D3DCCD1}">
-              <a14:hiddenFill xmlns:a14="http://schemas.microsoft.com/office/drawing/2010/main" xmlns="">
+              <a14:hiddenFill xmlns="" xmlns:a14="http://schemas.microsoft.com/office/drawing/2010/main">
                 <a:solidFill>
                   <a:srgbClr val="FFFFFF"/>
                 </a:solidFill>
@@ -5858,7 +5859,7 @@
           <a:noFill/>
           <a:extLst>
             <a:ext uri="{909E8E84-426E-40dd-AFC4-6F175D3DCCD1}">
-              <a14:hiddenFill xmlns:a14="http://schemas.microsoft.com/office/drawing/2010/main" xmlns="">
+              <a14:hiddenFill xmlns="" xmlns:a14="http://schemas.microsoft.com/office/drawing/2010/main">
                 <a:solidFill>
                   <a:srgbClr val="FFFFFF"/>
                 </a:solidFill>
@@ -5909,14 +5910,14 @@
           <a:effectLst/>
           <a:extLst>
             <a:ext uri="{909E8E84-426E-40dd-AFC4-6F175D3DCCD1}">
-              <a14:hiddenFill xmlns:a14="http://schemas.microsoft.com/office/drawing/2010/main" xmlns="">
+              <a14:hiddenFill xmlns="" xmlns:a14="http://schemas.microsoft.com/office/drawing/2010/main">
                 <a:solidFill>
                   <a:schemeClr val="accent1"/>
                 </a:solidFill>
               </a14:hiddenFill>
             </a:ext>
             <a:ext uri="{91240B29-F687-4f45-9708-019B960494DF}">
-              <a14:hiddenLine xmlns:a14="http://schemas.microsoft.com/office/drawing/2010/main" xmlns="" w="9525">
+              <a14:hiddenLine xmlns="" xmlns:a14="http://schemas.microsoft.com/office/drawing/2010/main" w="9525">
                 <a:solidFill>
                   <a:schemeClr val="tx1"/>
                 </a:solidFill>
@@ -5926,7 +5927,7 @@
               </a14:hiddenLine>
             </a:ext>
             <a:ext uri="{AF507438-7753-43e0-B8FC-AC1667EBCBE1}">
-              <a14:hiddenEffects xmlns:a14="http://schemas.microsoft.com/office/drawing/2010/main" xmlns="">
+              <a14:hiddenEffects xmlns="" xmlns:a14="http://schemas.microsoft.com/office/drawing/2010/main">
                 <a:effectLst>
                   <a:outerShdw dist="35921" dir="2700000" algn="ctr" rotWithShape="0">
                     <a:schemeClr val="bg2"/>
@@ -5979,14 +5980,14 @@
           <a:effectLst/>
           <a:extLst>
             <a:ext uri="{909E8E84-426E-40dd-AFC4-6F175D3DCCD1}">
-              <a14:hiddenFill xmlns:a14="http://schemas.microsoft.com/office/drawing/2010/main" xmlns="">
+              <a14:hiddenFill xmlns="" xmlns:a14="http://schemas.microsoft.com/office/drawing/2010/main">
                 <a:solidFill>
                   <a:schemeClr val="accent1"/>
                 </a:solidFill>
               </a14:hiddenFill>
             </a:ext>
             <a:ext uri="{91240B29-F687-4f45-9708-019B960494DF}">
-              <a14:hiddenLine xmlns:a14="http://schemas.microsoft.com/office/drawing/2010/main" xmlns="" w="9525">
+              <a14:hiddenLine xmlns="" xmlns:a14="http://schemas.microsoft.com/office/drawing/2010/main" w="9525">
                 <a:solidFill>
                   <a:schemeClr val="tx1"/>
                 </a:solidFill>
@@ -5996,7 +5997,7 @@
               </a14:hiddenLine>
             </a:ext>
             <a:ext uri="{AF507438-7753-43e0-B8FC-AC1667EBCBE1}">
-              <a14:hiddenEffects xmlns:a14="http://schemas.microsoft.com/office/drawing/2010/main" xmlns="">
+              <a14:hiddenEffects xmlns="" xmlns:a14="http://schemas.microsoft.com/office/drawing/2010/main">
                 <a:effectLst>
                   <a:outerShdw dist="35921" dir="2700000" algn="ctr" rotWithShape="0">
                     <a:schemeClr val="bg2"/>
@@ -6172,7 +6173,7 @@
           <a:p>
             <a:fld id="{6DBFE1C1-52FA-014F-9922-AD9C38F32A04}" type="datetime1">
               <a:rPr lang="en-US" smtClean="0"/>
-              <a:t>2/2/2020</a:t>
+              <a:t>2/3/20</a:t>
             </a:fld>
             <a:endParaRPr lang="en-US"/>
           </a:p>
@@ -6429,7 +6430,7 @@
           <a:p>
             <a:fld id="{830C0508-C174-C448-A4A5-EBBC728F1201}" type="datetime1">
               <a:rPr lang="en-US" smtClean="0"/>
-              <a:t>2/2/2020</a:t>
+              <a:t>2/3/20</a:t>
             </a:fld>
             <a:endParaRPr lang="en-US"/>
           </a:p>
@@ -6733,7 +6734,7 @@
           <a:p>
             <a:fld id="{D89347E7-97B4-2F43-A642-30C7025187B7}" type="datetime1">
               <a:rPr lang="en-US" smtClean="0"/>
-              <a:t>2/2/2020</a:t>
+              <a:t>2/3/20</a:t>
             </a:fld>
             <a:endParaRPr lang="en-US"/>
           </a:p>
@@ -7182,7 +7183,7 @@
           <a:p>
             <a:fld id="{5A6B9EDF-33B7-3446-A774-F418080B35CF}" type="datetime1">
               <a:rPr lang="en-US" smtClean="0"/>
-              <a:t>2/2/2020</a:t>
+              <a:t>2/3/20</a:t>
             </a:fld>
             <a:endParaRPr lang="en-US"/>
           </a:p>
@@ -7316,7 +7317,7 @@
           <a:p>
             <a:fld id="{3856A1F0-64A3-774A-BEF5-0BB470A3FBCB}" type="datetime1">
               <a:rPr lang="en-US" smtClean="0"/>
-              <a:t>2/2/2020</a:t>
+              <a:t>2/3/20</a:t>
             </a:fld>
             <a:endParaRPr lang="en-US"/>
           </a:p>
@@ -7422,7 +7423,7 @@
           <a:p>
             <a:fld id="{7BF604F8-C7C2-9244-A9D0-D4B3019D66AA}" type="datetime1">
               <a:rPr lang="en-US" smtClean="0"/>
-              <a:t>2/2/2020</a:t>
+              <a:t>2/3/20</a:t>
             </a:fld>
             <a:endParaRPr lang="en-US"/>
           </a:p>
@@ -7771,7 +7772,7 @@
           <a:p>
             <a:fld id="{26A15BF6-4530-D64B-83B9-5FF391B1AA81}" type="datetime1">
               <a:rPr lang="en-US" smtClean="0"/>
-              <a:t>2/2/2020</a:t>
+              <a:t>2/3/20</a:t>
             </a:fld>
             <a:endParaRPr lang="en-US"/>
           </a:p>
@@ -8263,8 +8264,8 @@
           </a:p>
         </p:txBody>
       </p:sp>
-      <mc:AlternateContent xmlns:mc="http://schemas.openxmlformats.org/markup-compatibility/2006">
-        <mc:Choice xmlns:a14="http://schemas.microsoft.com/office/drawing/2010/main" Requires="a14">
+      <mc:AlternateContent xmlns:mc="http://schemas.openxmlformats.org/markup-compatibility/2006" xmlns:a14="http://schemas.microsoft.com/office/drawing/2010/main">
+        <mc:Choice Requires="a14">
           <p:sp>
             <p:nvSpPr>
               <p:cNvPr id="3" name="Content Placeholder 2"/>
@@ -8383,7 +8384,7 @@
             </p:txBody>
           </p:sp>
         </mc:Choice>
-        <mc:Fallback>
+        <mc:Fallback xmlns="">
           <p:sp>
             <p:nvSpPr>
               <p:cNvPr id="3" name="Content Placeholder 2"/>
@@ -11280,7 +11281,7 @@
               <a:buNone/>
             </a:pPr>
             <a:r>
-              <a:rPr lang="nl-NL" sz="4800">
+              <a:rPr lang="nl-NL" sz="4800" dirty="0">
                 <a:solidFill>
                   <a:schemeClr val="dk1"/>
                 </a:solidFill>
@@ -11292,7 +11293,7 @@
               <a:t>R</a:t>
             </a:r>
             <a:r>
-              <a:rPr lang="nl-NL" sz="3600">
+              <a:rPr lang="nl-NL" sz="3600" dirty="0">
                 <a:solidFill>
                   <a:schemeClr val="dk1"/>
                 </a:solidFill>
@@ -11301,9 +11302,21 @@
                 <a:cs typeface="Verdana"/>
                 <a:sym typeface="Verdana"/>
               </a:rPr>
-              <a:t> Session</a:t>
-            </a:r>
-            <a:endParaRPr sz="3600">
+              <a:t> </a:t>
+            </a:r>
+            <a:r>
+              <a:rPr lang="nl-NL" sz="3600" dirty="0" err="1">
+                <a:solidFill>
+                  <a:schemeClr val="dk1"/>
+                </a:solidFill>
+                <a:latin typeface="Verdana"/>
+                <a:ea typeface="Verdana"/>
+                <a:cs typeface="Verdana"/>
+                <a:sym typeface="Verdana"/>
+              </a:rPr>
+              <a:t>Session</a:t>
+            </a:r>
+            <a:endParaRPr sz="3600" dirty="0">
               <a:solidFill>
                 <a:schemeClr val="dk1"/>
               </a:solidFill>
@@ -11347,6 +11360,153 @@
       </p:grpSpPr>
       <p:sp>
         <p:nvSpPr>
+          <p:cNvPr id="4" name="Slide Number Placeholder 3">
+            <a:extLst>
+              <a:ext uri="{FF2B5EF4-FFF2-40B4-BE49-F238E27FC236}">
+                <a16:creationId xmlns:a16="http://schemas.microsoft.com/office/drawing/2014/main" id="{FDCFCC5B-744D-C14A-BFF0-C10DAC21A332}"/>
+              </a:ext>
+            </a:extLst>
+          </p:cNvPr>
+          <p:cNvSpPr>
+            <a:spLocks noGrp="1"/>
+          </p:cNvSpPr>
+          <p:nvPr>
+            <p:ph type="sldNum" sz="quarter" idx="12"/>
+          </p:nvPr>
+        </p:nvSpPr>
+        <p:spPr/>
+        <p:txBody>
+          <a:bodyPr/>
+          <a:lstStyle/>
+          <a:p>
+            <a:fld id="{0798D939-2D9E-2142-A80A-FFDECD1E5A9B}" type="slidenum">
+              <a:rPr lang="en-US" smtClean="0"/>
+              <a:t>15</a:t>
+            </a:fld>
+            <a:endParaRPr lang="en-US"/>
+          </a:p>
+        </p:txBody>
+      </p:sp>
+      <p:sp>
+        <p:nvSpPr>
+          <p:cNvPr id="5" name="Shape 2004">
+            <a:extLst>
+              <a:ext uri="{FF2B5EF4-FFF2-40B4-BE49-F238E27FC236}">
+                <a16:creationId xmlns:a16="http://schemas.microsoft.com/office/drawing/2014/main" id="{9BFFB0C2-B3B1-2447-8109-6F9C3A9C0151}"/>
+              </a:ext>
+            </a:extLst>
+          </p:cNvPr>
+          <p:cNvSpPr txBox="1"/>
+          <p:nvPr/>
+        </p:nvSpPr>
+        <p:spPr>
+          <a:xfrm>
+            <a:off x="3072000" y="1764075"/>
+            <a:ext cx="3000000" cy="3000000"/>
+          </a:xfrm>
+          <a:prstGeom prst="rect">
+            <a:avLst/>
+          </a:prstGeom>
+          <a:noFill/>
+          <a:ln>
+            <a:noFill/>
+          </a:ln>
+        </p:spPr>
+        <p:txBody>
+          <a:bodyPr spcFirstLastPara="1" wrap="square" lIns="91425" tIns="91425" rIns="91425" bIns="91425" anchor="ctr" anchorCtr="0">
+            <a:noAutofit/>
+          </a:bodyPr>
+          <a:lstStyle/>
+          <a:p>
+            <a:pPr marL="0" lvl="0" indent="0" algn="ctr" rtl="0">
+              <a:spcBef>
+                <a:spcPts val="0"/>
+              </a:spcBef>
+              <a:spcAft>
+                <a:spcPts val="0"/>
+              </a:spcAft>
+              <a:buNone/>
+            </a:pPr>
+            <a:r>
+              <a:rPr lang="nl-NL" sz="4800" dirty="0">
+                <a:solidFill>
+                  <a:schemeClr val="dk1"/>
+                </a:solidFill>
+                <a:latin typeface="Courier New"/>
+                <a:ea typeface="Courier New"/>
+                <a:cs typeface="Courier New"/>
+                <a:sym typeface="Courier New"/>
+              </a:rPr>
+              <a:t>R</a:t>
+            </a:r>
+            <a:r>
+              <a:rPr lang="nl-NL" sz="3600" dirty="0">
+                <a:solidFill>
+                  <a:schemeClr val="dk1"/>
+                </a:solidFill>
+                <a:latin typeface="Verdana"/>
+                <a:ea typeface="Verdana"/>
+                <a:cs typeface="Verdana"/>
+                <a:sym typeface="Verdana"/>
+              </a:rPr>
+              <a:t> </a:t>
+            </a:r>
+            <a:r>
+              <a:rPr lang="nl-NL" sz="3600" dirty="0" err="1">
+                <a:solidFill>
+                  <a:schemeClr val="dk1"/>
+                </a:solidFill>
+                <a:latin typeface="Verdana"/>
+                <a:ea typeface="Verdana"/>
+                <a:cs typeface="Verdana"/>
+                <a:sym typeface="Verdana"/>
+              </a:rPr>
+              <a:t>Excercise</a:t>
+            </a:r>
+            <a:endParaRPr sz="3600" dirty="0">
+              <a:solidFill>
+                <a:schemeClr val="dk1"/>
+              </a:solidFill>
+              <a:latin typeface="Verdana"/>
+              <a:ea typeface="Verdana"/>
+              <a:cs typeface="Verdana"/>
+              <a:sym typeface="Verdana"/>
+            </a:endParaRPr>
+          </a:p>
+        </p:txBody>
+      </p:sp>
+    </p:spTree>
+    <p:extLst>
+      <p:ext uri="{BB962C8B-B14F-4D97-AF65-F5344CB8AC3E}">
+        <p14:creationId xmlns:p14="http://schemas.microsoft.com/office/powerpoint/2010/main" val="3028964229"/>
+      </p:ext>
+    </p:extLst>
+  </p:cSld>
+  <p:clrMapOvr>
+    <a:masterClrMapping/>
+  </p:clrMapOvr>
+</p:sld>
+</file>
+
+<file path=ppt/slides/slide16.xml><?xml version="1.0" encoding="utf-8"?>
+<p:sld xmlns:a="http://schemas.openxmlformats.org/drawingml/2006/main" xmlns:r="http://schemas.openxmlformats.org/officeDocument/2006/relationships" xmlns:p="http://schemas.openxmlformats.org/presentationml/2006/main">
+  <p:cSld>
+    <p:spTree>
+      <p:nvGrpSpPr>
+        <p:cNvPr id="1" name=""/>
+        <p:cNvGrpSpPr/>
+        <p:nvPr/>
+      </p:nvGrpSpPr>
+      <p:grpSpPr>
+        <a:xfrm>
+          <a:off x="0" y="0"/>
+          <a:ext cx="0" cy="0"/>
+          <a:chOff x="0" y="0"/>
+          <a:chExt cx="0" cy="0"/>
+        </a:xfrm>
+      </p:grpSpPr>
+      <p:sp>
+        <p:nvSpPr>
           <p:cNvPr id="2" name="Slide Number Placeholder 1"/>
           <p:cNvSpPr>
             <a:spLocks noGrp="1"/>
@@ -11362,7 +11522,7 @@
           <a:p>
             <a:fld id="{6F6CFCF5-3E37-0F40-BEC2-1413134B0080}" type="slidenum">
               <a:rPr lang="en-US" smtClean="0"/>
-              <a:t>15</a:t>
+              <a:t>16</a:t>
             </a:fld>
             <a:endParaRPr lang="en-US"/>
           </a:p>
@@ -11381,7 +11541,7 @@
 </p:sld>
 </file>
 
-<file path=ppt/slides/slide16.xml><?xml version="1.0" encoding="utf-8"?>
+<file path=ppt/slides/slide17.xml><?xml version="1.0" encoding="utf-8"?>
 <p:sld xmlns:a="http://schemas.openxmlformats.org/drawingml/2006/main" xmlns:r="http://schemas.openxmlformats.org/officeDocument/2006/relationships" xmlns:p="http://schemas.openxmlformats.org/presentationml/2006/main">
   <p:cSld>
     <p:spTree>
@@ -11442,7 +11602,7 @@
             </a:pPr>
             <a:fld id="{00000000-1234-1234-1234-123412341234}" type="slidenum">
               <a:rPr lang="nl-NL"/>
-              <a:t>16</a:t>
+              <a:t>17</a:t>
             </a:fld>
             <a:endParaRPr/>
           </a:p>
@@ -11831,7 +11991,12 @@
             <p:ph idx="1"/>
           </p:nvPr>
         </p:nvSpPr>
-        <p:spPr/>
+        <p:spPr>
+          <a:xfrm>
+            <a:off x="840432" y="1689904"/>
+            <a:ext cx="7620000" cy="4710896"/>
+          </a:xfrm>
+        </p:spPr>
         <p:txBody>
           <a:bodyPr>
             <a:normAutofit/>
@@ -12375,8 +12540,8 @@
         </p:nvSpPr>
         <p:spPr>
           <a:xfrm>
-            <a:off x="3072000" y="1764075"/>
-            <a:ext cx="3000000" cy="3000000"/>
+            <a:off x="3071999" y="1764075"/>
+            <a:ext cx="4220051" cy="3000000"/>
           </a:xfrm>
           <a:prstGeom prst="rect">
             <a:avLst/>
@@ -12402,7 +12567,7 @@
               <a:buNone/>
             </a:pPr>
             <a:r>
-              <a:rPr lang="nl-NL" sz="4800">
+              <a:rPr lang="nl-NL" sz="4800" dirty="0">
                 <a:solidFill>
                   <a:schemeClr val="dk1"/>
                 </a:solidFill>
@@ -12414,7 +12579,7 @@
               <a:t>R</a:t>
             </a:r>
             <a:r>
-              <a:rPr lang="nl-NL" sz="3600">
+              <a:rPr lang="nl-NL" sz="3600" dirty="0">
                 <a:solidFill>
                   <a:schemeClr val="dk1"/>
                 </a:solidFill>
@@ -12423,9 +12588,68 @@
                 <a:cs typeface="Verdana"/>
                 <a:sym typeface="Verdana"/>
               </a:rPr>
-              <a:t> Session</a:t>
-            </a:r>
-            <a:endParaRPr sz="3600">
+              <a:t> </a:t>
+            </a:r>
+            <a:r>
+              <a:rPr lang="nl-NL" sz="3600" dirty="0" err="1">
+                <a:solidFill>
+                  <a:schemeClr val="dk1"/>
+                </a:solidFill>
+                <a:latin typeface="Verdana"/>
+                <a:ea typeface="Verdana"/>
+                <a:cs typeface="Verdana"/>
+                <a:sym typeface="Verdana"/>
+              </a:rPr>
+              <a:t>Session</a:t>
+            </a:r>
+            <a:r>
+              <a:rPr lang="nl-NL" sz="3600" dirty="0">
+                <a:solidFill>
+                  <a:schemeClr val="dk1"/>
+                </a:solidFill>
+                <a:latin typeface="Verdana"/>
+                <a:ea typeface="Verdana"/>
+                <a:cs typeface="Verdana"/>
+                <a:sym typeface="Verdana"/>
+              </a:rPr>
+              <a:t> – </a:t>
+            </a:r>
+          </a:p>
+          <a:p>
+            <a:pPr marL="0" lvl="0" indent="0" algn="ctr" rtl="0">
+              <a:spcBef>
+                <a:spcPts val="0"/>
+              </a:spcBef>
+              <a:spcAft>
+                <a:spcPts val="0"/>
+              </a:spcAft>
+              <a:buNone/>
+            </a:pPr>
+            <a:r>
+              <a:rPr lang="nl-NL" sz="3600" dirty="0">
+                <a:solidFill>
+                  <a:schemeClr val="dk1"/>
+                </a:solidFill>
+                <a:latin typeface="Verdana"/>
+                <a:ea typeface="Verdana"/>
+                <a:cs typeface="Verdana"/>
+                <a:sym typeface="Verdana"/>
+              </a:rPr>
+              <a:t>3 state </a:t>
+            </a:r>
+            <a:r>
+              <a:rPr lang="nl-NL" sz="3600" dirty="0" err="1">
+                <a:solidFill>
+                  <a:schemeClr val="dk1"/>
+                </a:solidFill>
+                <a:latin typeface="Verdana"/>
+                <a:ea typeface="Verdana"/>
+                <a:cs typeface="Verdana"/>
+                <a:sym typeface="Verdana"/>
+              </a:rPr>
+              <a:t>example</a:t>
+            </a:r>
+            <a:endParaRPr sz="3600" dirty="0">
               <a:solidFill>
                 <a:schemeClr val="dk1"/>
               </a:solidFill>

</xml_diff>